<commit_message>
Added randomization images to exact-tests
</commit_message>
<xml_diff>
--- a/exact-tests/results/exact-and-randomization-tests.pptx
+++ b/exact-tests/results/exact-and-randomization-tests.pptx
@@ -5,7 +5,7 @@
     <p:sldMasterId id="2147483648" r:id="rId1"/>
   </p:sldMasterIdLst>
   <p:notesMasterIdLst>
-    <p:notesMasterId r:id="rId12"/>
+    <p:notesMasterId r:id="rId28"/>
   </p:notesMasterIdLst>
   <p:sldIdLst>
     <p:sldId id="256" r:id="rId2"/>
@@ -18,6 +18,22 @@
     <p:sldId id="263" r:id="rId9"/>
     <p:sldId id="264" r:id="rId10"/>
     <p:sldId id="265" r:id="rId11"/>
+    <p:sldId id="266" r:id="rId12"/>
+    <p:sldId id="267" r:id="rId13"/>
+    <p:sldId id="268" r:id="rId14"/>
+    <p:sldId id="269" r:id="rId15"/>
+    <p:sldId id="270" r:id="rId16"/>
+    <p:sldId id="271" r:id="rId17"/>
+    <p:sldId id="272" r:id="rId18"/>
+    <p:sldId id="273" r:id="rId19"/>
+    <p:sldId id="274" r:id="rId20"/>
+    <p:sldId id="275" r:id="rId21"/>
+    <p:sldId id="276" r:id="rId22"/>
+    <p:sldId id="277" r:id="rId23"/>
+    <p:sldId id="278" r:id="rId24"/>
+    <p:sldId id="279" r:id="rId25"/>
+    <p:sldId id="280" r:id="rId26"/>
+    <p:sldId id="281" r:id="rId27"/>
   </p:sldIdLst>
   <p:sldSz cx="12192000" cy="6858000"/>
   <p:notesSz cx="6858000" cy="9144000"/>
@@ -816,6 +832,294 @@
             <a:fld id="{18BDFEC3-8487-43E8-A154-7C12CBC1FFF2}" type="slidenum">
               <a:rPr lang="en-US"/>
               <a:t>5</a:t>
+            </a:fld>
+            <a:endParaRPr lang="en-US"/>
+          </a:p>
+        </p:txBody>
+      </p:sp>
+    </p:spTree>
+  </p:cSld>
+</p:notes>
+</file>
+
+<file path=ppt/notesSlides/notesSlide5.xml><?xml version="1.0" encoding="utf-8"?>
+<p:notes xmlns:a="http://schemas.openxmlformats.org/drawingml/2006/main" xmlns:r="http://schemas.openxmlformats.org/officeDocument/2006/relationships" xmlns:p="http://schemas.openxmlformats.org/presentationml/2006/main">
+  <p:cSld>
+    <p:spTree>
+      <p:nvGrpSpPr>
+        <p:cNvPr id="1" name=""/>
+        <p:cNvGrpSpPr/>
+        <p:nvPr/>
+      </p:nvGrpSpPr>
+      <p:grpSpPr>
+        <a:xfrm>
+          <a:off x="0" y="0"/>
+          <a:ext cx="0" cy="0"/>
+          <a:chOff x="0" y="0"/>
+          <a:chExt cx="0" cy="0"/>
+        </a:xfrm>
+      </p:grpSpPr>
+      <p:sp>
+        <p:nvSpPr>
+          <p:cNvPr id="2" name="Slide Image Placeholder 1"/>
+          <p:cNvSpPr>
+            <a:spLocks noGrp="1" noRot="1" noChangeAspect="1"/>
+          </p:cNvSpPr>
+          <p:nvPr>
+            <p:ph type="sldImg"/>
+          </p:nvPr>
+        </p:nvSpPr>
+        <p:spPr/>
+      </p:sp>
+      <p:sp>
+        <p:nvSpPr>
+          <p:cNvPr id="3" name="Notes Placeholder 2"/>
+          <p:cNvSpPr>
+            <a:spLocks noGrp="1"/>
+          </p:cNvSpPr>
+          <p:nvPr>
+            <p:ph type="body" idx="1"/>
+          </p:nvPr>
+        </p:nvSpPr>
+        <p:spPr/>
+        <p:txBody>
+          <a:bodyPr/>
+          <a:lstStyle/>
+          <a:p>
+            <a:pPr lvl="0" indent="0" marL="0">
+              <a:buNone/>
+            </a:pPr>
+            <a:r>
+              <a:rPr/>
+              <a:t>Most of the discussion of these functions describe the hypergeometric distribution as an abstract problem of drawing balls from an urn. So think of the eight cups of tea as an urn with eight balls, four white and four black. The white balls represent correctly identifying the cup of tea as having the milk added first. The black balls represent mistakes in identification. So what is the probability of getting 3 white balls after drawing 4 balls without replacement?</a:t>
+            </a:r>
+          </a:p>
+        </p:txBody>
+      </p:sp>
+      <p:sp>
+        <p:nvSpPr>
+          <p:cNvPr id="4" name="Slide Number Placeholder 3"/>
+          <p:cNvSpPr>
+            <a:spLocks noGrp="1"/>
+          </p:cNvSpPr>
+          <p:nvPr>
+            <p:ph type="sldNum" sz="quarter" idx="10"/>
+          </p:nvPr>
+        </p:nvSpPr>
+        <p:spPr/>
+        <p:txBody>
+          <a:bodyPr/>
+          <a:lstStyle/>
+          <a:p>
+            <a:fld id="{18BDFEC3-8487-43E8-A154-7C12CBC1FFF2}" type="slidenum">
+              <a:rPr lang="en-US"/>
+              <a:t>13</a:t>
+            </a:fld>
+            <a:endParaRPr lang="en-US"/>
+          </a:p>
+        </p:txBody>
+      </p:sp>
+    </p:spTree>
+  </p:cSld>
+</p:notes>
+</file>
+
+<file path=ppt/notesSlides/notesSlide6.xml><?xml version="1.0" encoding="utf-8"?>
+<p:notes xmlns:a="http://schemas.openxmlformats.org/drawingml/2006/main" xmlns:r="http://schemas.openxmlformats.org/officeDocument/2006/relationships" xmlns:p="http://schemas.openxmlformats.org/presentationml/2006/main">
+  <p:cSld>
+    <p:spTree>
+      <p:nvGrpSpPr>
+        <p:cNvPr id="1" name=""/>
+        <p:cNvGrpSpPr/>
+        <p:nvPr/>
+      </p:nvGrpSpPr>
+      <p:grpSpPr>
+        <a:xfrm>
+          <a:off x="0" y="0"/>
+          <a:ext cx="0" cy="0"/>
+          <a:chOff x="0" y="0"/>
+          <a:chExt cx="0" cy="0"/>
+        </a:xfrm>
+      </p:grpSpPr>
+      <p:sp>
+        <p:nvSpPr>
+          <p:cNvPr id="2" name="Slide Image Placeholder 1"/>
+          <p:cNvSpPr>
+            <a:spLocks noGrp="1" noRot="1" noChangeAspect="1"/>
+          </p:cNvSpPr>
+          <p:nvPr>
+            <p:ph type="sldImg"/>
+          </p:nvPr>
+        </p:nvSpPr>
+        <p:spPr/>
+      </p:sp>
+      <p:sp>
+        <p:nvSpPr>
+          <p:cNvPr id="3" name="Notes Placeholder 2"/>
+          <p:cNvSpPr>
+            <a:spLocks noGrp="1"/>
+          </p:cNvSpPr>
+          <p:nvPr>
+            <p:ph type="body" idx="1"/>
+          </p:nvPr>
+        </p:nvSpPr>
+        <p:spPr/>
+        <p:txBody>
+          <a:bodyPr/>
+          <a:lstStyle/>
+          <a:p>
+            <a:pPr lvl="0" indent="0" marL="0">
+              <a:buNone/>
+            </a:pPr>
+            <a:r>
+              <a:rPr/>
+              <a:t>The functions to calculate hypergeometric probabilities vary from package to package. SAS uses a PDF function (short for Probability Density Function) with the ‘HYPER’ argument. R uses the dhyper function. Stata uses dis hypergeometricp. SPSS uses the PDF.HYPER function.</a:t>
+            </a:r>
+          </a:p>
+          <a:p>
+            <a:pPr lvl="0" indent="0" marL="0">
+              <a:buNone/>
+            </a:pPr>
+          </a:p>
+          <a:p>
+            <a:pPr lvl="0" indent="0" marL="0">
+              <a:buNone/>
+            </a:pPr>
+            <a:r>
+              <a:rPr/>
+              <a:t>All of these packages arrange the numeric arguments differently.</a:t>
+            </a:r>
+          </a:p>
+        </p:txBody>
+      </p:sp>
+      <p:sp>
+        <p:nvSpPr>
+          <p:cNvPr id="4" name="Slide Number Placeholder 3"/>
+          <p:cNvSpPr>
+            <a:spLocks noGrp="1"/>
+          </p:cNvSpPr>
+          <p:nvPr>
+            <p:ph type="sldNum" sz="quarter" idx="10"/>
+          </p:nvPr>
+        </p:nvSpPr>
+        <p:spPr/>
+        <p:txBody>
+          <a:bodyPr/>
+          <a:lstStyle/>
+          <a:p>
+            <a:fld id="{18BDFEC3-8487-43E8-A154-7C12CBC1FFF2}" type="slidenum">
+              <a:rPr lang="en-US"/>
+              <a:t>14</a:t>
+            </a:fld>
+            <a:endParaRPr lang="en-US"/>
+          </a:p>
+        </p:txBody>
+      </p:sp>
+    </p:spTree>
+  </p:cSld>
+</p:notes>
+</file>
+
+<file path=ppt/notesSlides/notesSlide7.xml><?xml version="1.0" encoding="utf-8"?>
+<p:notes xmlns:a="http://schemas.openxmlformats.org/drawingml/2006/main" xmlns:r="http://schemas.openxmlformats.org/officeDocument/2006/relationships" xmlns:p="http://schemas.openxmlformats.org/presentationml/2006/main">
+  <p:cSld>
+    <p:spTree>
+      <p:nvGrpSpPr>
+        <p:cNvPr id="1" name=""/>
+        <p:cNvGrpSpPr/>
+        <p:nvPr/>
+      </p:nvGrpSpPr>
+      <p:grpSpPr>
+        <a:xfrm>
+          <a:off x="0" y="0"/>
+          <a:ext cx="0" cy="0"/>
+          <a:chOff x="0" y="0"/>
+          <a:chExt cx="0" cy="0"/>
+        </a:xfrm>
+      </p:grpSpPr>
+      <p:sp>
+        <p:nvSpPr>
+          <p:cNvPr id="2" name="Slide Image Placeholder 1"/>
+          <p:cNvSpPr>
+            <a:spLocks noGrp="1" noRot="1" noChangeAspect="1"/>
+          </p:cNvSpPr>
+          <p:nvPr>
+            <p:ph type="sldImg"/>
+          </p:nvPr>
+        </p:nvSpPr>
+        <p:spPr/>
+      </p:sp>
+      <p:sp>
+        <p:nvSpPr>
+          <p:cNvPr id="3" name="Notes Placeholder 2"/>
+          <p:cNvSpPr>
+            <a:spLocks noGrp="1"/>
+          </p:cNvSpPr>
+          <p:nvPr>
+            <p:ph type="body" idx="1"/>
+          </p:nvPr>
+        </p:nvSpPr>
+        <p:spPr/>
+        <p:txBody>
+          <a:bodyPr/>
+          <a:lstStyle/>
+          <a:p>
+            <a:pPr lvl="0" indent="0" marL="0">
+              <a:buNone/>
+            </a:pPr>
+            <a:r>
+              <a:rPr/>
+              <a:t>Notice that R asks you to specify the number of white balls and the number of black balls. The other packages ask you to specify the number of white balls and the total number of balls, The order that you specify these values in is also inconsistent from package to package.</a:t>
+            </a:r>
+          </a:p>
+          <a:p>
+            <a:pPr lvl="0" indent="0" marL="0">
+              <a:buNone/>
+            </a:pPr>
+          </a:p>
+          <a:p>
+            <a:pPr lvl="0" indent="0" marL="0">
+              <a:buNone/>
+            </a:pPr>
+            <a:r>
+              <a:rPr/>
+              <a:t>I show this to emphasize that if you plan to calculate hypergeometric probabilities, read the manual closely. It also helps to first do some simple calculations like an urn with 4 white and 4 black balls. Compare what the statistical package tells you with what you calculated by hand.</a:t>
+            </a:r>
+          </a:p>
+          <a:p>
+            <a:pPr lvl="0" indent="0" marL="0">
+              <a:buNone/>
+            </a:pPr>
+          </a:p>
+          <a:p>
+            <a:pPr lvl="0" indent="0" marL="0">
+              <a:buNone/>
+            </a:pPr>
+            <a:r>
+              <a:rPr/>
+              <a:t>Fortunately, you don’t need to resort to the hypergeometric probabilities.</a:t>
+            </a:r>
+          </a:p>
+        </p:txBody>
+      </p:sp>
+      <p:sp>
+        <p:nvSpPr>
+          <p:cNvPr id="4" name="Slide Number Placeholder 3"/>
+          <p:cNvSpPr>
+            <a:spLocks noGrp="1"/>
+          </p:cNvSpPr>
+          <p:nvPr>
+            <p:ph type="sldNum" sz="quarter" idx="10"/>
+          </p:nvPr>
+        </p:nvSpPr>
+        <p:spPr/>
+        <p:txBody>
+          <a:bodyPr/>
+          <a:lstStyle/>
+          <a:p>
+            <a:fld id="{18BDFEC3-8487-43E8-A154-7C12CBC1FFF2}" type="slidenum">
+              <a:rPr lang="en-US"/>
+              <a:t>15</a:t>
             </a:fld>
             <a:endParaRPr lang="en-US"/>
           </a:p>
@@ -4062,13 +4366,1156 @@
                 <a:pPr lvl="1"/>
                 <a:r>
                   <a:rPr/>
-                  <a:t>Note: the probability changes over time!</a:t>
+                  <a:t>Note: the probability is NOT </a:t>
+                </a:r>
+                <a14:m>
+                  <m:oMath xmlns:m="http://schemas.openxmlformats.org/officeDocument/2006/math">
+                    <m:sSup>
+                      <m:e>
+                        <m:d>
+                          <m:dPr>
+                            <m:begChr m:val="("/>
+                            <m:endChr m:val=")"/>
+                            <m:sepChr m:val=""/>
+                            <m:grow/>
+                          </m:dPr>
+                          <m:e>
+                            <m:f>
+                              <m:fPr>
+                                <m:type m:val="bar"/>
+                              </m:fPr>
+                              <m:num>
+                                <m:r>
+                                  <m:t>1</m:t>
+                                </m:r>
+                              </m:num>
+                              <m:den>
+                                <m:r>
+                                  <m:t>2</m:t>
+                                </m:r>
+                              </m:den>
+                            </m:f>
+                          </m:e>
+                        </m:d>
+                      </m:e>
+                      <m:sup>
+                        <m:r>
+                          <m:t>4</m:t>
+                        </m:r>
+                      </m:sup>
+                    </m:sSup>
+                  </m:oMath>
+                </a14:m>
+              </a:p>
+            </p:txBody>
+          </p:sp>
+        </mc:Choice>
+      </mc:AlternateContent>
+    </p:spTree>
+  </p:cSld>
+</p:sld>
+</file>
+
+<file path=ppt/slides/slide11.xml><?xml version="1.0" encoding="utf-8"?>
+<p:sld xmlns:a="http://schemas.openxmlformats.org/drawingml/2006/main" xmlns:r="http://schemas.openxmlformats.org/officeDocument/2006/relationships" xmlns:p="http://schemas.openxmlformats.org/presentationml/2006/main">
+  <p:cSld>
+    <p:spTree>
+      <p:nvGrpSpPr>
+        <p:cNvPr id="1" name=""/>
+        <p:cNvGrpSpPr/>
+        <p:nvPr/>
+      </p:nvGrpSpPr>
+      <p:grpSpPr>
+        <a:xfrm>
+          <a:off x="0" y="0"/>
+          <a:ext cx="0" cy="0"/>
+          <a:chOff x="0" y="0"/>
+          <a:chExt cx="0" cy="0"/>
+        </a:xfrm>
+      </p:grpSpPr>
+      <p:sp>
+        <p:nvSpPr>
+          <p:cNvPr id="2" name="Title 1"/>
+          <p:cNvSpPr>
+            <a:spLocks noGrp="1"/>
+          </p:cNvSpPr>
+          <p:nvPr>
+            <p:ph type="title"/>
+          </p:nvPr>
+        </p:nvSpPr>
+        <p:spPr/>
+        <p:txBody>
+          <a:bodyPr/>
+          <a:lstStyle/>
+          <a:p>
+            <a:pPr lvl="0" indent="0" marL="0">
+              <a:buNone/>
+            </a:pPr>
+            <a:r>
+              <a:rPr/>
+              <a:t>An alternate result</a:t>
+            </a:r>
+          </a:p>
+        </p:txBody>
+      </p:sp>
+      <p:pic>
+        <p:nvPicPr>
+          <p:cNvPr descr="fig:  ../images/tea-result-2.png" id="0" name="Picture 1"/>
+          <p:cNvPicPr>
+            <a:picLocks noGrp="1" noChangeAspect="1"/>
+          </p:cNvPicPr>
+          <p:nvPr/>
+        </p:nvPicPr>
+        <p:blipFill>
+          <a:blip r:embed="rId2"/>
+          <a:stretch>
+            <a:fillRect/>
+          </a:stretch>
+        </p:blipFill>
+        <p:spPr bwMode="auto">
+          <a:xfrm>
+            <a:off x="3479800" y="1600200"/>
+            <a:ext cx="5232400" cy="4013200"/>
+          </a:xfrm>
+          <a:prstGeom prst="rect">
+            <a:avLst/>
+          </a:prstGeom>
+          <a:noFill/>
+          <a:ln w="9525">
+            <a:noFill/>
+            <a:headEnd/>
+            <a:tailEnd/>
+          </a:ln>
+        </p:spPr>
+      </p:pic>
+      <p:sp>
+        <p:nvSpPr>
+          <p:cNvPr id="1" name="TextBox 3"/>
+          <p:cNvSpPr txBox="1"/>
+          <p:nvPr/>
+        </p:nvSpPr>
+        <p:spPr>
+          <a:xfrm>
+            <a:off x="609600" y="5613400"/>
+            <a:ext cx="10972800" cy="508000"/>
+          </a:xfrm>
+          <a:prstGeom prst="rect">
+            <a:avLst/>
+          </a:prstGeom>
+          <a:noFill/>
+        </p:spPr>
+        <p:txBody>
+          <a:bodyPr/>
+          <a:lstStyle/>
+          <a:p>
+            <a:pPr lvl="0" indent="0" marL="0" algn="ctr">
+              <a:buNone/>
+            </a:pPr>
+            <a:r>
+              <a:rPr/>
+              <a:t>Figure 6. An alternate result with one miss</a:t>
+            </a:r>
+          </a:p>
+        </p:txBody>
+      </p:sp>
+    </p:spTree>
+  </p:cSld>
+</p:sld>
+</file>
+
+<file path=ppt/slides/slide12.xml><?xml version="1.0" encoding="utf-8"?>
+<p:sld xmlns:a="http://schemas.openxmlformats.org/drawingml/2006/main" xmlns:r="http://schemas.openxmlformats.org/officeDocument/2006/relationships" xmlns:p="http://schemas.openxmlformats.org/presentationml/2006/main">
+  <p:cSld>
+    <p:spTree>
+      <p:nvGrpSpPr>
+        <p:cNvPr id="1" name=""/>
+        <p:cNvGrpSpPr/>
+        <p:nvPr/>
+      </p:nvGrpSpPr>
+      <p:grpSpPr>
+        <a:xfrm>
+          <a:off x="0" y="0"/>
+          <a:ext cx="0" cy="0"/>
+          <a:chOff x="0" y="0"/>
+          <a:chExt cx="0" cy="0"/>
+        </a:xfrm>
+      </p:grpSpPr>
+      <p:sp>
+        <p:nvSpPr>
+          <p:cNvPr id="2" name="Title 1"/>
+          <p:cNvSpPr>
+            <a:spLocks noGrp="1"/>
+          </p:cNvSpPr>
+          <p:nvPr>
+            <p:ph type="title"/>
+          </p:nvPr>
+        </p:nvSpPr>
+        <p:spPr/>
+        <p:txBody>
+          <a:bodyPr/>
+          <a:lstStyle/>
+          <a:p>
+            <a:pPr lvl="0" indent="0" marL="0">
+              <a:buNone/>
+            </a:pPr>
+            <a:r>
+              <a:rPr/>
+              <a:t>How likely is three correct results?</a:t>
+            </a:r>
+          </a:p>
+        </p:txBody>
+      </p:sp>
+      <mc:AlternateContent xmlns:mc="http://schemas.openxmlformats.org/markup-compatibility/2006">
+        <mc:Choice xmlns:a14="http://schemas.microsoft.com/office/drawing/2010/main" Requires="a14">
+          <p:sp>
+            <p:nvSpPr>
+              <p:cNvPr id="3" name="Content Placeholder 2"/>
+              <p:cNvSpPr>
+                <a:spLocks noGrp="1"/>
+              </p:cNvSpPr>
+              <p:nvPr>
+                <p:ph idx="1"/>
+              </p:nvPr>
+            </p:nvSpPr>
+            <p:spPr/>
+            <p:txBody>
+              <a:bodyPr/>
+              <a:lstStyle/>
+              <a:p>
+                <a:pPr lvl="0" indent="0" marL="0">
+                  <a:buNone/>
+                </a:pPr>
+                <a14:m>
+                  <m:oMath xmlns:m="http://schemas.openxmlformats.org/officeDocument/2006/math">
+                    <m:f>
+                      <m:fPr>
+                        <m:type m:val="bar"/>
+                      </m:fPr>
+                      <m:num>
+                        <m:r>
+                          <m:t>4</m:t>
+                        </m:r>
+                      </m:num>
+                      <m:den>
+                        <m:r>
+                          <m:t>8</m:t>
+                        </m:r>
+                      </m:den>
+                    </m:f>
+                    <m:r>
+                      <m:rPr>
+                        <m:sty m:val="p"/>
+                      </m:rPr>
+                      <m:t>×</m:t>
+                    </m:r>
+                    <m:f>
+                      <m:fPr>
+                        <m:type m:val="bar"/>
+                      </m:fPr>
+                      <m:num>
+                        <m:r>
+                          <m:t>4</m:t>
+                        </m:r>
+                      </m:num>
+                      <m:den>
+                        <m:r>
+                          <m:t>7</m:t>
+                        </m:r>
+                      </m:den>
+                    </m:f>
+                    <m:r>
+                      <m:rPr>
+                        <m:sty m:val="p"/>
+                      </m:rPr>
+                      <m:t>×</m:t>
+                    </m:r>
+                    <m:f>
+                      <m:fPr>
+                        <m:type m:val="bar"/>
+                      </m:fPr>
+                      <m:num>
+                        <m:r>
+                          <m:t>3</m:t>
+                        </m:r>
+                      </m:num>
+                      <m:den>
+                        <m:r>
+                          <m:t>6</m:t>
+                        </m:r>
+                      </m:den>
+                    </m:f>
+                    <m:r>
+                      <m:rPr>
+                        <m:sty m:val="p"/>
+                      </m:rPr>
+                      <m:t>×</m:t>
+                    </m:r>
+                    <m:f>
+                      <m:fPr>
+                        <m:type m:val="bar"/>
+                      </m:fPr>
+                      <m:num>
+                        <m:r>
+                          <m:t>2</m:t>
+                        </m:r>
+                      </m:num>
+                      <m:den>
+                        <m:r>
+                          <m:t>5</m:t>
+                        </m:r>
+                      </m:den>
+                    </m:f>
+                    <m:r>
+                      <m:rPr>
+                        <m:sty m:val="p"/>
+                      </m:rPr>
+                      <m:t>+</m:t>
+                    </m:r>
+                    <m:f>
+                      <m:fPr>
+                        <m:type m:val="bar"/>
+                      </m:fPr>
+                      <m:num>
+                        <m:r>
+                          <m:t>4</m:t>
+                        </m:r>
+                      </m:num>
+                      <m:den>
+                        <m:r>
+                          <m:t>8</m:t>
+                        </m:r>
+                      </m:den>
+                    </m:f>
+                    <m:r>
+                      <m:rPr>
+                        <m:sty m:val="p"/>
+                      </m:rPr>
+                      <m:t>×</m:t>
+                    </m:r>
+                    <m:f>
+                      <m:fPr>
+                        <m:type m:val="bar"/>
+                      </m:fPr>
+                      <m:num>
+                        <m:r>
+                          <m:t>4</m:t>
+                        </m:r>
+                      </m:num>
+                      <m:den>
+                        <m:r>
+                          <m:t>7</m:t>
+                        </m:r>
+                      </m:den>
+                    </m:f>
+                    <m:r>
+                      <m:rPr>
+                        <m:sty m:val="p"/>
+                      </m:rPr>
+                      <m:t>×</m:t>
+                    </m:r>
+                    <m:f>
+                      <m:fPr>
+                        <m:type m:val="bar"/>
+                      </m:fPr>
+                      <m:num>
+                        <m:r>
+                          <m:t>3</m:t>
+                        </m:r>
+                      </m:num>
+                      <m:den>
+                        <m:r>
+                          <m:t>6</m:t>
+                        </m:r>
+                      </m:den>
+                    </m:f>
+                    <m:r>
+                      <m:rPr>
+                        <m:sty m:val="p"/>
+                      </m:rPr>
+                      <m:t>×</m:t>
+                    </m:r>
+                    <m:f>
+                      <m:fPr>
+                        <m:type m:val="bar"/>
+                      </m:fPr>
+                      <m:num>
+                        <m:r>
+                          <m:t>2</m:t>
+                        </m:r>
+                      </m:num>
+                      <m:den>
+                        <m:r>
+                          <m:t>5</m:t>
+                        </m:r>
+                      </m:den>
+                    </m:f>
+                    <m:r>
+                      <m:rPr>
+                        <m:sty m:val="p"/>
+                      </m:rPr>
+                      <m:t>+</m:t>
+                    </m:r>
+                    <m:r>
+                      <m:rPr>
+                        <m:sty m:val="p"/>
+                      </m:rPr>
+                      <m:t>.</m:t>
+                    </m:r>
+                    <m:r>
+                      <m:rPr>
+                        <m:sty m:val="p"/>
+                      </m:rPr>
+                      <m:t>.</m:t>
+                    </m:r>
+                    <m:r>
+                      <m:rPr>
+                        <m:sty m:val="p"/>
+                      </m:rPr>
+                      <m:t>.</m:t>
+                    </m:r>
+                  </m:oMath>
+                </a14:m>
+              </a:p>
+              <a:p>
+                <a:pPr lvl="0" indent="0" marL="0">
+                  <a:buNone/>
+                </a:pPr>
+                <a:r>
+                  <a:rPr/>
+                  <a:t>Too messy! Use the hypergeometric distribution. Note: this is NOT a binomial distribution.</a:t>
                 </a:r>
               </a:p>
             </p:txBody>
           </p:sp>
         </mc:Choice>
       </mc:AlternateContent>
+    </p:spTree>
+  </p:cSld>
+</p:sld>
+</file>
+
+<file path=ppt/slides/slide13.xml><?xml version="1.0" encoding="utf-8"?>
+<p:sld xmlns:a="http://schemas.openxmlformats.org/drawingml/2006/main" xmlns:r="http://schemas.openxmlformats.org/officeDocument/2006/relationships" xmlns:p="http://schemas.openxmlformats.org/presentationml/2006/main">
+  <p:cSld>
+    <p:spTree>
+      <p:nvGrpSpPr>
+        <p:cNvPr id="1" name=""/>
+        <p:cNvGrpSpPr/>
+        <p:nvPr/>
+      </p:nvGrpSpPr>
+      <p:grpSpPr>
+        <a:xfrm>
+          <a:off x="0" y="0"/>
+          <a:ext cx="0" cy="0"/>
+          <a:chOff x="0" y="0"/>
+          <a:chExt cx="0" cy="0"/>
+        </a:xfrm>
+      </p:grpSpPr>
+      <p:sp>
+        <p:nvSpPr>
+          <p:cNvPr id="2" name="Title 1"/>
+          <p:cNvSpPr>
+            <a:spLocks noGrp="1"/>
+          </p:cNvSpPr>
+          <p:nvPr>
+            <p:ph type="title"/>
+          </p:nvPr>
+        </p:nvSpPr>
+        <p:spPr/>
+        <p:txBody>
+          <a:bodyPr/>
+          <a:lstStyle/>
+          <a:p>
+            <a:pPr lvl="0" indent="0" marL="0">
+              <a:buNone/>
+            </a:pPr>
+            <a:r>
+              <a:rPr/>
+              <a:t>Balls in an urn analogy</a:t>
+            </a:r>
+          </a:p>
+        </p:txBody>
+      </p:sp>
+      <p:sp>
+        <p:nvSpPr>
+          <p:cNvPr id="3" name="Content Placeholder 2"/>
+          <p:cNvSpPr>
+            <a:spLocks noGrp="1"/>
+          </p:cNvSpPr>
+          <p:nvPr>
+            <p:ph idx="1"/>
+          </p:nvPr>
+        </p:nvSpPr>
+        <p:spPr/>
+        <p:txBody>
+          <a:bodyPr/>
+          <a:lstStyle/>
+          <a:p>
+            <a:pPr lvl="0" indent="0">
+              <a:buNone/>
+            </a:pPr>
+            <a:r>
+              <a:rPr>
+                <a:latin typeface="Courier"/>
+              </a:rPr>
+              <a:t>
+ |    W           |
+ |       B        |
+ |  B        B    |
+ |          W     |
+ |     W       B  |
+ |        W       |
+ __________________
+</a:t>
+            </a:r>
+          </a:p>
+        </p:txBody>
+      </p:sp>
+    </p:spTree>
+  </p:cSld>
+</p:sld>
+</file>
+
+<file path=ppt/slides/slide14.xml><?xml version="1.0" encoding="utf-8"?>
+<p:sld xmlns:a="http://schemas.openxmlformats.org/drawingml/2006/main" xmlns:r="http://schemas.openxmlformats.org/officeDocument/2006/relationships" xmlns:p="http://schemas.openxmlformats.org/presentationml/2006/main">
+  <p:cSld>
+    <p:spTree>
+      <p:nvGrpSpPr>
+        <p:cNvPr id="1" name=""/>
+        <p:cNvGrpSpPr/>
+        <p:nvPr/>
+      </p:nvGrpSpPr>
+      <p:grpSpPr>
+        <a:xfrm>
+          <a:off x="0" y="0"/>
+          <a:ext cx="0" cy="0"/>
+          <a:chOff x="0" y="0"/>
+          <a:chExt cx="0" cy="0"/>
+        </a:xfrm>
+      </p:grpSpPr>
+      <p:sp>
+        <p:nvSpPr>
+          <p:cNvPr id="2" name="Title 1"/>
+          <p:cNvSpPr>
+            <a:spLocks noGrp="1"/>
+          </p:cNvSpPr>
+          <p:nvPr>
+            <p:ph type="title"/>
+          </p:nvPr>
+        </p:nvSpPr>
+        <p:spPr/>
+        <p:txBody>
+          <a:bodyPr/>
+          <a:lstStyle/>
+          <a:p>
+            <a:pPr lvl="0" indent="0" marL="0">
+              <a:buNone/>
+            </a:pPr>
+            <a:r>
+              <a:rPr/>
+              <a:t>Use the hypergeometric distribution</a:t>
+            </a:r>
+          </a:p>
+        </p:txBody>
+      </p:sp>
+      <p:sp>
+        <p:nvSpPr>
+          <p:cNvPr id="3" name="Content Placeholder 2"/>
+          <p:cNvSpPr>
+            <a:spLocks noGrp="1"/>
+          </p:cNvSpPr>
+          <p:nvPr>
+            <p:ph idx="1"/>
+          </p:nvPr>
+        </p:nvSpPr>
+        <p:spPr/>
+        <p:txBody>
+          <a:bodyPr/>
+          <a:lstStyle/>
+          <a:p>
+            <a:pPr lvl="0"/>
+            <a:r>
+              <a:rPr/>
+              <a:t>SAS: PDF(‘HYPER’, 3, 8, 4, 4)</a:t>
+            </a:r>
+          </a:p>
+          <a:p>
+            <a:pPr lvl="0"/>
+            <a:r>
+              <a:rPr/>
+              <a:t>R: dhyper(3, 4, 4, 4)</a:t>
+            </a:r>
+          </a:p>
+          <a:p>
+            <a:pPr lvl="0"/>
+            <a:r>
+              <a:rPr/>
+              <a:t>Stata: dis hypergeometricp(8, 4, 4, 3)</a:t>
+            </a:r>
+          </a:p>
+          <a:p>
+            <a:pPr lvl="0"/>
+            <a:r>
+              <a:rPr/>
+              <a:t>SPSS: PDF.HYPER(3, 8, 4, 4)</a:t>
+            </a:r>
+          </a:p>
+        </p:txBody>
+      </p:sp>
+    </p:spTree>
+  </p:cSld>
+</p:sld>
+</file>
+
+<file path=ppt/slides/slide15.xml><?xml version="1.0" encoding="utf-8"?>
+<p:sld xmlns:a="http://schemas.openxmlformats.org/drawingml/2006/main" xmlns:r="http://schemas.openxmlformats.org/officeDocument/2006/relationships" xmlns:p="http://schemas.openxmlformats.org/presentationml/2006/main">
+  <p:cSld>
+    <p:spTree>
+      <p:nvGrpSpPr>
+        <p:cNvPr id="1" name=""/>
+        <p:cNvGrpSpPr/>
+        <p:nvPr/>
+      </p:nvGrpSpPr>
+      <p:grpSpPr>
+        <a:xfrm>
+          <a:off x="0" y="0"/>
+          <a:ext cx="0" cy="0"/>
+          <a:chOff x="0" y="0"/>
+          <a:chExt cx="0" cy="0"/>
+        </a:xfrm>
+      </p:grpSpPr>
+      <p:sp>
+        <p:nvSpPr>
+          <p:cNvPr id="2" name="Title 1"/>
+          <p:cNvSpPr>
+            <a:spLocks noGrp="1"/>
+          </p:cNvSpPr>
+          <p:nvPr>
+            <p:ph type="title"/>
+          </p:nvPr>
+        </p:nvSpPr>
+        <p:spPr/>
+        <p:txBody>
+          <a:bodyPr/>
+          <a:lstStyle/>
+          <a:p>
+            <a:pPr lvl="0" indent="0" marL="0">
+              <a:buNone/>
+            </a:pPr>
+            <a:r>
+              <a:rPr/>
+              <a:t>Use the hypergeometric distribution</a:t>
+            </a:r>
+          </a:p>
+        </p:txBody>
+      </p:sp>
+      <p:sp>
+        <p:nvSpPr>
+          <p:cNvPr id="3" name="Content Placeholder 2"/>
+          <p:cNvSpPr>
+            <a:spLocks noGrp="1"/>
+          </p:cNvSpPr>
+          <p:nvPr>
+            <p:ph idx="1"/>
+          </p:nvPr>
+        </p:nvSpPr>
+        <p:spPr/>
+        <p:txBody>
+          <a:bodyPr/>
+          <a:lstStyle/>
+          <a:p>
+            <a:pPr lvl="0"/>
+            <a:r>
+              <a:rPr/>
+              <a:t>W=# of white balls in the urn</a:t>
+            </a:r>
+          </a:p>
+          <a:p>
+            <a:pPr lvl="0"/>
+            <a:r>
+              <a:rPr/>
+              <a:t>B=# of black balls in the urn</a:t>
+            </a:r>
+          </a:p>
+          <a:p>
+            <a:pPr lvl="0"/>
+            <a:r>
+              <a:rPr/>
+              <a:t>N=W+B=# of balls total in the urn</a:t>
+            </a:r>
+          </a:p>
+          <a:p>
+            <a:pPr lvl="0"/>
+            <a:r>
+              <a:rPr/>
+              <a:t>d=# of balls drawn from the urn</a:t>
+            </a:r>
+          </a:p>
+          <a:p>
+            <a:pPr lvl="0"/>
+            <a:r>
+              <a:rPr/>
+              <a:t>x=# of drawn balls that are white</a:t>
+            </a:r>
+          </a:p>
+          <a:p>
+            <a:pPr lvl="1"/>
+            <a:r>
+              <a:rPr/>
+              <a:t>SAS: PDF(‘HYPER’, x, N, W, d)</a:t>
+            </a:r>
+          </a:p>
+          <a:p>
+            <a:pPr lvl="1"/>
+            <a:r>
+              <a:rPr/>
+              <a:t>R: dhyper(x, W, B, d)</a:t>
+            </a:r>
+          </a:p>
+          <a:p>
+            <a:pPr lvl="1"/>
+            <a:r>
+              <a:rPr/>
+              <a:t>Stata: dis hypergeometricp(N, W, d, x)</a:t>
+            </a:r>
+          </a:p>
+          <a:p>
+            <a:pPr lvl="1"/>
+            <a:r>
+              <a:rPr/>
+              <a:t>SPSS: PDF.HYPER(x, N, W, D)</a:t>
+            </a:r>
+          </a:p>
+        </p:txBody>
+      </p:sp>
+    </p:spTree>
+  </p:cSld>
+</p:sld>
+</file>
+
+<file path=ppt/slides/slide16.xml><?xml version="1.0" encoding="utf-8"?>
+<p:sld xmlns:a="http://schemas.openxmlformats.org/drawingml/2006/main" xmlns:r="http://schemas.openxmlformats.org/officeDocument/2006/relationships" xmlns:p="http://schemas.openxmlformats.org/presentationml/2006/main">
+  <p:cSld>
+    <p:spTree>
+      <p:nvGrpSpPr>
+        <p:cNvPr id="1" name=""/>
+        <p:cNvGrpSpPr/>
+        <p:nvPr/>
+      </p:nvGrpSpPr>
+      <p:grpSpPr>
+        <a:xfrm>
+          <a:off x="0" y="0"/>
+          <a:ext cx="0" cy="0"/>
+          <a:chOff x="0" y="0"/>
+          <a:chExt cx="0" cy="0"/>
+        </a:xfrm>
+      </p:grpSpPr>
+      <p:sp>
+        <p:nvSpPr>
+          <p:cNvPr id="2" name="Title 1"/>
+          <p:cNvSpPr>
+            <a:spLocks noGrp="1"/>
+          </p:cNvSpPr>
+          <p:nvPr>
+            <p:ph type="title"/>
+          </p:nvPr>
+        </p:nvSpPr>
+        <p:spPr/>
+        <p:txBody>
+          <a:bodyPr/>
+          <a:lstStyle/>
+          <a:p>
+            <a:pPr lvl="0" indent="0" marL="0">
+              <a:buNone/>
+            </a:pPr>
+            <a:r>
+              <a:rPr/>
+              <a:t>Fisher’s Exact Test in SPSS (1/4)</a:t>
+            </a:r>
+          </a:p>
+        </p:txBody>
+      </p:sp>
+      <p:pic>
+        <p:nvPicPr>
+          <p:cNvPr descr="fig:  ../images/spss-data.png" id="0" name="Picture 1"/>
+          <p:cNvPicPr>
+            <a:picLocks noGrp="1" noChangeAspect="1"/>
+          </p:cNvPicPr>
+          <p:nvPr/>
+        </p:nvPicPr>
+        <p:blipFill>
+          <a:blip r:embed="rId2"/>
+          <a:stretch>
+            <a:fillRect/>
+          </a:stretch>
+        </p:blipFill>
+        <p:spPr bwMode="auto">
+          <a:xfrm>
+            <a:off x="3581400" y="1600200"/>
+            <a:ext cx="5029200" cy="4013200"/>
+          </a:xfrm>
+          <a:prstGeom prst="rect">
+            <a:avLst/>
+          </a:prstGeom>
+          <a:noFill/>
+          <a:ln w="9525">
+            <a:noFill/>
+            <a:headEnd/>
+            <a:tailEnd/>
+          </a:ln>
+        </p:spPr>
+      </p:pic>
+      <p:sp>
+        <p:nvSpPr>
+          <p:cNvPr id="1" name="TextBox 3"/>
+          <p:cNvSpPr txBox="1"/>
+          <p:nvPr/>
+        </p:nvSpPr>
+        <p:spPr>
+          <a:xfrm>
+            <a:off x="609600" y="5613400"/>
+            <a:ext cx="10972800" cy="508000"/>
+          </a:xfrm>
+          <a:prstGeom prst="rect">
+            <a:avLst/>
+          </a:prstGeom>
+          <a:noFill/>
+        </p:spPr>
+        <p:txBody>
+          <a:bodyPr/>
+          <a:lstStyle/>
+          <a:p>
+            <a:pPr lvl="0" indent="0" marL="0" algn="ctr">
+              <a:buNone/>
+            </a:pPr>
+            <a:r>
+              <a:rPr/>
+              <a:t>Figure 7. SPSS Dialog box</a:t>
+            </a:r>
+          </a:p>
+        </p:txBody>
+      </p:sp>
+    </p:spTree>
+  </p:cSld>
+</p:sld>
+</file>
+
+<file path=ppt/slides/slide17.xml><?xml version="1.0" encoding="utf-8"?>
+<p:sld xmlns:a="http://schemas.openxmlformats.org/drawingml/2006/main" xmlns:r="http://schemas.openxmlformats.org/officeDocument/2006/relationships" xmlns:p="http://schemas.openxmlformats.org/presentationml/2006/main">
+  <p:cSld>
+    <p:spTree>
+      <p:nvGrpSpPr>
+        <p:cNvPr id="1" name=""/>
+        <p:cNvGrpSpPr/>
+        <p:nvPr/>
+      </p:nvGrpSpPr>
+      <p:grpSpPr>
+        <a:xfrm>
+          <a:off x="0" y="0"/>
+          <a:ext cx="0" cy="0"/>
+          <a:chOff x="0" y="0"/>
+          <a:chExt cx="0" cy="0"/>
+        </a:xfrm>
+      </p:grpSpPr>
+      <p:sp>
+        <p:nvSpPr>
+          <p:cNvPr id="2" name="Title 1"/>
+          <p:cNvSpPr>
+            <a:spLocks noGrp="1"/>
+          </p:cNvSpPr>
+          <p:nvPr>
+            <p:ph type="title"/>
+          </p:nvPr>
+        </p:nvSpPr>
+        <p:spPr/>
+        <p:txBody>
+          <a:bodyPr/>
+          <a:lstStyle/>
+          <a:p>
+            <a:pPr lvl="0" indent="0" marL="0">
+              <a:buNone/>
+            </a:pPr>
+            <a:r>
+              <a:rPr/>
+              <a:t>Fisher’s Exact Test in SPSS (2/4)</a:t>
+            </a:r>
+          </a:p>
+        </p:txBody>
+      </p:sp>
+      <p:pic>
+        <p:nvPicPr>
+          <p:cNvPr descr="fig:  ../images/spss-dialog-box-1.png" id="0" name="Picture 1"/>
+          <p:cNvPicPr>
+            <a:picLocks noGrp="1" noChangeAspect="1"/>
+          </p:cNvPicPr>
+          <p:nvPr/>
+        </p:nvPicPr>
+        <p:blipFill>
+          <a:blip r:embed="rId2"/>
+          <a:stretch>
+            <a:fillRect/>
+          </a:stretch>
+        </p:blipFill>
+        <p:spPr bwMode="auto">
+          <a:xfrm>
+            <a:off x="3644900" y="1600200"/>
+            <a:ext cx="4914900" cy="4013200"/>
+          </a:xfrm>
+          <a:prstGeom prst="rect">
+            <a:avLst/>
+          </a:prstGeom>
+          <a:noFill/>
+          <a:ln w="9525">
+            <a:noFill/>
+            <a:headEnd/>
+            <a:tailEnd/>
+          </a:ln>
+        </p:spPr>
+      </p:pic>
+      <p:sp>
+        <p:nvSpPr>
+          <p:cNvPr id="1" name="TextBox 3"/>
+          <p:cNvSpPr txBox="1"/>
+          <p:nvPr/>
+        </p:nvSpPr>
+        <p:spPr>
+          <a:xfrm>
+            <a:off x="609600" y="5613400"/>
+            <a:ext cx="10972800" cy="508000"/>
+          </a:xfrm>
+          <a:prstGeom prst="rect">
+            <a:avLst/>
+          </a:prstGeom>
+          <a:noFill/>
+        </p:spPr>
+        <p:txBody>
+          <a:bodyPr/>
+          <a:lstStyle/>
+          <a:p>
+            <a:pPr lvl="0" indent="0" marL="0" algn="ctr">
+              <a:buNone/>
+            </a:pPr>
+            <a:r>
+              <a:rPr/>
+              <a:t>Figure 7. SPSS Dialog box</a:t>
+            </a:r>
+          </a:p>
+        </p:txBody>
+      </p:sp>
+    </p:spTree>
+  </p:cSld>
+</p:sld>
+</file>
+
+<file path=ppt/slides/slide18.xml><?xml version="1.0" encoding="utf-8"?>
+<p:sld xmlns:a="http://schemas.openxmlformats.org/drawingml/2006/main" xmlns:r="http://schemas.openxmlformats.org/officeDocument/2006/relationships" xmlns:p="http://schemas.openxmlformats.org/presentationml/2006/main">
+  <p:cSld>
+    <p:spTree>
+      <p:nvGrpSpPr>
+        <p:cNvPr id="1" name=""/>
+        <p:cNvGrpSpPr/>
+        <p:nvPr/>
+      </p:nvGrpSpPr>
+      <p:grpSpPr>
+        <a:xfrm>
+          <a:off x="0" y="0"/>
+          <a:ext cx="0" cy="0"/>
+          <a:chOff x="0" y="0"/>
+          <a:chExt cx="0" cy="0"/>
+        </a:xfrm>
+      </p:grpSpPr>
+      <p:sp>
+        <p:nvSpPr>
+          <p:cNvPr id="2" name="Title 1"/>
+          <p:cNvSpPr>
+            <a:spLocks noGrp="1"/>
+          </p:cNvSpPr>
+          <p:nvPr>
+            <p:ph type="title"/>
+          </p:nvPr>
+        </p:nvSpPr>
+        <p:spPr/>
+        <p:txBody>
+          <a:bodyPr/>
+          <a:lstStyle/>
+          <a:p>
+            <a:pPr lvl="0" indent="0" marL="0">
+              <a:buNone/>
+            </a:pPr>
+            <a:r>
+              <a:rPr/>
+              <a:t>Fisher’s Exact Test in SPSS (3/4)</a:t>
+            </a:r>
+          </a:p>
+        </p:txBody>
+      </p:sp>
+      <p:pic>
+        <p:nvPicPr>
+          <p:cNvPr descr="fig:  ../images/spss-dialog-box-2.png" id="0" name="Picture 1"/>
+          <p:cNvPicPr>
+            <a:picLocks noGrp="1" noChangeAspect="1"/>
+          </p:cNvPicPr>
+          <p:nvPr/>
+        </p:nvPicPr>
+        <p:blipFill>
+          <a:blip r:embed="rId2"/>
+          <a:stretch>
+            <a:fillRect/>
+          </a:stretch>
+        </p:blipFill>
+        <p:spPr bwMode="auto">
+          <a:xfrm>
+            <a:off x="3644900" y="1600200"/>
+            <a:ext cx="4914900" cy="4013200"/>
+          </a:xfrm>
+          <a:prstGeom prst="rect">
+            <a:avLst/>
+          </a:prstGeom>
+          <a:noFill/>
+          <a:ln w="9525">
+            <a:noFill/>
+            <a:headEnd/>
+            <a:tailEnd/>
+          </a:ln>
+        </p:spPr>
+      </p:pic>
+      <p:sp>
+        <p:nvSpPr>
+          <p:cNvPr id="1" name="TextBox 3"/>
+          <p:cNvSpPr txBox="1"/>
+          <p:nvPr/>
+        </p:nvSpPr>
+        <p:spPr>
+          <a:xfrm>
+            <a:off x="609600" y="5613400"/>
+            <a:ext cx="10972800" cy="508000"/>
+          </a:xfrm>
+          <a:prstGeom prst="rect">
+            <a:avLst/>
+          </a:prstGeom>
+          <a:noFill/>
+        </p:spPr>
+        <p:txBody>
+          <a:bodyPr/>
+          <a:lstStyle/>
+          <a:p>
+            <a:pPr lvl="0" indent="0" marL="0" algn="ctr">
+              <a:buNone/>
+            </a:pPr>
+            <a:r>
+              <a:rPr/>
+              <a:t>Figure 7. SPSS Dialog box</a:t>
+            </a:r>
+          </a:p>
+        </p:txBody>
+      </p:sp>
+    </p:spTree>
+  </p:cSld>
+</p:sld>
+</file>
+
+<file path=ppt/slides/slide19.xml><?xml version="1.0" encoding="utf-8"?>
+<p:sld xmlns:a="http://schemas.openxmlformats.org/drawingml/2006/main" xmlns:r="http://schemas.openxmlformats.org/officeDocument/2006/relationships" xmlns:p="http://schemas.openxmlformats.org/presentationml/2006/main">
+  <p:cSld>
+    <p:spTree>
+      <p:nvGrpSpPr>
+        <p:cNvPr id="1" name=""/>
+        <p:cNvGrpSpPr/>
+        <p:nvPr/>
+      </p:nvGrpSpPr>
+      <p:grpSpPr>
+        <a:xfrm>
+          <a:off x="0" y="0"/>
+          <a:ext cx="0" cy="0"/>
+          <a:chOff x="0" y="0"/>
+          <a:chExt cx="0" cy="0"/>
+        </a:xfrm>
+      </p:grpSpPr>
+      <p:sp>
+        <p:nvSpPr>
+          <p:cNvPr id="2" name="Title 1"/>
+          <p:cNvSpPr>
+            <a:spLocks noGrp="1"/>
+          </p:cNvSpPr>
+          <p:nvPr>
+            <p:ph type="title"/>
+          </p:nvPr>
+        </p:nvSpPr>
+        <p:spPr/>
+        <p:txBody>
+          <a:bodyPr/>
+          <a:lstStyle/>
+          <a:p>
+            <a:pPr lvl="0" indent="0" marL="0">
+              <a:buNone/>
+            </a:pPr>
+            <a:r>
+              <a:rPr/>
+              <a:t>Fisher’s Exact Test in SPSS (4/4)</a:t>
+            </a:r>
+          </a:p>
+        </p:txBody>
+      </p:sp>
+      <p:pic>
+        <p:nvPicPr>
+          <p:cNvPr descr="fig:  ../images/spss-output.png" id="0" name="Picture 1"/>
+          <p:cNvPicPr>
+            <a:picLocks noGrp="1" noChangeAspect="1"/>
+          </p:cNvPicPr>
+          <p:nvPr/>
+        </p:nvPicPr>
+        <p:blipFill>
+          <a:blip r:embed="rId2"/>
+          <a:stretch>
+            <a:fillRect/>
+          </a:stretch>
+        </p:blipFill>
+        <p:spPr bwMode="auto">
+          <a:xfrm>
+            <a:off x="3657600" y="1600200"/>
+            <a:ext cx="4876800" cy="4013200"/>
+          </a:xfrm>
+          <a:prstGeom prst="rect">
+            <a:avLst/>
+          </a:prstGeom>
+          <a:noFill/>
+          <a:ln w="9525">
+            <a:noFill/>
+            <a:headEnd/>
+            <a:tailEnd/>
+          </a:ln>
+        </p:spPr>
+      </p:pic>
+      <p:sp>
+        <p:nvSpPr>
+          <p:cNvPr id="1" name="TextBox 3"/>
+          <p:cNvSpPr txBox="1"/>
+          <p:nvPr/>
+        </p:nvSpPr>
+        <p:spPr>
+          <a:xfrm>
+            <a:off x="609600" y="5613400"/>
+            <a:ext cx="10972800" cy="508000"/>
+          </a:xfrm>
+          <a:prstGeom prst="rect">
+            <a:avLst/>
+          </a:prstGeom>
+          <a:noFill/>
+        </p:spPr>
+        <p:txBody>
+          <a:bodyPr/>
+          <a:lstStyle/>
+          <a:p>
+            <a:pPr lvl="0" indent="0" marL="0" algn="ctr">
+              <a:buNone/>
+            </a:pPr>
+            <a:r>
+              <a:rPr/>
+              <a:t>Figure 7. SPSS output box</a:t>
+            </a:r>
+          </a:p>
+        </p:txBody>
+      </p:sp>
     </p:spTree>
   </p:cSld>
 </p:sld>
@@ -4146,6 +5593,584 @@
           </a:ln>
         </p:spPr>
       </p:pic>
+    </p:spTree>
+  </p:cSld>
+</p:sld>
+</file>
+
+<file path=ppt/slides/slide20.xml><?xml version="1.0" encoding="utf-8"?>
+<p:sld xmlns:a="http://schemas.openxmlformats.org/drawingml/2006/main" xmlns:r="http://schemas.openxmlformats.org/officeDocument/2006/relationships" xmlns:p="http://schemas.openxmlformats.org/presentationml/2006/main">
+  <p:cSld>
+    <p:spTree>
+      <p:nvGrpSpPr>
+        <p:cNvPr id="1" name=""/>
+        <p:cNvGrpSpPr/>
+        <p:nvPr/>
+      </p:nvGrpSpPr>
+      <p:grpSpPr>
+        <a:xfrm>
+          <a:off x="0" y="0"/>
+          <a:ext cx="0" cy="0"/>
+          <a:chOff x="0" y="0"/>
+          <a:chExt cx="0" cy="0"/>
+        </a:xfrm>
+      </p:grpSpPr>
+      <p:sp>
+        <p:nvSpPr>
+          <p:cNvPr id="2" name="Title 1"/>
+          <p:cNvSpPr>
+            <a:spLocks noGrp="1"/>
+          </p:cNvSpPr>
+          <p:nvPr>
+            <p:ph type="title"/>
+          </p:nvPr>
+        </p:nvSpPr>
+        <p:spPr/>
+        <p:txBody>
+          <a:bodyPr/>
+          <a:lstStyle/>
+          <a:p>
+            <a:pPr lvl="0" indent="0" marL="0">
+              <a:buNone/>
+            </a:pPr>
+            <a:r>
+              <a:rPr/>
+              <a:t>Fisher’s Exact Test in R (1/2)</a:t>
+            </a:r>
+          </a:p>
+        </p:txBody>
+      </p:sp>
+      <p:sp>
+        <p:nvSpPr>
+          <p:cNvPr id="3" name="Content Placeholder 2"/>
+          <p:cNvSpPr>
+            <a:spLocks noGrp="1"/>
+          </p:cNvSpPr>
+          <p:nvPr>
+            <p:ph idx="1"/>
+          </p:nvPr>
+        </p:nvSpPr>
+        <p:spPr/>
+        <p:txBody>
+          <a:bodyPr/>
+          <a:lstStyle/>
+          <a:p>
+            <a:pPr lvl="0" indent="0">
+              <a:buNone/>
+            </a:pPr>
+            <a:r>
+              <a:rPr>
+                <a:latin typeface="Courier"/>
+              </a:rPr>
+              <a:t>labs &lt;- c(
+  "Milk first",
+  "Tea first")
+guess &lt;- c(1, 2, 1, 2, 2, 2, 1, 1) 
+truth &lt;- c(2, 2, 1, 2, 2, 1, 1, 1)
+fisher.test(
+  factor(guess, labels=labs), 
+  factor(truth, labels=labs))</a:t>
+            </a:r>
+          </a:p>
+        </p:txBody>
+      </p:sp>
+    </p:spTree>
+  </p:cSld>
+</p:sld>
+</file>
+
+<file path=ppt/slides/slide21.xml><?xml version="1.0" encoding="utf-8"?>
+<p:sld xmlns:a="http://schemas.openxmlformats.org/drawingml/2006/main" xmlns:r="http://schemas.openxmlformats.org/officeDocument/2006/relationships" xmlns:p="http://schemas.openxmlformats.org/presentationml/2006/main">
+  <p:cSld>
+    <p:spTree>
+      <p:nvGrpSpPr>
+        <p:cNvPr id="1" name=""/>
+        <p:cNvGrpSpPr/>
+        <p:nvPr/>
+      </p:nvGrpSpPr>
+      <p:grpSpPr>
+        <a:xfrm>
+          <a:off x="0" y="0"/>
+          <a:ext cx="0" cy="0"/>
+          <a:chOff x="0" y="0"/>
+          <a:chExt cx="0" cy="0"/>
+        </a:xfrm>
+      </p:grpSpPr>
+      <p:sp>
+        <p:nvSpPr>
+          <p:cNvPr id="2" name="Title 1"/>
+          <p:cNvSpPr>
+            <a:spLocks noGrp="1"/>
+          </p:cNvSpPr>
+          <p:nvPr>
+            <p:ph type="title"/>
+          </p:nvPr>
+        </p:nvSpPr>
+        <p:spPr/>
+        <p:txBody>
+          <a:bodyPr/>
+          <a:lstStyle/>
+          <a:p>
+            <a:pPr lvl="0" indent="0" marL="0">
+              <a:buNone/>
+            </a:pPr>
+            <a:r>
+              <a:rPr/>
+              <a:t>Fisher’s Exact Test in R (2/2)</a:t>
+            </a:r>
+          </a:p>
+        </p:txBody>
+      </p:sp>
+      <p:sp>
+        <p:nvSpPr>
+          <p:cNvPr id="3" name="Content Placeholder 2"/>
+          <p:cNvSpPr>
+            <a:spLocks noGrp="1"/>
+          </p:cNvSpPr>
+          <p:nvPr>
+            <p:ph idx="1"/>
+          </p:nvPr>
+        </p:nvSpPr>
+        <p:spPr/>
+        <p:txBody>
+          <a:bodyPr/>
+          <a:lstStyle/>
+          <a:p>
+            <a:pPr lvl="0" indent="0">
+              <a:buNone/>
+            </a:pPr>
+            <a:r>
+              <a:rPr>
+                <a:latin typeface="Courier"/>
+              </a:rPr>
+              <a:t>p-value = 0.4857
+alternative hypothesis: true odds ratio is not equal to 1
+95 percent confidence interval:
+   0.2117329 621.9337505
+sample estimates:
+odds ratio 
+  6.408309 </a:t>
+            </a:r>
+          </a:p>
+        </p:txBody>
+      </p:sp>
+    </p:spTree>
+  </p:cSld>
+</p:sld>
+</file>
+
+<file path=ppt/slides/slide22.xml><?xml version="1.0" encoding="utf-8"?>
+<p:sld xmlns:a="http://schemas.openxmlformats.org/drawingml/2006/main" xmlns:r="http://schemas.openxmlformats.org/officeDocument/2006/relationships" xmlns:p="http://schemas.openxmlformats.org/presentationml/2006/main">
+  <p:cSld>
+    <p:spTree>
+      <p:nvGrpSpPr>
+        <p:cNvPr id="1" name=""/>
+        <p:cNvGrpSpPr/>
+        <p:nvPr/>
+      </p:nvGrpSpPr>
+      <p:grpSpPr>
+        <a:xfrm>
+          <a:off x="0" y="0"/>
+          <a:ext cx="0" cy="0"/>
+          <a:chOff x="0" y="0"/>
+          <a:chExt cx="0" cy="0"/>
+        </a:xfrm>
+      </p:grpSpPr>
+      <p:sp>
+        <p:nvSpPr>
+          <p:cNvPr id="2" name="Title 1"/>
+          <p:cNvSpPr>
+            <a:spLocks noGrp="1"/>
+          </p:cNvSpPr>
+          <p:nvPr>
+            <p:ph type="title"/>
+          </p:nvPr>
+        </p:nvSpPr>
+        <p:spPr/>
+        <p:txBody>
+          <a:bodyPr/>
+          <a:lstStyle/>
+          <a:p>
+            <a:pPr lvl="0" indent="0" marL="0">
+              <a:buNone/>
+            </a:pPr>
+            <a:r>
+              <a:rPr/>
+              <a:t>Fisher’s Exact Test in Stata</a:t>
+            </a:r>
+          </a:p>
+        </p:txBody>
+      </p:sp>
+      <p:sp>
+        <p:nvSpPr>
+          <p:cNvPr id="3" name="Content Placeholder 2"/>
+          <p:cNvSpPr>
+            <a:spLocks noGrp="1"/>
+          </p:cNvSpPr>
+          <p:nvPr>
+            <p:ph idx="1"/>
+          </p:nvPr>
+        </p:nvSpPr>
+        <p:spPr/>
+        <p:txBody>
+          <a:bodyPr/>
+          <a:lstStyle/>
+          <a:p>
+            <a:pPr lvl="0" indent="0">
+              <a:buNone/>
+            </a:pPr>
+            <a:r>
+              <a:rPr>
+                <a:latin typeface="Courier"/>
+              </a:rPr>
+              <a:t>. tabulate guess truth, exact
+           Fisher's exact =                 0.486
+   1-sided Fisher's exact =                 0.243</a:t>
+            </a:r>
+          </a:p>
+        </p:txBody>
+      </p:sp>
+    </p:spTree>
+  </p:cSld>
+</p:sld>
+</file>
+
+<file path=ppt/slides/slide23.xml><?xml version="1.0" encoding="utf-8"?>
+<p:sld xmlns:a="http://schemas.openxmlformats.org/drawingml/2006/main" xmlns:r="http://schemas.openxmlformats.org/officeDocument/2006/relationships" xmlns:p="http://schemas.openxmlformats.org/presentationml/2006/main">
+  <p:cSld>
+    <p:spTree>
+      <p:nvGrpSpPr>
+        <p:cNvPr id="1" name=""/>
+        <p:cNvGrpSpPr/>
+        <p:nvPr/>
+      </p:nvGrpSpPr>
+      <p:grpSpPr>
+        <a:xfrm>
+          <a:off x="0" y="0"/>
+          <a:ext cx="0" cy="0"/>
+          <a:chOff x="0" y="0"/>
+          <a:chExt cx="0" cy="0"/>
+        </a:xfrm>
+      </p:grpSpPr>
+      <p:sp>
+        <p:nvSpPr>
+          <p:cNvPr id="2" name="Title 1"/>
+          <p:cNvSpPr>
+            <a:spLocks noGrp="1"/>
+          </p:cNvSpPr>
+          <p:nvPr>
+            <p:ph type="title"/>
+          </p:nvPr>
+        </p:nvSpPr>
+        <p:spPr/>
+        <p:txBody>
+          <a:bodyPr/>
+          <a:lstStyle/>
+          <a:p>
+            <a:pPr lvl="0" indent="0" marL="0">
+              <a:buNone/>
+            </a:pPr>
+            <a:r>
+              <a:rPr/>
+              <a:t>Mann-Whitney U</a:t>
+            </a:r>
+          </a:p>
+        </p:txBody>
+      </p:sp>
+      <p:sp>
+        <p:nvSpPr>
+          <p:cNvPr id="3" name="Content Placeholder 2"/>
+          <p:cNvSpPr>
+            <a:spLocks noGrp="1"/>
+          </p:cNvSpPr>
+          <p:nvPr>
+            <p:ph idx="1"/>
+          </p:nvPr>
+        </p:nvSpPr>
+        <p:spPr/>
+        <p:txBody>
+          <a:bodyPr/>
+          <a:lstStyle/>
+          <a:p>
+            <a:pPr lvl="0" indent="0">
+              <a:buNone/>
+            </a:pPr>
+            <a:r>
+              <a:rPr>
+                <a:latin typeface="Courier"/>
+              </a:rPr>
+              <a:t>1,2,3  1,2,4  1,2,5  1,2,6  1,2,7
+1,3,4  1,3,5  1,3,6  1,3,7  1,4,5
+1,4,6  1,4,7  1,5,6  1,5,7  1,6,7
+2,3,4  2,3,5  2,3,6  2,3,7  2,4,5
+2,4,6  2,4,7  2,5,6  2,5,7  2,6,7
+3,4,5  3,4,6  3,4,7  3,5,6  3,5,7
+3,6,7  4,5,6  4,5,7  4,6,7  5,6,7</a:t>
+            </a:r>
+          </a:p>
+        </p:txBody>
+      </p:sp>
+    </p:spTree>
+  </p:cSld>
+</p:sld>
+</file>
+
+<file path=ppt/slides/slide24.xml><?xml version="1.0" encoding="utf-8"?>
+<p:sld xmlns:a="http://schemas.openxmlformats.org/drawingml/2006/main" xmlns:r="http://schemas.openxmlformats.org/officeDocument/2006/relationships" xmlns:p="http://schemas.openxmlformats.org/presentationml/2006/main">
+  <p:cSld>
+    <p:spTree>
+      <p:nvGrpSpPr>
+        <p:cNvPr id="1" name=""/>
+        <p:cNvGrpSpPr/>
+        <p:nvPr/>
+      </p:nvGrpSpPr>
+      <p:grpSpPr>
+        <a:xfrm>
+          <a:off x="0" y="0"/>
+          <a:ext cx="0" cy="0"/>
+          <a:chOff x="0" y="0"/>
+          <a:chExt cx="0" cy="0"/>
+        </a:xfrm>
+      </p:grpSpPr>
+      <p:sp>
+        <p:nvSpPr>
+          <p:cNvPr id="2" name="Title 1"/>
+          <p:cNvSpPr>
+            <a:spLocks noGrp="1"/>
+          </p:cNvSpPr>
+          <p:nvPr>
+            <p:ph type="title"/>
+          </p:nvPr>
+        </p:nvSpPr>
+        <p:spPr/>
+        <p:txBody>
+          <a:bodyPr/>
+          <a:lstStyle/>
+          <a:p>
+            <a:pPr lvl="0" indent="0" marL="0">
+              <a:buNone/>
+            </a:pPr>
+            <a:r>
+              <a:rPr/>
+              <a:t>Mann-Whitney U</a:t>
+            </a:r>
+          </a:p>
+        </p:txBody>
+      </p:sp>
+      <p:sp>
+        <p:nvSpPr>
+          <p:cNvPr id="3" name="Content Placeholder 2"/>
+          <p:cNvSpPr>
+            <a:spLocks noGrp="1"/>
+          </p:cNvSpPr>
+          <p:nvPr>
+            <p:ph idx="1"/>
+          </p:nvPr>
+        </p:nvSpPr>
+        <p:spPr/>
+        <p:txBody>
+          <a:bodyPr/>
+          <a:lstStyle/>
+          <a:p>
+            <a:pPr lvl="0" indent="0">
+              <a:buNone/>
+            </a:pPr>
+            <a:r>
+              <a:rPr>
+                <a:latin typeface="Courier"/>
+              </a:rPr>
+              <a:t>
+                            2,6,7
+                            3,5,7
+3,6,7  4,5,6  4,5,7  4,6,7  5,6,7</a:t>
+            </a:r>
+          </a:p>
+        </p:txBody>
+      </p:sp>
+    </p:spTree>
+  </p:cSld>
+</p:sld>
+</file>
+
+<file path=ppt/slides/slide25.xml><?xml version="1.0" encoding="utf-8"?>
+<p:sld xmlns:a="http://schemas.openxmlformats.org/drawingml/2006/main" xmlns:r="http://schemas.openxmlformats.org/officeDocument/2006/relationships" xmlns:p="http://schemas.openxmlformats.org/presentationml/2006/main">
+  <p:cSld>
+    <p:spTree>
+      <p:nvGrpSpPr>
+        <p:cNvPr id="1" name=""/>
+        <p:cNvGrpSpPr/>
+        <p:nvPr/>
+      </p:nvGrpSpPr>
+      <p:grpSpPr>
+        <a:xfrm>
+          <a:off x="0" y="0"/>
+          <a:ext cx="0" cy="0"/>
+          <a:chOff x="0" y="0"/>
+          <a:chExt cx="0" cy="0"/>
+        </a:xfrm>
+      </p:grpSpPr>
+      <p:sp>
+        <p:nvSpPr>
+          <p:cNvPr id="2" name="Title 1"/>
+          <p:cNvSpPr>
+            <a:spLocks noGrp="1"/>
+          </p:cNvSpPr>
+          <p:nvPr>
+            <p:ph type="title"/>
+          </p:nvPr>
+        </p:nvSpPr>
+        <p:spPr/>
+        <p:txBody>
+          <a:bodyPr/>
+          <a:lstStyle/>
+          <a:p>
+            <a:pPr lvl="0" indent="0" marL="0">
+              <a:buNone/>
+            </a:pPr>
+            <a:r>
+              <a:rPr/>
+              <a:t>Mann-Whitney U</a:t>
+            </a:r>
+          </a:p>
+        </p:txBody>
+      </p:sp>
+      <p:sp>
+        <p:nvSpPr>
+          <p:cNvPr id="3" name="Content Placeholder 2"/>
+          <p:cNvSpPr>
+            <a:spLocks noGrp="1"/>
+          </p:cNvSpPr>
+          <p:nvPr>
+            <p:ph idx="1"/>
+          </p:nvPr>
+        </p:nvSpPr>
+        <p:spPr/>
+        <p:txBody>
+          <a:bodyPr/>
+          <a:lstStyle/>
+          <a:p>
+            <a:pPr lvl="0" indent="0">
+              <a:buNone/>
+            </a:pPr>
+            <a:r>
+              <a:rPr>
+                <a:latin typeface="Courier"/>
+              </a:rPr>
+              <a:t>1,2,3  1,2,4  1,2,5  1,2,6
+1,3,4  1,3,5
+2,3,4
+</a:t>
+            </a:r>
+          </a:p>
+        </p:txBody>
+      </p:sp>
+    </p:spTree>
+  </p:cSld>
+</p:sld>
+</file>
+
+<file path=ppt/slides/slide26.xml><?xml version="1.0" encoding="utf-8"?>
+<p:sld xmlns:a="http://schemas.openxmlformats.org/drawingml/2006/main" xmlns:r="http://schemas.openxmlformats.org/officeDocument/2006/relationships" xmlns:p="http://schemas.openxmlformats.org/presentationml/2006/main">
+  <p:cSld>
+    <p:spTree>
+      <p:nvGrpSpPr>
+        <p:cNvPr id="1" name=""/>
+        <p:cNvGrpSpPr/>
+        <p:nvPr/>
+      </p:nvGrpSpPr>
+      <p:grpSpPr>
+        <a:xfrm>
+          <a:off x="0" y="0"/>
+          <a:ext cx="0" cy="0"/>
+          <a:chOff x="0" y="0"/>
+          <a:chExt cx="0" cy="0"/>
+        </a:xfrm>
+      </p:grpSpPr>
+      <p:sp>
+        <p:nvSpPr>
+          <p:cNvPr id="2" name="Title 1"/>
+          <p:cNvSpPr>
+            <a:spLocks noGrp="1"/>
+          </p:cNvSpPr>
+          <p:nvPr>
+            <p:ph type="title"/>
+          </p:nvPr>
+        </p:nvSpPr>
+        <p:spPr/>
+        <p:txBody>
+          <a:bodyPr/>
+          <a:lstStyle/>
+          <a:p>
+            <a:pPr lvl="0" indent="0" marL="0">
+              <a:buNone/>
+            </a:pPr>
+            <a:r>
+              <a:rPr/>
+              <a:t>Randomization test</a:t>
+            </a:r>
+          </a:p>
+        </p:txBody>
+      </p:sp>
+      <p:pic>
+        <p:nvPicPr>
+          <p:cNvPr descr="fig:  ../images/randomization1.gif" id="0" name="Picture 1"/>
+          <p:cNvPicPr>
+            <a:picLocks noGrp="1" noChangeAspect="1"/>
+          </p:cNvPicPr>
+          <p:nvPr/>
+        </p:nvPicPr>
+        <p:blipFill>
+          <a:blip r:embed="rId2"/>
+          <a:stretch>
+            <a:fillRect/>
+          </a:stretch>
+        </p:blipFill>
+        <p:spPr bwMode="auto">
+          <a:xfrm>
+            <a:off x="609600" y="2362200"/>
+            <a:ext cx="10972800" cy="2489200"/>
+          </a:xfrm>
+          <a:prstGeom prst="rect">
+            <a:avLst/>
+          </a:prstGeom>
+          <a:noFill/>
+          <a:ln w="9525">
+            <a:noFill/>
+            <a:headEnd/>
+            <a:tailEnd/>
+          </a:ln>
+        </p:spPr>
+      </p:pic>
+      <p:sp>
+        <p:nvSpPr>
+          <p:cNvPr id="1" name="TextBox 3"/>
+          <p:cNvSpPr txBox="1"/>
+          <p:nvPr/>
+        </p:nvSpPr>
+        <p:spPr>
+          <a:xfrm>
+            <a:off x="609600" y="5613400"/>
+            <a:ext cx="10972800" cy="508000"/>
+          </a:xfrm>
+          <a:prstGeom prst="rect">
+            <a:avLst/>
+          </a:prstGeom>
+          <a:noFill/>
+        </p:spPr>
+        <p:txBody>
+          <a:bodyPr/>
+          <a:lstStyle/>
+          <a:p>
+            <a:pPr lvl="0" indent="0" marL="0" algn="ctr">
+              <a:buNone/>
+            </a:pPr>
+            <a:r>
+              <a:rPr/>
+              <a:t>Figure x. 25 permutations</a:t>
+            </a:r>
+          </a:p>
+        </p:txBody>
+      </p:sp>
     </p:spTree>
   </p:cSld>
 </p:sld>

</xml_diff>

<commit_message>
Added sas code to exact-tests
</commit_message>
<xml_diff>
--- a/exact-tests/results/exact-and-randomization-tests.pptx
+++ b/exact-tests/results/exact-and-randomization-tests.pptx
@@ -5,7 +5,7 @@
     <p:sldMasterId id="2147483648" r:id="rId1"/>
   </p:sldMasterIdLst>
   <p:notesMasterIdLst>
-    <p:notesMasterId r:id="rId28"/>
+    <p:notesMasterId r:id="rId35"/>
   </p:notesMasterIdLst>
   <p:sldIdLst>
     <p:sldId id="256" r:id="rId2"/>
@@ -34,6 +34,13 @@
     <p:sldId id="279" r:id="rId25"/>
     <p:sldId id="280" r:id="rId26"/>
     <p:sldId id="281" r:id="rId27"/>
+    <p:sldId id="282" r:id="rId28"/>
+    <p:sldId id="283" r:id="rId29"/>
+    <p:sldId id="284" r:id="rId30"/>
+    <p:sldId id="285" r:id="rId31"/>
+    <p:sldId id="286" r:id="rId32"/>
+    <p:sldId id="287" r:id="rId33"/>
+    <p:sldId id="288" r:id="rId34"/>
   </p:sldIdLst>
   <p:sldSz cx="12192000" cy="6858000"/>
   <p:notesSz cx="6858000" cy="9144000"/>
@@ -5872,7 +5879,7 @@
             </a:pPr>
             <a:r>
               <a:rPr/>
-              <a:t>Mann-Whitney U</a:t>
+              <a:t>How do you compute the p-value? (1/5)</a:t>
             </a:r>
           </a:p>
         </p:txBody>
@@ -5892,20 +5899,21 @@
           <a:bodyPr/>
           <a:lstStyle/>
           <a:p>
-            <a:pPr lvl="0" indent="0">
+            <a:pPr lvl="0" indent="0" marL="0">
               <a:buNone/>
             </a:pPr>
             <a:r>
-              <a:rPr>
-                <a:latin typeface="Courier"/>
-              </a:rPr>
-              <a:t>1,2,3  1,2,4  1,2,5  1,2,6  1,2,7
-1,3,4  1,3,5  1,3,6  1,3,7  1,4,5
-1,4,6  1,4,7  1,5,6  1,5,7  1,6,7
-2,3,4  2,3,5  2,3,6  2,3,7  2,4,5
-2,4,6  2,4,7  2,5,6  2,5,7  2,6,7
-3,4,5  3,4,6  3,4,7  3,5,6  3,5,7
-3,6,7  4,5,6  4,5,7  4,6,7  5,6,7</a:t>
+              <a:rPr/>
+              <a:t>p-value=P[sample results or more extreme| H0]</a:t>
+            </a:r>
+          </a:p>
+          <a:p>
+            <a:pPr lvl="0" indent="0" marL="0">
+              <a:buNone/>
+            </a:pPr>
+            <a:r>
+              <a:rPr/>
+              <a:t>What does “more extreme” mean?</a:t>
             </a:r>
           </a:p>
         </p:txBody>
@@ -5952,7 +5960,7 @@
             </a:pPr>
             <a:r>
               <a:rPr/>
-              <a:t>Mann-Whitney U</a:t>
+              <a:t>How do you compute the p-value? (2/5)</a:t>
             </a:r>
           </a:p>
         </p:txBody>
@@ -5971,6 +5979,15 @@
         <p:txBody>
           <a:bodyPr/>
           <a:lstStyle/>
+          <a:p>
+            <a:pPr lvl="0" indent="0" marL="0">
+              <a:buNone/>
+            </a:pPr>
+            <a:r>
+              <a:rPr/>
+              <a:t>List all possible 2 by 2 tables</a:t>
+            </a:r>
+          </a:p>
           <a:p>
             <a:pPr lvl="0" indent="0">
               <a:buNone/>
@@ -5979,10 +5996,10 @@
               <a:rPr>
                 <a:latin typeface="Courier"/>
               </a:rPr>
-              <a:t>
-                            2,6,7
-                            3,5,7
-3,6,7  4,5,6  4,5,7  4,6,7  5,6,7</a:t>
+              <a:t>  ? ? | 4
+  ? ? | 4
+  ----+--
+  4 4 | 8</a:t>
             </a:r>
           </a:p>
         </p:txBody>
@@ -6029,6 +6046,511 @@
             </a:pPr>
             <a:r>
               <a:rPr/>
+              <a:t>How do you compute the p-value? (3/5)</a:t>
+            </a:r>
+          </a:p>
+        </p:txBody>
+      </p:sp>
+      <p:sp>
+        <p:nvSpPr>
+          <p:cNvPr id="3" name="Content Placeholder 2"/>
+          <p:cNvSpPr>
+            <a:spLocks noGrp="1"/>
+          </p:cNvSpPr>
+          <p:nvPr>
+            <p:ph idx="1"/>
+          </p:nvPr>
+        </p:nvSpPr>
+        <p:spPr/>
+        <p:txBody>
+          <a:bodyPr/>
+          <a:lstStyle/>
+          <a:p>
+            <a:pPr lvl="0" indent="0">
+              <a:buNone/>
+            </a:pPr>
+            <a:r>
+              <a:rPr>
+                <a:latin typeface="Courier"/>
+              </a:rPr>
+              <a:t>   4 0     3 1     2 2     1 3     0 4
+   0 4     1 3     2 2     3 1     4 0
+  1.4%   22.9%   51.4%   22.9%    1.4%</a:t>
+            </a:r>
+          </a:p>
+        </p:txBody>
+      </p:sp>
+    </p:spTree>
+  </p:cSld>
+</p:sld>
+</file>
+
+<file path=ppt/slides/slide26.xml><?xml version="1.0" encoding="utf-8"?>
+<p:sld xmlns:a="http://schemas.openxmlformats.org/drawingml/2006/main" xmlns:r="http://schemas.openxmlformats.org/officeDocument/2006/relationships" xmlns:p="http://schemas.openxmlformats.org/presentationml/2006/main">
+  <p:cSld>
+    <p:spTree>
+      <p:nvGrpSpPr>
+        <p:cNvPr id="1" name=""/>
+        <p:cNvGrpSpPr/>
+        <p:nvPr/>
+      </p:nvGrpSpPr>
+      <p:grpSpPr>
+        <a:xfrm>
+          <a:off x="0" y="0"/>
+          <a:ext cx="0" cy="0"/>
+          <a:chOff x="0" y="0"/>
+          <a:chExt cx="0" cy="0"/>
+        </a:xfrm>
+      </p:grpSpPr>
+      <p:sp>
+        <p:nvSpPr>
+          <p:cNvPr id="2" name="Title 1"/>
+          <p:cNvSpPr>
+            <a:spLocks noGrp="1"/>
+          </p:cNvSpPr>
+          <p:nvPr>
+            <p:ph type="title"/>
+          </p:nvPr>
+        </p:nvSpPr>
+        <p:spPr/>
+        <p:txBody>
+          <a:bodyPr/>
+          <a:lstStyle/>
+          <a:p>
+            <a:pPr lvl="0" indent="0" marL="0">
+              <a:buNone/>
+            </a:pPr>
+            <a:r>
+              <a:rPr/>
+              <a:t>How do you compute the p-value? (4/5)</a:t>
+            </a:r>
+          </a:p>
+        </p:txBody>
+      </p:sp>
+      <p:sp>
+        <p:nvSpPr>
+          <p:cNvPr id="3" name="Content Placeholder 2"/>
+          <p:cNvSpPr>
+            <a:spLocks noGrp="1"/>
+          </p:cNvSpPr>
+          <p:nvPr>
+            <p:ph idx="1"/>
+          </p:nvPr>
+        </p:nvSpPr>
+        <p:spPr/>
+        <p:txBody>
+          <a:bodyPr/>
+          <a:lstStyle/>
+          <a:p>
+            <a:pPr lvl="0" indent="0" marL="0">
+              <a:buNone/>
+            </a:pPr>
+            <a:r>
+              <a:rPr/>
+              <a:t>For a one-sided p-value</a:t>
+            </a:r>
+          </a:p>
+          <a:p>
+            <a:pPr lvl="0" indent="0">
+              <a:buNone/>
+            </a:pPr>
+            <a:r>
+              <a:rPr>
+                <a:latin typeface="Courier"/>
+              </a:rPr>
+              <a:t>   4 0     3 1
+   0 4     1 3
+  1.4% + 22.9% = 24.3%</a:t>
+            </a:r>
+          </a:p>
+        </p:txBody>
+      </p:sp>
+    </p:spTree>
+  </p:cSld>
+</p:sld>
+</file>
+
+<file path=ppt/slides/slide27.xml><?xml version="1.0" encoding="utf-8"?>
+<p:sld xmlns:a="http://schemas.openxmlformats.org/drawingml/2006/main" xmlns:r="http://schemas.openxmlformats.org/officeDocument/2006/relationships" xmlns:p="http://schemas.openxmlformats.org/presentationml/2006/main">
+  <p:cSld>
+    <p:spTree>
+      <p:nvGrpSpPr>
+        <p:cNvPr id="1" name=""/>
+        <p:cNvGrpSpPr/>
+        <p:nvPr/>
+      </p:nvGrpSpPr>
+      <p:grpSpPr>
+        <a:xfrm>
+          <a:off x="0" y="0"/>
+          <a:ext cx="0" cy="0"/>
+          <a:chOff x="0" y="0"/>
+          <a:chExt cx="0" cy="0"/>
+        </a:xfrm>
+      </p:grpSpPr>
+      <p:sp>
+        <p:nvSpPr>
+          <p:cNvPr id="2" name="Title 1"/>
+          <p:cNvSpPr>
+            <a:spLocks noGrp="1"/>
+          </p:cNvSpPr>
+          <p:nvPr>
+            <p:ph type="title"/>
+          </p:nvPr>
+        </p:nvSpPr>
+        <p:spPr/>
+        <p:txBody>
+          <a:bodyPr/>
+          <a:lstStyle/>
+          <a:p>
+            <a:pPr lvl="0" indent="0" marL="0">
+              <a:buNone/>
+            </a:pPr>
+            <a:r>
+              <a:rPr/>
+              <a:t>How do you compute the p-value? (5/5)</a:t>
+            </a:r>
+          </a:p>
+        </p:txBody>
+      </p:sp>
+      <p:sp>
+        <p:nvSpPr>
+          <p:cNvPr id="3" name="Content Placeholder 2"/>
+          <p:cNvSpPr>
+            <a:spLocks noGrp="1"/>
+          </p:cNvSpPr>
+          <p:nvPr>
+            <p:ph idx="1"/>
+          </p:nvPr>
+        </p:nvSpPr>
+        <p:spPr/>
+        <p:txBody>
+          <a:bodyPr/>
+          <a:lstStyle/>
+          <a:p>
+            <a:pPr lvl="0" indent="0" marL="0">
+              <a:buNone/>
+            </a:pPr>
+            <a:r>
+              <a:rPr/>
+              <a:t>For a two sided p-value</a:t>
+            </a:r>
+          </a:p>
+          <a:p>
+            <a:pPr lvl="0" indent="0">
+              <a:buNone/>
+            </a:pPr>
+            <a:r>
+              <a:rPr>
+                <a:latin typeface="Courier"/>
+              </a:rPr>
+              <a:t>   4 0     3 1             1 3     0 4
+   0 4     1 3             3 1     4 0
+  1.4% + 22.9%      +    22.9% +  1.4% = 48.6%</a:t>
+            </a:r>
+          </a:p>
+        </p:txBody>
+      </p:sp>
+    </p:spTree>
+  </p:cSld>
+</p:sld>
+</file>
+
+<file path=ppt/slides/slide28.xml><?xml version="1.0" encoding="utf-8"?>
+<p:sld xmlns:a="http://schemas.openxmlformats.org/drawingml/2006/main" xmlns:r="http://schemas.openxmlformats.org/officeDocument/2006/relationships" xmlns:p="http://schemas.openxmlformats.org/presentationml/2006/main">
+  <p:cSld>
+    <p:spTree>
+      <p:nvGrpSpPr>
+        <p:cNvPr id="1" name=""/>
+        <p:cNvGrpSpPr/>
+        <p:nvPr/>
+      </p:nvGrpSpPr>
+      <p:grpSpPr>
+        <a:xfrm>
+          <a:off x="0" y="0"/>
+          <a:ext cx="0" cy="0"/>
+          <a:chOff x="0" y="0"/>
+          <a:chExt cx="0" cy="0"/>
+        </a:xfrm>
+      </p:grpSpPr>
+      <p:sp>
+        <p:nvSpPr>
+          <p:cNvPr id="2" name="Title 1"/>
+          <p:cNvSpPr>
+            <a:spLocks noGrp="1"/>
+          </p:cNvSpPr>
+          <p:nvPr>
+            <p:ph type="title"/>
+          </p:nvPr>
+        </p:nvSpPr>
+        <p:spPr/>
+        <p:txBody>
+          <a:bodyPr/>
+          <a:lstStyle/>
+          <a:p>
+            <a:pPr lvl="0" indent="0" marL="0">
+              <a:buNone/>
+            </a:pPr>
+            <a:r>
+              <a:rPr/>
+              <a:t>Mann-Whitney U</a:t>
+            </a:r>
+          </a:p>
+        </p:txBody>
+      </p:sp>
+      <p:sp>
+        <p:nvSpPr>
+          <p:cNvPr id="3" name="Content Placeholder 2"/>
+          <p:cNvSpPr>
+            <a:spLocks noGrp="1"/>
+          </p:cNvSpPr>
+          <p:nvPr>
+            <p:ph idx="1"/>
+          </p:nvPr>
+        </p:nvSpPr>
+        <p:spPr/>
+        <p:txBody>
+          <a:bodyPr/>
+          <a:lstStyle/>
+          <a:p>
+            <a:pPr lvl="0" indent="0">
+              <a:buNone/>
+            </a:pPr>
+            <a:r>
+              <a:rPr>
+                <a:latin typeface="Courier"/>
+              </a:rPr>
+              <a:t>1,2,3  1,2,4  1,2,5  1,2,6  1,2,7
+1,3,4  1,3,5  1,3,6  1,3,7  1,4,5
+1,4,6  1,4,7  1,5,6  1,5,7  1,6,7
+2,3,4  2,3,5  2,3,6  2,3,7  2,4,5
+2,4,6  2,4,7  2,5,6  2,5,7  2,6,7
+3,4,5  3,4,6  3,4,7  3,5,6  3,5,7
+3,6,7  4,5,6  4,5,7  4,6,7  5,6,7</a:t>
+            </a:r>
+          </a:p>
+        </p:txBody>
+      </p:sp>
+    </p:spTree>
+  </p:cSld>
+</p:sld>
+</file>
+
+<file path=ppt/slides/slide29.xml><?xml version="1.0" encoding="utf-8"?>
+<p:sld xmlns:a="http://schemas.openxmlformats.org/drawingml/2006/main" xmlns:r="http://schemas.openxmlformats.org/officeDocument/2006/relationships" xmlns:p="http://schemas.openxmlformats.org/presentationml/2006/main">
+  <p:cSld>
+    <p:spTree>
+      <p:nvGrpSpPr>
+        <p:cNvPr id="1" name=""/>
+        <p:cNvGrpSpPr/>
+        <p:nvPr/>
+      </p:nvGrpSpPr>
+      <p:grpSpPr>
+        <a:xfrm>
+          <a:off x="0" y="0"/>
+          <a:ext cx="0" cy="0"/>
+          <a:chOff x="0" y="0"/>
+          <a:chExt cx="0" cy="0"/>
+        </a:xfrm>
+      </p:grpSpPr>
+      <p:sp>
+        <p:nvSpPr>
+          <p:cNvPr id="2" name="Title 1"/>
+          <p:cNvSpPr>
+            <a:spLocks noGrp="1"/>
+          </p:cNvSpPr>
+          <p:nvPr>
+            <p:ph type="title"/>
+          </p:nvPr>
+        </p:nvSpPr>
+        <p:spPr/>
+        <p:txBody>
+          <a:bodyPr/>
+          <a:lstStyle/>
+          <a:p>
+            <a:pPr lvl="0" indent="0" marL="0">
+              <a:buNone/>
+            </a:pPr>
+            <a:r>
+              <a:rPr/>
+              <a:t>Mann-Whitney U</a:t>
+            </a:r>
+          </a:p>
+        </p:txBody>
+      </p:sp>
+      <p:sp>
+        <p:nvSpPr>
+          <p:cNvPr id="3" name="Content Placeholder 2"/>
+          <p:cNvSpPr>
+            <a:spLocks noGrp="1"/>
+          </p:cNvSpPr>
+          <p:nvPr>
+            <p:ph idx="1"/>
+          </p:nvPr>
+        </p:nvSpPr>
+        <p:spPr/>
+        <p:txBody>
+          <a:bodyPr/>
+          <a:lstStyle/>
+          <a:p>
+            <a:pPr lvl="0" indent="0">
+              <a:buNone/>
+            </a:pPr>
+            <a:r>
+              <a:rPr>
+                <a:latin typeface="Courier"/>
+              </a:rPr>
+              <a:t>
+                            2,6,7
+                            3,5,7
+3,6,7  4,5,6  4,5,7  4,6,7  5,6,7</a:t>
+            </a:r>
+          </a:p>
+        </p:txBody>
+      </p:sp>
+    </p:spTree>
+  </p:cSld>
+</p:sld>
+</file>
+
+<file path=ppt/slides/slide3.xml><?xml version="1.0" encoding="utf-8"?>
+<p:sld xmlns:a="http://schemas.openxmlformats.org/drawingml/2006/main" xmlns:r="http://schemas.openxmlformats.org/officeDocument/2006/relationships" xmlns:p="http://schemas.openxmlformats.org/presentationml/2006/main">
+  <p:cSld>
+    <p:spTree>
+      <p:nvGrpSpPr>
+        <p:cNvPr id="1" name=""/>
+        <p:cNvGrpSpPr/>
+        <p:nvPr/>
+      </p:nvGrpSpPr>
+      <p:grpSpPr>
+        <a:xfrm>
+          <a:off x="0" y="0"/>
+          <a:ext cx="0" cy="0"/>
+          <a:chOff x="0" y="0"/>
+          <a:chExt cx="0" cy="0"/>
+        </a:xfrm>
+      </p:grpSpPr>
+      <p:sp>
+        <p:nvSpPr>
+          <p:cNvPr id="2" name="Title 1"/>
+          <p:cNvSpPr>
+            <a:spLocks noGrp="1"/>
+          </p:cNvSpPr>
+          <p:nvPr>
+            <p:ph type="title"/>
+          </p:nvPr>
+        </p:nvSpPr>
+        <p:spPr/>
+        <p:txBody>
+          <a:bodyPr/>
+          <a:lstStyle/>
+          <a:p>
+            <a:pPr lvl="0" indent="0" marL="0">
+              <a:buNone/>
+            </a:pPr>
+            <a:r>
+              <a:rPr/>
+              <a:t>Goal</a:t>
+            </a:r>
+          </a:p>
+        </p:txBody>
+      </p:sp>
+      <p:sp>
+        <p:nvSpPr>
+          <p:cNvPr id="3" name="Content Placeholder 2"/>
+          <p:cNvSpPr>
+            <a:spLocks noGrp="1"/>
+          </p:cNvSpPr>
+          <p:nvPr>
+            <p:ph idx="1"/>
+          </p:nvPr>
+        </p:nvSpPr>
+        <p:spPr/>
+        <p:txBody>
+          <a:bodyPr/>
+          <a:lstStyle/>
+          <a:p>
+            <a:pPr lvl="0" indent="0" marL="0">
+              <a:buNone/>
+            </a:pPr>
+            <a:r>
+              <a:rPr/>
+              <a:t>For you to have a good understanding of:</a:t>
+            </a:r>
+          </a:p>
+          <a:p>
+            <a:pPr lvl="0"/>
+            <a:r>
+              <a:rPr/>
+              <a:t>what randomization and exact tests are,</a:t>
+            </a:r>
+          </a:p>
+          <a:p>
+            <a:pPr lvl="0"/>
+            <a:r>
+              <a:rPr/>
+              <a:t>when it is appropriate to use them,</a:t>
+            </a:r>
+          </a:p>
+          <a:p>
+            <a:pPr lvl="0"/>
+            <a:r>
+              <a:rPr/>
+              <a:t>the steps to implement them.</a:t>
+            </a:r>
+          </a:p>
+          <a:p>
+            <a:pPr lvl="0" indent="0" marL="0">
+              <a:buNone/>
+            </a:pPr>
+            <a:r>
+              <a:rPr/>
+              <a:t>The goal is not to cover every possible application of the randomization and exact tests.</a:t>
+            </a:r>
+          </a:p>
+        </p:txBody>
+      </p:sp>
+    </p:spTree>
+  </p:cSld>
+</p:sld>
+</file>
+
+<file path=ppt/slides/slide30.xml><?xml version="1.0" encoding="utf-8"?>
+<p:sld xmlns:a="http://schemas.openxmlformats.org/drawingml/2006/main" xmlns:r="http://schemas.openxmlformats.org/officeDocument/2006/relationships" xmlns:p="http://schemas.openxmlformats.org/presentationml/2006/main">
+  <p:cSld>
+    <p:spTree>
+      <p:nvGrpSpPr>
+        <p:cNvPr id="1" name=""/>
+        <p:cNvGrpSpPr/>
+        <p:nvPr/>
+      </p:nvGrpSpPr>
+      <p:grpSpPr>
+        <a:xfrm>
+          <a:off x="0" y="0"/>
+          <a:ext cx="0" cy="0"/>
+          <a:chOff x="0" y="0"/>
+          <a:chExt cx="0" cy="0"/>
+        </a:xfrm>
+      </p:grpSpPr>
+      <p:sp>
+        <p:nvSpPr>
+          <p:cNvPr id="2" name="Title 1"/>
+          <p:cNvSpPr>
+            <a:spLocks noGrp="1"/>
+          </p:cNvSpPr>
+          <p:nvPr>
+            <p:ph type="title"/>
+          </p:nvPr>
+        </p:nvSpPr>
+        <p:spPr/>
+        <p:txBody>
+          <a:bodyPr/>
+          <a:lstStyle/>
+          <a:p>
+            <a:pPr lvl="0" indent="0" marL="0">
+              <a:buNone/>
+            </a:pPr>
+            <a:r>
+              <a:rPr/>
               <a:t>Mann-Whitney U</a:t>
             </a:r>
           </a:p>
@@ -6069,7 +6591,7 @@
 </p:sld>
 </file>
 
-<file path=ppt/slides/slide26.xml><?xml version="1.0" encoding="utf-8"?>
+<file path=ppt/slides/slide31.xml><?xml version="1.0" encoding="utf-8"?>
 <p:sld xmlns:a="http://schemas.openxmlformats.org/drawingml/2006/main" xmlns:r="http://schemas.openxmlformats.org/officeDocument/2006/relationships" xmlns:p="http://schemas.openxmlformats.org/presentationml/2006/main">
   <p:cSld>
     <p:spTree>
@@ -6176,7 +6698,7 @@
 </p:sld>
 </file>
 
-<file path=ppt/slides/slide3.xml><?xml version="1.0" encoding="utf-8"?>
+<file path=ppt/slides/slide32.xml><?xml version="1.0" encoding="utf-8"?>
 <p:sld xmlns:a="http://schemas.openxmlformats.org/drawingml/2006/main" xmlns:r="http://schemas.openxmlformats.org/officeDocument/2006/relationships" xmlns:p="http://schemas.openxmlformats.org/presentationml/2006/main">
   <p:cSld>
     <p:spTree>
@@ -6213,19 +6735,101 @@
             </a:pPr>
             <a:r>
               <a:rPr/>
-              <a:t>Goal</a:t>
-            </a:r>
-          </a:p>
-        </p:txBody>
-      </p:sp>
-      <p:sp>
-        <p:nvSpPr>
-          <p:cNvPr id="3" name="Content Placeholder 2"/>
-          <p:cNvSpPr>
-            <a:spLocks noGrp="1"/>
-          </p:cNvSpPr>
-          <p:nvPr>
-            <p:ph idx="1"/>
+              <a:t>Randomization test</a:t>
+            </a:r>
+          </a:p>
+        </p:txBody>
+      </p:sp>
+      <p:pic>
+        <p:nvPicPr>
+          <p:cNvPr descr="fig:  ../images/randomization2.gif" id="0" name="Picture 1"/>
+          <p:cNvPicPr>
+            <a:picLocks noGrp="1" noChangeAspect="1"/>
+          </p:cNvPicPr>
+          <p:nvPr/>
+        </p:nvPicPr>
+        <p:blipFill>
+          <a:blip r:embed="rId2"/>
+          <a:stretch>
+            <a:fillRect/>
+          </a:stretch>
+        </p:blipFill>
+        <p:spPr bwMode="auto">
+          <a:xfrm>
+            <a:off x="609600" y="2476500"/>
+            <a:ext cx="10972800" cy="2260600"/>
+          </a:xfrm>
+          <a:prstGeom prst="rect">
+            <a:avLst/>
+          </a:prstGeom>
+          <a:noFill/>
+          <a:ln w="9525">
+            <a:noFill/>
+            <a:headEnd/>
+            <a:tailEnd/>
+          </a:ln>
+        </p:spPr>
+      </p:pic>
+      <p:sp>
+        <p:nvSpPr>
+          <p:cNvPr id="1" name="TextBox 3"/>
+          <p:cNvSpPr txBox="1"/>
+          <p:nvPr/>
+        </p:nvSpPr>
+        <p:spPr>
+          <a:xfrm>
+            <a:off x="609600" y="5613400"/>
+            <a:ext cx="10972800" cy="508000"/>
+          </a:xfrm>
+          <a:prstGeom prst="rect">
+            <a:avLst/>
+          </a:prstGeom>
+          <a:noFill/>
+        </p:spPr>
+        <p:txBody>
+          <a:bodyPr/>
+          <a:lstStyle/>
+          <a:p>
+            <a:pPr lvl="0" indent="0" marL="0" algn="ctr">
+              <a:buNone/>
+            </a:pPr>
+            <a:r>
+              <a:rPr/>
+              <a:t>Figure x. 25 permutations</a:t>
+            </a:r>
+          </a:p>
+        </p:txBody>
+      </p:sp>
+    </p:spTree>
+  </p:cSld>
+</p:sld>
+</file>
+
+<file path=ppt/slides/slide33.xml><?xml version="1.0" encoding="utf-8"?>
+<p:sld xmlns:a="http://schemas.openxmlformats.org/drawingml/2006/main" xmlns:r="http://schemas.openxmlformats.org/officeDocument/2006/relationships" xmlns:p="http://schemas.openxmlformats.org/presentationml/2006/main">
+  <p:cSld>
+    <p:spTree>
+      <p:nvGrpSpPr>
+        <p:cNvPr id="1" name=""/>
+        <p:cNvGrpSpPr/>
+        <p:nvPr/>
+      </p:nvGrpSpPr>
+      <p:grpSpPr>
+        <a:xfrm>
+          <a:off x="0" y="0"/>
+          <a:ext cx="0" cy="0"/>
+          <a:chOff x="0" y="0"/>
+          <a:chExt cx="0" cy="0"/>
+        </a:xfrm>
+      </p:grpSpPr>
+      <p:sp>
+        <p:nvSpPr>
+          <p:cNvPr id="2" name="Title 1"/>
+          <p:cNvSpPr>
+            <a:spLocks noGrp="1"/>
+          </p:cNvSpPr>
+          <p:nvPr>
+            <p:ph type="title"/>
           </p:nvPr>
         </p:nvSpPr>
         <p:spPr/>
@@ -6238,37 +6842,67 @@
             </a:pPr>
             <a:r>
               <a:rPr/>
-              <a:t>For you to have a good understanding of:</a:t>
-            </a:r>
-          </a:p>
-          <a:p>
-            <a:pPr lvl="0"/>
-            <a:r>
-              <a:rPr/>
-              <a:t>what randomization and exact tests are,</a:t>
-            </a:r>
-          </a:p>
-          <a:p>
-            <a:pPr lvl="0"/>
-            <a:r>
-              <a:rPr/>
-              <a:t>when it is appropriate to use them,</a:t>
-            </a:r>
-          </a:p>
-          <a:p>
-            <a:pPr lvl="0"/>
-            <a:r>
-              <a:rPr/>
-              <a:t>the steps to implement them.</a:t>
-            </a:r>
-          </a:p>
-          <a:p>
-            <a:pPr lvl="0" indent="0" marL="0">
+              <a:t>Randomization test</a:t>
+            </a:r>
+          </a:p>
+        </p:txBody>
+      </p:sp>
+      <p:pic>
+        <p:nvPicPr>
+          <p:cNvPr descr="fig:  ../images/randomization3.gif" id="0" name="Picture 1"/>
+          <p:cNvPicPr>
+            <a:picLocks noGrp="1" noChangeAspect="1"/>
+          </p:cNvPicPr>
+          <p:nvPr/>
+        </p:nvPicPr>
+        <p:blipFill>
+          <a:blip r:embed="rId2"/>
+          <a:stretch>
+            <a:fillRect/>
+          </a:stretch>
+        </p:blipFill>
+        <p:spPr bwMode="auto">
+          <a:xfrm>
+            <a:off x="609600" y="2476500"/>
+            <a:ext cx="10972800" cy="2260600"/>
+          </a:xfrm>
+          <a:prstGeom prst="rect">
+            <a:avLst/>
+          </a:prstGeom>
+          <a:noFill/>
+          <a:ln w="9525">
+            <a:noFill/>
+            <a:headEnd/>
+            <a:tailEnd/>
+          </a:ln>
+        </p:spPr>
+      </p:pic>
+      <p:sp>
+        <p:nvSpPr>
+          <p:cNvPr id="1" name="TextBox 3"/>
+          <p:cNvSpPr txBox="1"/>
+          <p:nvPr/>
+        </p:nvSpPr>
+        <p:spPr>
+          <a:xfrm>
+            <a:off x="609600" y="5613400"/>
+            <a:ext cx="10972800" cy="508000"/>
+          </a:xfrm>
+          <a:prstGeom prst="rect">
+            <a:avLst/>
+          </a:prstGeom>
+          <a:noFill/>
+        </p:spPr>
+        <p:txBody>
+          <a:bodyPr/>
+          <a:lstStyle/>
+          <a:p>
+            <a:pPr lvl="0" indent="0" marL="0" algn="ctr">
               <a:buNone/>
             </a:pPr>
             <a:r>
               <a:rPr/>
-              <a:t>The goal is not to cover every possible application of the randomization and exact tests.</a:t>
+              <a:t>Figure x. 25 permutations</a:t>
             </a:r>
           </a:p>
         </p:txBody>

</xml_diff>

<commit_message>
Update headings for slides in exact-tests
</commit_message>
<xml_diff>
--- a/exact-tests/results/exact-and-randomization-tests.pptx
+++ b/exact-tests/results/exact-and-randomization-tests.pptx
@@ -5,7 +5,7 @@
     <p:sldMasterId id="2147483648" r:id="rId1"/>
   </p:sldMasterIdLst>
   <p:notesMasterIdLst>
-    <p:notesMasterId r:id="rId35"/>
+    <p:notesMasterId r:id="rId52"/>
   </p:notesMasterIdLst>
   <p:sldIdLst>
     <p:sldId id="256" r:id="rId2"/>
@@ -41,6 +41,23 @@
     <p:sldId id="286" r:id="rId32"/>
     <p:sldId id="287" r:id="rId33"/>
     <p:sldId id="288" r:id="rId34"/>
+    <p:sldId id="289" r:id="rId35"/>
+    <p:sldId id="290" r:id="rId36"/>
+    <p:sldId id="291" r:id="rId37"/>
+    <p:sldId id="292" r:id="rId38"/>
+    <p:sldId id="293" r:id="rId39"/>
+    <p:sldId id="294" r:id="rId40"/>
+    <p:sldId id="295" r:id="rId41"/>
+    <p:sldId id="296" r:id="rId42"/>
+    <p:sldId id="297" r:id="rId43"/>
+    <p:sldId id="298" r:id="rId44"/>
+    <p:sldId id="299" r:id="rId45"/>
+    <p:sldId id="300" r:id="rId46"/>
+    <p:sldId id="301" r:id="rId47"/>
+    <p:sldId id="302" r:id="rId48"/>
+    <p:sldId id="303" r:id="rId49"/>
+    <p:sldId id="304" r:id="rId50"/>
+    <p:sldId id="305" r:id="rId51"/>
   </p:sldIdLst>
   <p:sldSz cx="12192000" cy="6858000"/>
   <p:notesSz cx="6858000" cy="9144000"/>
@@ -920,7 +937,7 @@
           <a:p>
             <a:fld id="{18BDFEC3-8487-43E8-A154-7C12CBC1FFF2}" type="slidenum">
               <a:rPr lang="en-US"/>
-              <a:t>13</a:t>
+              <a:t>14</a:t>
             </a:fld>
             <a:endParaRPr lang="en-US"/>
           </a:p>
@@ -1016,7 +1033,7 @@
           <a:p>
             <a:fld id="{18BDFEC3-8487-43E8-A154-7C12CBC1FFF2}" type="slidenum">
               <a:rPr lang="en-US"/>
-              <a:t>14</a:t>
+              <a:t>15</a:t>
             </a:fld>
             <a:endParaRPr lang="en-US"/>
           </a:p>
@@ -1126,7 +1143,7 @@
           <a:p>
             <a:fld id="{18BDFEC3-8487-43E8-A154-7C12CBC1FFF2}" type="slidenum">
               <a:rPr lang="en-US"/>
-              <a:t>15</a:t>
+              <a:t>16</a:t>
             </a:fld>
             <a:endParaRPr lang="en-US"/>
           </a:p>
@@ -4460,6 +4477,87 @@
             </a:pPr>
             <a:r>
               <a:rPr/>
+              <a:t>Break #2</a:t>
+            </a:r>
+          </a:p>
+        </p:txBody>
+      </p:sp>
+      <p:sp>
+        <p:nvSpPr>
+          <p:cNvPr id="3" name="Content Placeholder 2"/>
+          <p:cNvSpPr>
+            <a:spLocks noGrp="1"/>
+          </p:cNvSpPr>
+          <p:nvPr>
+            <p:ph idx="1"/>
+          </p:nvPr>
+        </p:nvSpPr>
+        <p:spPr/>
+        <p:txBody>
+          <a:bodyPr/>
+          <a:lstStyle/>
+          <a:p>
+            <a:pPr lvl="0" indent="0" marL="0">
+              <a:buNone/>
+            </a:pPr>
+            <a:r>
+              <a:rPr/>
+              <a:t>What have you learned? + Simple application of Fisher’s Exact test</a:t>
+            </a:r>
+          </a:p>
+          <a:p>
+            <a:pPr lvl="0" indent="0" marL="0">
+              <a:buNone/>
+            </a:pPr>
+            <a:r>
+              <a:rPr/>
+              <a:t>What is coming next? + The hypergeometric distribution</a:t>
+            </a:r>
+          </a:p>
+        </p:txBody>
+      </p:sp>
+    </p:spTree>
+  </p:cSld>
+</p:sld>
+</file>
+
+<file path=ppt/slides/slide12.xml><?xml version="1.0" encoding="utf-8"?>
+<p:sld xmlns:a="http://schemas.openxmlformats.org/drawingml/2006/main" xmlns:r="http://schemas.openxmlformats.org/officeDocument/2006/relationships" xmlns:p="http://schemas.openxmlformats.org/presentationml/2006/main">
+  <p:cSld>
+    <p:spTree>
+      <p:nvGrpSpPr>
+        <p:cNvPr id="1" name=""/>
+        <p:cNvGrpSpPr/>
+        <p:nvPr/>
+      </p:nvGrpSpPr>
+      <p:grpSpPr>
+        <a:xfrm>
+          <a:off x="0" y="0"/>
+          <a:ext cx="0" cy="0"/>
+          <a:chOff x="0" y="0"/>
+          <a:chExt cx="0" cy="0"/>
+        </a:xfrm>
+      </p:grpSpPr>
+      <p:sp>
+        <p:nvSpPr>
+          <p:cNvPr id="2" name="Title 1"/>
+          <p:cNvSpPr>
+            <a:spLocks noGrp="1"/>
+          </p:cNvSpPr>
+          <p:nvPr>
+            <p:ph type="title"/>
+          </p:nvPr>
+        </p:nvSpPr>
+        <p:spPr/>
+        <p:txBody>
+          <a:bodyPr/>
+          <a:lstStyle/>
+          <a:p>
+            <a:pPr lvl="0" indent="0" marL="0">
+              <a:buNone/>
+            </a:pPr>
+            <a:r>
+              <a:rPr/>
               <a:t>An alternate result</a:t>
             </a:r>
           </a:p>
@@ -4530,7 +4628,7 @@
 </p:sld>
 </file>
 
-<file path=ppt/slides/slide12.xml><?xml version="1.0" encoding="utf-8"?>
+<file path=ppt/slides/slide13.xml><?xml version="1.0" encoding="utf-8"?>
 <p:sld xmlns:a="http://schemas.openxmlformats.org/drawingml/2006/main" xmlns:r="http://schemas.openxmlformats.org/officeDocument/2006/relationships" xmlns:p="http://schemas.openxmlformats.org/presentationml/2006/main">
   <p:cSld>
     <p:spTree>
@@ -4801,88 +4899,6 @@
 </p:sld>
 </file>
 
-<file path=ppt/slides/slide13.xml><?xml version="1.0" encoding="utf-8"?>
-<p:sld xmlns:a="http://schemas.openxmlformats.org/drawingml/2006/main" xmlns:r="http://schemas.openxmlformats.org/officeDocument/2006/relationships" xmlns:p="http://schemas.openxmlformats.org/presentationml/2006/main">
-  <p:cSld>
-    <p:spTree>
-      <p:nvGrpSpPr>
-        <p:cNvPr id="1" name=""/>
-        <p:cNvGrpSpPr/>
-        <p:nvPr/>
-      </p:nvGrpSpPr>
-      <p:grpSpPr>
-        <a:xfrm>
-          <a:off x="0" y="0"/>
-          <a:ext cx="0" cy="0"/>
-          <a:chOff x="0" y="0"/>
-          <a:chExt cx="0" cy="0"/>
-        </a:xfrm>
-      </p:grpSpPr>
-      <p:sp>
-        <p:nvSpPr>
-          <p:cNvPr id="2" name="Title 1"/>
-          <p:cNvSpPr>
-            <a:spLocks noGrp="1"/>
-          </p:cNvSpPr>
-          <p:nvPr>
-            <p:ph type="title"/>
-          </p:nvPr>
-        </p:nvSpPr>
-        <p:spPr/>
-        <p:txBody>
-          <a:bodyPr/>
-          <a:lstStyle/>
-          <a:p>
-            <a:pPr lvl="0" indent="0" marL="0">
-              <a:buNone/>
-            </a:pPr>
-            <a:r>
-              <a:rPr/>
-              <a:t>Balls in an urn analogy</a:t>
-            </a:r>
-          </a:p>
-        </p:txBody>
-      </p:sp>
-      <p:sp>
-        <p:nvSpPr>
-          <p:cNvPr id="3" name="Content Placeholder 2"/>
-          <p:cNvSpPr>
-            <a:spLocks noGrp="1"/>
-          </p:cNvSpPr>
-          <p:nvPr>
-            <p:ph idx="1"/>
-          </p:nvPr>
-        </p:nvSpPr>
-        <p:spPr/>
-        <p:txBody>
-          <a:bodyPr/>
-          <a:lstStyle/>
-          <a:p>
-            <a:pPr lvl="0" indent="0">
-              <a:buNone/>
-            </a:pPr>
-            <a:r>
-              <a:rPr>
-                <a:latin typeface="Courier"/>
-              </a:rPr>
-              <a:t>
- |    W           |
- |       B        |
- |  B        B    |
- |          W     |
- |     W       B  |
- |        W       |
- __________________
-</a:t>
-            </a:r>
-          </a:p>
-        </p:txBody>
-      </p:sp>
-    </p:spTree>
-  </p:cSld>
-</p:sld>
-</file>
-
 <file path=ppt/slides/slide14.xml><?xml version="1.0" encoding="utf-8"?>
 <p:sld xmlns:a="http://schemas.openxmlformats.org/drawingml/2006/main" xmlns:r="http://schemas.openxmlformats.org/officeDocument/2006/relationships" xmlns:p="http://schemas.openxmlformats.org/presentationml/2006/main">
   <p:cSld>
@@ -4920,7 +4936,7 @@
             </a:pPr>
             <a:r>
               <a:rPr/>
-              <a:t>Use the hypergeometric distribution</a:t>
+              <a:t>Balls in an urn analogy</a:t>
             </a:r>
           </a:p>
         </p:txBody>
@@ -4940,31 +4956,22 @@
           <a:bodyPr/>
           <a:lstStyle/>
           <a:p>
-            <a:pPr lvl="0"/>
-            <a:r>
-              <a:rPr/>
-              <a:t>SAS: PDF(‘HYPER’, 3, 8, 4, 4)</a:t>
-            </a:r>
-          </a:p>
-          <a:p>
-            <a:pPr lvl="0"/>
-            <a:r>
-              <a:rPr/>
-              <a:t>R: dhyper(3, 4, 4, 4)</a:t>
-            </a:r>
-          </a:p>
-          <a:p>
-            <a:pPr lvl="0"/>
-            <a:r>
-              <a:rPr/>
-              <a:t>Stata: dis hypergeometricp(8, 4, 4, 3)</a:t>
-            </a:r>
-          </a:p>
-          <a:p>
-            <a:pPr lvl="0"/>
-            <a:r>
-              <a:rPr/>
-              <a:t>SPSS: PDF.HYPER(3, 8, 4, 4)</a:t>
+            <a:pPr lvl="0" indent="0">
+              <a:buNone/>
+            </a:pPr>
+            <a:r>
+              <a:rPr>
+                <a:latin typeface="Courier"/>
+              </a:rPr>
+              <a:t>
+ |    W           |
+ |       B        |
+ |  B        B    |
+ |          W     |
+ |     W       B  |
+ |        W       |
+ __________________
+</a:t>
             </a:r>
           </a:p>
         </p:txBody>
@@ -5034,63 +5041,28 @@
             <a:pPr lvl="0"/>
             <a:r>
               <a:rPr/>
-              <a:t>W=# of white balls in the urn</a:t>
+              <a:t>SAS: PDF(‘HYPER’, 3, 8, 4, 4)</a:t>
             </a:r>
           </a:p>
           <a:p>
             <a:pPr lvl="0"/>
             <a:r>
               <a:rPr/>
-              <a:t>B=# of black balls in the urn</a:t>
+              <a:t>R: dhyper(3, 4, 4, 4)</a:t>
             </a:r>
           </a:p>
           <a:p>
             <a:pPr lvl="0"/>
             <a:r>
               <a:rPr/>
-              <a:t>N=W+B=# of balls total in the urn</a:t>
+              <a:t>Stata: dis hypergeometricp(8, 4, 4, 3)</a:t>
             </a:r>
           </a:p>
           <a:p>
             <a:pPr lvl="0"/>
             <a:r>
               <a:rPr/>
-              <a:t>d=# of balls drawn from the urn</a:t>
-            </a:r>
-          </a:p>
-          <a:p>
-            <a:pPr lvl="0"/>
-            <a:r>
-              <a:rPr/>
-              <a:t>x=# of drawn balls that are white</a:t>
-            </a:r>
-          </a:p>
-          <a:p>
-            <a:pPr lvl="1"/>
-            <a:r>
-              <a:rPr/>
-              <a:t>SAS: PDF(‘HYPER’, x, N, W, d)</a:t>
-            </a:r>
-          </a:p>
-          <a:p>
-            <a:pPr lvl="1"/>
-            <a:r>
-              <a:rPr/>
-              <a:t>R: dhyper(x, W, B, d)</a:t>
-            </a:r>
-          </a:p>
-          <a:p>
-            <a:pPr lvl="1"/>
-            <a:r>
-              <a:rPr/>
-              <a:t>Stata: dis hypergeometricp(N, W, d, x)</a:t>
-            </a:r>
-          </a:p>
-          <a:p>
-            <a:pPr lvl="1"/>
-            <a:r>
-              <a:rPr/>
-              <a:t>SPSS: PDF.HYPER(x, N, W, D)</a:t>
+              <a:t>SPSS: PDF.HYPER(3, 8, 4, 4)</a:t>
             </a:r>
           </a:p>
         </p:txBody>
@@ -5101,6 +5073,213 @@
 </file>
 
 <file path=ppt/slides/slide16.xml><?xml version="1.0" encoding="utf-8"?>
+<p:sld xmlns:a="http://schemas.openxmlformats.org/drawingml/2006/main" xmlns:r="http://schemas.openxmlformats.org/officeDocument/2006/relationships" xmlns:p="http://schemas.openxmlformats.org/presentationml/2006/main">
+  <p:cSld>
+    <p:spTree>
+      <p:nvGrpSpPr>
+        <p:cNvPr id="1" name=""/>
+        <p:cNvGrpSpPr/>
+        <p:nvPr/>
+      </p:nvGrpSpPr>
+      <p:grpSpPr>
+        <a:xfrm>
+          <a:off x="0" y="0"/>
+          <a:ext cx="0" cy="0"/>
+          <a:chOff x="0" y="0"/>
+          <a:chExt cx="0" cy="0"/>
+        </a:xfrm>
+      </p:grpSpPr>
+      <p:sp>
+        <p:nvSpPr>
+          <p:cNvPr id="2" name="Title 1"/>
+          <p:cNvSpPr>
+            <a:spLocks noGrp="1"/>
+          </p:cNvSpPr>
+          <p:nvPr>
+            <p:ph type="title"/>
+          </p:nvPr>
+        </p:nvSpPr>
+        <p:spPr/>
+        <p:txBody>
+          <a:bodyPr/>
+          <a:lstStyle/>
+          <a:p>
+            <a:pPr lvl="0" indent="0" marL="0">
+              <a:buNone/>
+            </a:pPr>
+            <a:r>
+              <a:rPr/>
+              <a:t>Use the hypergeometric distribution</a:t>
+            </a:r>
+          </a:p>
+        </p:txBody>
+      </p:sp>
+      <p:sp>
+        <p:nvSpPr>
+          <p:cNvPr id="3" name="Content Placeholder 2"/>
+          <p:cNvSpPr>
+            <a:spLocks noGrp="1"/>
+          </p:cNvSpPr>
+          <p:nvPr>
+            <p:ph idx="1"/>
+          </p:nvPr>
+        </p:nvSpPr>
+        <p:spPr/>
+        <p:txBody>
+          <a:bodyPr/>
+          <a:lstStyle/>
+          <a:p>
+            <a:pPr lvl="0"/>
+            <a:r>
+              <a:rPr/>
+              <a:t>W=# of white balls in the urn</a:t>
+            </a:r>
+          </a:p>
+          <a:p>
+            <a:pPr lvl="0"/>
+            <a:r>
+              <a:rPr/>
+              <a:t>B=# of black balls in the urn</a:t>
+            </a:r>
+          </a:p>
+          <a:p>
+            <a:pPr lvl="0"/>
+            <a:r>
+              <a:rPr/>
+              <a:t>N=W+B=# of balls total in the urn</a:t>
+            </a:r>
+          </a:p>
+          <a:p>
+            <a:pPr lvl="0"/>
+            <a:r>
+              <a:rPr/>
+              <a:t>d=# of balls drawn from the urn</a:t>
+            </a:r>
+          </a:p>
+          <a:p>
+            <a:pPr lvl="0"/>
+            <a:r>
+              <a:rPr/>
+              <a:t>x=# of drawn balls that are white</a:t>
+            </a:r>
+          </a:p>
+          <a:p>
+            <a:pPr lvl="1"/>
+            <a:r>
+              <a:rPr/>
+              <a:t>SAS: PDF(‘HYPER’, x, N, W, d)</a:t>
+            </a:r>
+          </a:p>
+          <a:p>
+            <a:pPr lvl="1"/>
+            <a:r>
+              <a:rPr/>
+              <a:t>R: dhyper(x, W, B, d)</a:t>
+            </a:r>
+          </a:p>
+          <a:p>
+            <a:pPr lvl="1"/>
+            <a:r>
+              <a:rPr/>
+              <a:t>Stata: dis hypergeometricp(N, W, d, x)</a:t>
+            </a:r>
+          </a:p>
+          <a:p>
+            <a:pPr lvl="1"/>
+            <a:r>
+              <a:rPr/>
+              <a:t>SPSS: PDF.HYPER(x, N, W, D)</a:t>
+            </a:r>
+          </a:p>
+        </p:txBody>
+      </p:sp>
+    </p:spTree>
+  </p:cSld>
+</p:sld>
+</file>
+
+<file path=ppt/slides/slide17.xml><?xml version="1.0" encoding="utf-8"?>
+<p:sld xmlns:a="http://schemas.openxmlformats.org/drawingml/2006/main" xmlns:r="http://schemas.openxmlformats.org/officeDocument/2006/relationships" xmlns:p="http://schemas.openxmlformats.org/presentationml/2006/main">
+  <p:cSld>
+    <p:spTree>
+      <p:nvGrpSpPr>
+        <p:cNvPr id="1" name=""/>
+        <p:cNvGrpSpPr/>
+        <p:nvPr/>
+      </p:nvGrpSpPr>
+      <p:grpSpPr>
+        <a:xfrm>
+          <a:off x="0" y="0"/>
+          <a:ext cx="0" cy="0"/>
+          <a:chOff x="0" y="0"/>
+          <a:chExt cx="0" cy="0"/>
+        </a:xfrm>
+      </p:grpSpPr>
+      <p:sp>
+        <p:nvSpPr>
+          <p:cNvPr id="2" name="Title 1"/>
+          <p:cNvSpPr>
+            <a:spLocks noGrp="1"/>
+          </p:cNvSpPr>
+          <p:nvPr>
+            <p:ph type="title"/>
+          </p:nvPr>
+        </p:nvSpPr>
+        <p:spPr/>
+        <p:txBody>
+          <a:bodyPr/>
+          <a:lstStyle/>
+          <a:p>
+            <a:pPr lvl="0" indent="0" marL="0">
+              <a:buNone/>
+            </a:pPr>
+            <a:r>
+              <a:rPr/>
+              <a:t>Break #2</a:t>
+            </a:r>
+          </a:p>
+        </p:txBody>
+      </p:sp>
+      <p:sp>
+        <p:nvSpPr>
+          <p:cNvPr id="3" name="Content Placeholder 2"/>
+          <p:cNvSpPr>
+            <a:spLocks noGrp="1"/>
+          </p:cNvSpPr>
+          <p:nvPr>
+            <p:ph idx="1"/>
+          </p:nvPr>
+        </p:nvSpPr>
+        <p:spPr/>
+        <p:txBody>
+          <a:bodyPr/>
+          <a:lstStyle/>
+          <a:p>
+            <a:pPr lvl="0" indent="0" marL="0">
+              <a:buNone/>
+            </a:pPr>
+            <a:r>
+              <a:rPr/>
+              <a:t>What have you learned? + The hypergeometric distribution</a:t>
+            </a:r>
+          </a:p>
+          <a:p>
+            <a:pPr lvl="0" indent="0" marL="0">
+              <a:buNone/>
+            </a:pPr>
+            <a:r>
+              <a:rPr/>
+              <a:t>What is coming next? + Using SPSS and Stata</a:t>
+            </a:r>
+          </a:p>
+        </p:txBody>
+      </p:sp>
+    </p:spTree>
+  </p:cSld>
+</p:sld>
+</file>
+
+<file path=ppt/slides/slide18.xml><?xml version="1.0" encoding="utf-8"?>
 <p:sld xmlns:a="http://schemas.openxmlformats.org/drawingml/2006/main" xmlns:r="http://schemas.openxmlformats.org/officeDocument/2006/relationships" xmlns:p="http://schemas.openxmlformats.org/presentationml/2006/main">
   <p:cSld>
     <p:spTree>
@@ -5207,7 +5386,7 @@
 </p:sld>
 </file>
 
-<file path=ppt/slides/slide17.xml><?xml version="1.0" encoding="utf-8"?>
+<file path=ppt/slides/slide19.xml><?xml version="1.0" encoding="utf-8"?>
 <p:sld xmlns:a="http://schemas.openxmlformats.org/drawingml/2006/main" xmlns:r="http://schemas.openxmlformats.org/officeDocument/2006/relationships" xmlns:p="http://schemas.openxmlformats.org/presentationml/2006/main">
   <p:cSld>
     <p:spTree>
@@ -5305,220 +5484,6 @@
             <a:r>
               <a:rPr/>
               <a:t>Figure 7. SPSS Dialog box</a:t>
-            </a:r>
-          </a:p>
-        </p:txBody>
-      </p:sp>
-    </p:spTree>
-  </p:cSld>
-</p:sld>
-</file>
-
-<file path=ppt/slides/slide18.xml><?xml version="1.0" encoding="utf-8"?>
-<p:sld xmlns:a="http://schemas.openxmlformats.org/drawingml/2006/main" xmlns:r="http://schemas.openxmlformats.org/officeDocument/2006/relationships" xmlns:p="http://schemas.openxmlformats.org/presentationml/2006/main">
-  <p:cSld>
-    <p:spTree>
-      <p:nvGrpSpPr>
-        <p:cNvPr id="1" name=""/>
-        <p:cNvGrpSpPr/>
-        <p:nvPr/>
-      </p:nvGrpSpPr>
-      <p:grpSpPr>
-        <a:xfrm>
-          <a:off x="0" y="0"/>
-          <a:ext cx="0" cy="0"/>
-          <a:chOff x="0" y="0"/>
-          <a:chExt cx="0" cy="0"/>
-        </a:xfrm>
-      </p:grpSpPr>
-      <p:sp>
-        <p:nvSpPr>
-          <p:cNvPr id="2" name="Title 1"/>
-          <p:cNvSpPr>
-            <a:spLocks noGrp="1"/>
-          </p:cNvSpPr>
-          <p:nvPr>
-            <p:ph type="title"/>
-          </p:nvPr>
-        </p:nvSpPr>
-        <p:spPr/>
-        <p:txBody>
-          <a:bodyPr/>
-          <a:lstStyle/>
-          <a:p>
-            <a:pPr lvl="0" indent="0" marL="0">
-              <a:buNone/>
-            </a:pPr>
-            <a:r>
-              <a:rPr/>
-              <a:t>Fisher’s Exact Test in SPSS (3/4)</a:t>
-            </a:r>
-          </a:p>
-        </p:txBody>
-      </p:sp>
-      <p:pic>
-        <p:nvPicPr>
-          <p:cNvPr descr="fig:  ../images/spss-dialog-box-2.png" id="0" name="Picture 1"/>
-          <p:cNvPicPr>
-            <a:picLocks noGrp="1" noChangeAspect="1"/>
-          </p:cNvPicPr>
-          <p:nvPr/>
-        </p:nvPicPr>
-        <p:blipFill>
-          <a:blip r:embed="rId2"/>
-          <a:stretch>
-            <a:fillRect/>
-          </a:stretch>
-        </p:blipFill>
-        <p:spPr bwMode="auto">
-          <a:xfrm>
-            <a:off x="3644900" y="1600200"/>
-            <a:ext cx="4914900" cy="4013200"/>
-          </a:xfrm>
-          <a:prstGeom prst="rect">
-            <a:avLst/>
-          </a:prstGeom>
-          <a:noFill/>
-          <a:ln w="9525">
-            <a:noFill/>
-            <a:headEnd/>
-            <a:tailEnd/>
-          </a:ln>
-        </p:spPr>
-      </p:pic>
-      <p:sp>
-        <p:nvSpPr>
-          <p:cNvPr id="1" name="TextBox 3"/>
-          <p:cNvSpPr txBox="1"/>
-          <p:nvPr/>
-        </p:nvSpPr>
-        <p:spPr>
-          <a:xfrm>
-            <a:off x="609600" y="5613400"/>
-            <a:ext cx="10972800" cy="508000"/>
-          </a:xfrm>
-          <a:prstGeom prst="rect">
-            <a:avLst/>
-          </a:prstGeom>
-          <a:noFill/>
-        </p:spPr>
-        <p:txBody>
-          <a:bodyPr/>
-          <a:lstStyle/>
-          <a:p>
-            <a:pPr lvl="0" indent="0" marL="0" algn="ctr">
-              <a:buNone/>
-            </a:pPr>
-            <a:r>
-              <a:rPr/>
-              <a:t>Figure 7. SPSS Dialog box</a:t>
-            </a:r>
-          </a:p>
-        </p:txBody>
-      </p:sp>
-    </p:spTree>
-  </p:cSld>
-</p:sld>
-</file>
-
-<file path=ppt/slides/slide19.xml><?xml version="1.0" encoding="utf-8"?>
-<p:sld xmlns:a="http://schemas.openxmlformats.org/drawingml/2006/main" xmlns:r="http://schemas.openxmlformats.org/officeDocument/2006/relationships" xmlns:p="http://schemas.openxmlformats.org/presentationml/2006/main">
-  <p:cSld>
-    <p:spTree>
-      <p:nvGrpSpPr>
-        <p:cNvPr id="1" name=""/>
-        <p:cNvGrpSpPr/>
-        <p:nvPr/>
-      </p:nvGrpSpPr>
-      <p:grpSpPr>
-        <a:xfrm>
-          <a:off x="0" y="0"/>
-          <a:ext cx="0" cy="0"/>
-          <a:chOff x="0" y="0"/>
-          <a:chExt cx="0" cy="0"/>
-        </a:xfrm>
-      </p:grpSpPr>
-      <p:sp>
-        <p:nvSpPr>
-          <p:cNvPr id="2" name="Title 1"/>
-          <p:cNvSpPr>
-            <a:spLocks noGrp="1"/>
-          </p:cNvSpPr>
-          <p:nvPr>
-            <p:ph type="title"/>
-          </p:nvPr>
-        </p:nvSpPr>
-        <p:spPr/>
-        <p:txBody>
-          <a:bodyPr/>
-          <a:lstStyle/>
-          <a:p>
-            <a:pPr lvl="0" indent="0" marL="0">
-              <a:buNone/>
-            </a:pPr>
-            <a:r>
-              <a:rPr/>
-              <a:t>Fisher’s Exact Test in SPSS (4/4)</a:t>
-            </a:r>
-          </a:p>
-        </p:txBody>
-      </p:sp>
-      <p:pic>
-        <p:nvPicPr>
-          <p:cNvPr descr="fig:  ../images/spss-output.png" id="0" name="Picture 1"/>
-          <p:cNvPicPr>
-            <a:picLocks noGrp="1" noChangeAspect="1"/>
-          </p:cNvPicPr>
-          <p:nvPr/>
-        </p:nvPicPr>
-        <p:blipFill>
-          <a:blip r:embed="rId2"/>
-          <a:stretch>
-            <a:fillRect/>
-          </a:stretch>
-        </p:blipFill>
-        <p:spPr bwMode="auto">
-          <a:xfrm>
-            <a:off x="3657600" y="1600200"/>
-            <a:ext cx="4876800" cy="4013200"/>
-          </a:xfrm>
-          <a:prstGeom prst="rect">
-            <a:avLst/>
-          </a:prstGeom>
-          <a:noFill/>
-          <a:ln w="9525">
-            <a:noFill/>
-            <a:headEnd/>
-            <a:tailEnd/>
-          </a:ln>
-        </p:spPr>
-      </p:pic>
-      <p:sp>
-        <p:nvSpPr>
-          <p:cNvPr id="1" name="TextBox 3"/>
-          <p:cNvSpPr txBox="1"/>
-          <p:nvPr/>
-        </p:nvSpPr>
-        <p:spPr>
-          <a:xfrm>
-            <a:off x="609600" y="5613400"/>
-            <a:ext cx="10972800" cy="508000"/>
-          </a:xfrm>
-          <a:prstGeom prst="rect">
-            <a:avLst/>
-          </a:prstGeom>
-          <a:noFill/>
-        </p:spPr>
-        <p:txBody>
-          <a:bodyPr/>
-          <a:lstStyle/>
-          <a:p>
-            <a:pPr lvl="0" indent="0" marL="0" algn="ctr">
-              <a:buNone/>
-            </a:pPr>
-            <a:r>
-              <a:rPr/>
-              <a:t>Figure 7. SPSS output box</a:t>
             </a:r>
           </a:p>
         </p:txBody>
@@ -5642,41 +5607,67 @@
             </a:pPr>
             <a:r>
               <a:rPr/>
-              <a:t>Fisher’s Exact Test in R (1/2)</a:t>
-            </a:r>
-          </a:p>
-        </p:txBody>
-      </p:sp>
-      <p:sp>
-        <p:nvSpPr>
-          <p:cNvPr id="3" name="Content Placeholder 2"/>
-          <p:cNvSpPr>
-            <a:spLocks noGrp="1"/>
-          </p:cNvSpPr>
-          <p:nvPr>
-            <p:ph idx="1"/>
-          </p:nvPr>
-        </p:nvSpPr>
-        <p:spPr/>
-        <p:txBody>
-          <a:bodyPr/>
-          <a:lstStyle/>
-          <a:p>
-            <a:pPr lvl="0" indent="0">
-              <a:buNone/>
-            </a:pPr>
-            <a:r>
-              <a:rPr>
-                <a:latin typeface="Courier"/>
-              </a:rPr>
-              <a:t>labs &lt;- c(
-  "Milk first",
-  "Tea first")
-guess &lt;- c(1, 2, 1, 2, 2, 2, 1, 1) 
-truth &lt;- c(2, 2, 1, 2, 2, 1, 1, 1)
-fisher.test(
-  factor(guess, labels=labs), 
-  factor(truth, labels=labs))</a:t>
+              <a:t>Fisher’s Exact Test in SPSS (3/4)</a:t>
+            </a:r>
+          </a:p>
+        </p:txBody>
+      </p:sp>
+      <p:pic>
+        <p:nvPicPr>
+          <p:cNvPr descr="fig:  ../images/spss-dialog-box-2.png" id="0" name="Picture 1"/>
+          <p:cNvPicPr>
+            <a:picLocks noGrp="1" noChangeAspect="1"/>
+          </p:cNvPicPr>
+          <p:nvPr/>
+        </p:nvPicPr>
+        <p:blipFill>
+          <a:blip r:embed="rId2"/>
+          <a:stretch>
+            <a:fillRect/>
+          </a:stretch>
+        </p:blipFill>
+        <p:spPr bwMode="auto">
+          <a:xfrm>
+            <a:off x="3644900" y="1600200"/>
+            <a:ext cx="4914900" cy="4013200"/>
+          </a:xfrm>
+          <a:prstGeom prst="rect">
+            <a:avLst/>
+          </a:prstGeom>
+          <a:noFill/>
+          <a:ln w="9525">
+            <a:noFill/>
+            <a:headEnd/>
+            <a:tailEnd/>
+          </a:ln>
+        </p:spPr>
+      </p:pic>
+      <p:sp>
+        <p:nvSpPr>
+          <p:cNvPr id="1" name="TextBox 3"/>
+          <p:cNvSpPr txBox="1"/>
+          <p:nvPr/>
+        </p:nvSpPr>
+        <p:spPr>
+          <a:xfrm>
+            <a:off x="609600" y="5613400"/>
+            <a:ext cx="10972800" cy="508000"/>
+          </a:xfrm>
+          <a:prstGeom prst="rect">
+            <a:avLst/>
+          </a:prstGeom>
+          <a:noFill/>
+        </p:spPr>
+        <p:txBody>
+          <a:bodyPr/>
+          <a:lstStyle/>
+          <a:p>
+            <a:pPr lvl="0" indent="0" marL="0" algn="ctr">
+              <a:buNone/>
+            </a:pPr>
+            <a:r>
+              <a:rPr/>
+              <a:t>Figure 7. SPSS Dialog box</a:t>
             </a:r>
           </a:p>
         </p:txBody>
@@ -5723,40 +5714,67 @@
             </a:pPr>
             <a:r>
               <a:rPr/>
-              <a:t>Fisher’s Exact Test in R (2/2)</a:t>
-            </a:r>
-          </a:p>
-        </p:txBody>
-      </p:sp>
-      <p:sp>
-        <p:nvSpPr>
-          <p:cNvPr id="3" name="Content Placeholder 2"/>
-          <p:cNvSpPr>
-            <a:spLocks noGrp="1"/>
-          </p:cNvSpPr>
-          <p:nvPr>
-            <p:ph idx="1"/>
-          </p:nvPr>
-        </p:nvSpPr>
-        <p:spPr/>
-        <p:txBody>
-          <a:bodyPr/>
-          <a:lstStyle/>
-          <a:p>
-            <a:pPr lvl="0" indent="0">
-              <a:buNone/>
-            </a:pPr>
-            <a:r>
-              <a:rPr>
-                <a:latin typeface="Courier"/>
-              </a:rPr>
-              <a:t>p-value = 0.4857
-alternative hypothesis: true odds ratio is not equal to 1
-95 percent confidence interval:
-   0.2117329 621.9337505
-sample estimates:
-odds ratio 
-  6.408309 </a:t>
+              <a:t>Fisher’s Exact Test in SPSS (4/4)</a:t>
+            </a:r>
+          </a:p>
+        </p:txBody>
+      </p:sp>
+      <p:pic>
+        <p:nvPicPr>
+          <p:cNvPr descr="fig:  ../images/spss-output.png" id="0" name="Picture 1"/>
+          <p:cNvPicPr>
+            <a:picLocks noGrp="1" noChangeAspect="1"/>
+          </p:cNvPicPr>
+          <p:nvPr/>
+        </p:nvPicPr>
+        <p:blipFill>
+          <a:blip r:embed="rId2"/>
+          <a:stretch>
+            <a:fillRect/>
+          </a:stretch>
+        </p:blipFill>
+        <p:spPr bwMode="auto">
+          <a:xfrm>
+            <a:off x="3657600" y="1600200"/>
+            <a:ext cx="4876800" cy="4013200"/>
+          </a:xfrm>
+          <a:prstGeom prst="rect">
+            <a:avLst/>
+          </a:prstGeom>
+          <a:noFill/>
+          <a:ln w="9525">
+            <a:noFill/>
+            <a:headEnd/>
+            <a:tailEnd/>
+          </a:ln>
+        </p:spPr>
+      </p:pic>
+      <p:sp>
+        <p:nvSpPr>
+          <p:cNvPr id="1" name="TextBox 3"/>
+          <p:cNvSpPr txBox="1"/>
+          <p:nvPr/>
+        </p:nvSpPr>
+        <p:spPr>
+          <a:xfrm>
+            <a:off x="609600" y="5613400"/>
+            <a:ext cx="10972800" cy="508000"/>
+          </a:xfrm>
+          <a:prstGeom prst="rect">
+            <a:avLst/>
+          </a:prstGeom>
+          <a:noFill/>
+        </p:spPr>
+        <p:txBody>
+          <a:bodyPr/>
+          <a:lstStyle/>
+          <a:p>
+            <a:pPr lvl="0" indent="0" marL="0" algn="ctr">
+              <a:buNone/>
+            </a:pPr>
+            <a:r>
+              <a:rPr/>
+              <a:t>Figure 7. SPSS output box</a:t>
             </a:r>
           </a:p>
         </p:txBody>
@@ -5879,7 +5897,7 @@
             </a:pPr>
             <a:r>
               <a:rPr/>
-              <a:t>How do you compute the p-value? (1/5)</a:t>
+              <a:t>Break #3</a:t>
             </a:r>
           </a:p>
         </p:txBody>
@@ -5904,7 +5922,7 @@
             </a:pPr>
             <a:r>
               <a:rPr/>
-              <a:t>p-value=P[sample results or more extreme| H0]</a:t>
+              <a:t>What have you learned? + Using SPSS and Stata</a:t>
             </a:r>
           </a:p>
           <a:p>
@@ -5913,7 +5931,7 @@
             </a:pPr>
             <a:r>
               <a:rPr/>
-              <a:t>What does “more extreme” mean?</a:t>
+              <a:t>What’s coming next? + Details on the p-value computation</a:t>
             </a:r>
           </a:p>
         </p:txBody>
@@ -5960,7 +5978,7 @@
             </a:pPr>
             <a:r>
               <a:rPr/>
-              <a:t>How do you compute the p-value? (2/5)</a:t>
+              <a:t>Details on the p-value computation (1/5)</a:t>
             </a:r>
           </a:p>
         </p:txBody>
@@ -5985,21 +6003,16 @@
             </a:pPr>
             <a:r>
               <a:rPr/>
-              <a:t>List all possible 2 by 2 tables</a:t>
-            </a:r>
-          </a:p>
-          <a:p>
-            <a:pPr lvl="0" indent="0">
-              <a:buNone/>
-            </a:pPr>
-            <a:r>
-              <a:rPr>
-                <a:latin typeface="Courier"/>
-              </a:rPr>
-              <a:t>  ? ? | 4
-  ? ? | 4
-  ----+--
-  4 4 | 8</a:t>
+              <a:t>p-value=P[sample results or more extreme| H0]</a:t>
+            </a:r>
+          </a:p>
+          <a:p>
+            <a:pPr lvl="0" indent="0" marL="0">
+              <a:buNone/>
+            </a:pPr>
+            <a:r>
+              <a:rPr/>
+              <a:t>What does “more extreme” mean?</a:t>
             </a:r>
           </a:p>
         </p:txBody>
@@ -6046,7 +6059,7 @@
             </a:pPr>
             <a:r>
               <a:rPr/>
-              <a:t>How do you compute the p-value? (3/5)</a:t>
+              <a:t>Details on the p-value computation (2/5)</a:t>
             </a:r>
           </a:p>
         </p:txBody>
@@ -6065,6 +6078,15 @@
         <p:txBody>
           <a:bodyPr/>
           <a:lstStyle/>
+          <a:p>
+            <a:pPr lvl="0" indent="0" marL="0">
+              <a:buNone/>
+            </a:pPr>
+            <a:r>
+              <a:rPr/>
+              <a:t>List all possible 2 by 2 tables</a:t>
+            </a:r>
+          </a:p>
           <a:p>
             <a:pPr lvl="0" indent="0">
               <a:buNone/>
@@ -6073,9 +6095,10 @@
               <a:rPr>
                 <a:latin typeface="Courier"/>
               </a:rPr>
-              <a:t>   4 0     3 1     2 2     1 3     0 4
-   0 4     1 3     2 2     3 1     4 0
-  1.4%   22.9%   51.4%   22.9%    1.4%</a:t>
+              <a:t>  ? ? | 4
+  ? ? | 4
+  ----+--
+  4 4 | 8</a:t>
             </a:r>
           </a:p>
         </p:txBody>
@@ -6122,7 +6145,7 @@
             </a:pPr>
             <a:r>
               <a:rPr/>
-              <a:t>How do you compute the p-value? (4/5)</a:t>
+              <a:t>Details on the p-value computation (3/5)</a:t>
             </a:r>
           </a:p>
         </p:txBody>
@@ -6141,15 +6164,6 @@
         <p:txBody>
           <a:bodyPr/>
           <a:lstStyle/>
-          <a:p>
-            <a:pPr lvl="0" indent="0" marL="0">
-              <a:buNone/>
-            </a:pPr>
-            <a:r>
-              <a:rPr/>
-              <a:t>For a one-sided p-value</a:t>
-            </a:r>
-          </a:p>
           <a:p>
             <a:pPr lvl="0" indent="0">
               <a:buNone/>
@@ -6158,9 +6172,9 @@
               <a:rPr>
                 <a:latin typeface="Courier"/>
               </a:rPr>
-              <a:t>   4 0     3 1
-   0 4     1 3
-  1.4% + 22.9% = 24.3%</a:t>
+              <a:t> 4  0    3  1    2  2    1  3    0  4
+ 0  4    1  3    2  2    3  1    4  0
+0.014   0.229   0.514   0.229   0.014</a:t>
             </a:r>
           </a:p>
         </p:txBody>
@@ -6207,7 +6221,7 @@
             </a:pPr>
             <a:r>
               <a:rPr/>
-              <a:t>How do you compute the p-value? (5/5)</a:t>
+              <a:t>Details on the p-value computation (4/5)</a:t>
             </a:r>
           </a:p>
         </p:txBody>
@@ -6232,7 +6246,7 @@
             </a:pPr>
             <a:r>
               <a:rPr/>
-              <a:t>For a two sided p-value</a:t>
+              <a:t>For a one-sided p-value</a:t>
             </a:r>
           </a:p>
           <a:p>
@@ -6243,9 +6257,10 @@
               <a:rPr>
                 <a:latin typeface="Courier"/>
               </a:rPr>
-              <a:t>   4 0     3 1             1 3     0 4
-   0 4     1 3             3 1     4 0
-  1.4% + 22.9%      +    22.9% +  1.4% = 48.6%</a:t>
+              <a:t> 4  0    3  1
+ 0  4    1  3
+0.014 + 0.229
+p-value = 0.243</a:t>
             </a:r>
           </a:p>
         </p:txBody>
@@ -6292,7 +6307,7 @@
             </a:pPr>
             <a:r>
               <a:rPr/>
-              <a:t>Mann-Whitney U</a:t>
+              <a:t>Details on the p-value computation (5/5)</a:t>
             </a:r>
           </a:p>
         </p:txBody>
@@ -6311,6 +6326,15 @@
         <p:txBody>
           <a:bodyPr/>
           <a:lstStyle/>
+          <a:p>
+            <a:pPr lvl="0" indent="0" marL="0">
+              <a:buNone/>
+            </a:pPr>
+            <a:r>
+              <a:rPr/>
+              <a:t>For a two sided p-value</a:t>
+            </a:r>
+          </a:p>
           <a:p>
             <a:pPr lvl="0" indent="0">
               <a:buNone/>
@@ -6319,13 +6343,10 @@
               <a:rPr>
                 <a:latin typeface="Courier"/>
               </a:rPr>
-              <a:t>1,2,3  1,2,4  1,2,5  1,2,6  1,2,7
-1,3,4  1,3,5  1,3,6  1,3,7  1,4,5
-1,4,6  1,4,7  1,5,6  1,5,7  1,6,7
-2,3,4  2,3,5  2,3,6  2,3,7  2,4,5
-2,4,6  2,4,7  2,5,6  2,5,7  2,6,7
-3,4,5  3,4,6  3,4,7  3,5,6  3,5,7
-3,6,7  4,5,6  4,5,7  4,6,7  5,6,7</a:t>
+              <a:t> 4  0    3  1            1  3    0  4
+ 0  4    1  3            3  1    4  0
+0.014 + 0.229     +     0.229 + 0.014
+p-value = 0.486</a:t>
             </a:r>
           </a:p>
         </p:txBody>
@@ -6372,7 +6393,7 @@
             </a:pPr>
             <a:r>
               <a:rPr/>
-              <a:t>Mann-Whitney U</a:t>
+              <a:t>Break #4</a:t>
             </a:r>
           </a:p>
         </p:txBody>
@@ -6392,17 +6413,21 @@
           <a:bodyPr/>
           <a:lstStyle/>
           <a:p>
-            <a:pPr lvl="0" indent="0">
-              <a:buNone/>
-            </a:pPr>
-            <a:r>
-              <a:rPr>
-                <a:latin typeface="Courier"/>
-              </a:rPr>
-              <a:t>
-                            2,6,7
-                            3,5,7
-3,6,7  4,5,6  4,5,7  4,6,7  5,6,7</a:t>
+            <a:pPr lvl="0" indent="0" marL="0">
+              <a:buNone/>
+            </a:pPr>
+            <a:r>
+              <a:rPr/>
+              <a:t>What have you learned? + Details on the p-value computation</a:t>
+            </a:r>
+          </a:p>
+          <a:p>
+            <a:pPr lvl="0" indent="0" marL="0">
+              <a:buNone/>
+            </a:pPr>
+            <a:r>
+              <a:rPr/>
+              <a:t>What’s coming next? + More exact tests</a:t>
             </a:r>
           </a:p>
         </p:txBody>
@@ -6551,7 +6576,680 @@
             </a:pPr>
             <a:r>
               <a:rPr/>
+              <a:t>Fisher-Freeman-Halton test</a:t>
+            </a:r>
+          </a:p>
+        </p:txBody>
+      </p:sp>
+      <p:sp>
+        <p:nvSpPr>
+          <p:cNvPr id="3" name="Content Placeholder 2"/>
+          <p:cNvSpPr>
+            <a:spLocks noGrp="1"/>
+          </p:cNvSpPr>
+          <p:nvPr>
+            <p:ph idx="1"/>
+          </p:nvPr>
+        </p:nvSpPr>
+        <p:spPr/>
+        <p:txBody>
+          <a:bodyPr/>
+          <a:lstStyle/>
+          <a:p>
+            <a:pPr lvl="0"/>
+            <a:r>
+              <a:rPr/>
+              <a:t>Generalization of Fisher’s Exact test</a:t>
+            </a:r>
+          </a:p>
+          <a:p>
+            <a:pPr lvl="0"/>
+            <a:r>
+              <a:rPr/>
+              <a:t>Tabulate all possible R by C tables</a:t>
+            </a:r>
+          </a:p>
+          <a:p>
+            <a:pPr lvl="1"/>
+            <a:r>
+              <a:rPr/>
+              <a:t>Fixed row and column totals</a:t>
+            </a:r>
+          </a:p>
+        </p:txBody>
+      </p:sp>
+    </p:spTree>
+  </p:cSld>
+</p:sld>
+</file>
+
+<file path=ppt/slides/slide31.xml><?xml version="1.0" encoding="utf-8"?>
+<p:sld xmlns:a="http://schemas.openxmlformats.org/drawingml/2006/main" xmlns:r="http://schemas.openxmlformats.org/officeDocument/2006/relationships" xmlns:p="http://schemas.openxmlformats.org/presentationml/2006/main">
+  <p:cSld>
+    <p:spTree>
+      <p:nvGrpSpPr>
+        <p:cNvPr id="1" name=""/>
+        <p:cNvGrpSpPr/>
+        <p:nvPr/>
+      </p:nvGrpSpPr>
+      <p:grpSpPr>
+        <a:xfrm>
+          <a:off x="0" y="0"/>
+          <a:ext cx="0" cy="0"/>
+          <a:chOff x="0" y="0"/>
+          <a:chExt cx="0" cy="0"/>
+        </a:xfrm>
+      </p:grpSpPr>
+      <p:sp>
+        <p:nvSpPr>
+          <p:cNvPr id="2" name="Title 1"/>
+          <p:cNvSpPr>
+            <a:spLocks noGrp="1"/>
+          </p:cNvSpPr>
+          <p:nvPr>
+            <p:ph type="title"/>
+          </p:nvPr>
+        </p:nvSpPr>
+        <p:spPr/>
+        <p:txBody>
+          <a:bodyPr/>
+          <a:lstStyle/>
+          <a:p>
+            <a:pPr lvl="0" indent="0" marL="0">
+              <a:buNone/>
+            </a:pPr>
+            <a:r>
+              <a:rPr/>
+              <a:t>Fisher-Freeman-Halton test in R (1/2)</a:t>
+            </a:r>
+          </a:p>
+        </p:txBody>
+      </p:sp>
+      <p:sp>
+        <p:nvSpPr>
+          <p:cNvPr id="3" name="Content Placeholder 2"/>
+          <p:cNvSpPr>
+            <a:spLocks noGrp="1"/>
+          </p:cNvSpPr>
+          <p:nvPr>
+            <p:ph idx="1"/>
+          </p:nvPr>
+        </p:nvSpPr>
+        <p:spPr/>
+        <p:txBody>
+          <a:bodyPr/>
+          <a:lstStyle/>
+          <a:p>
+            <a:pPr lvl="0" indent="0">
+              <a:buNone/>
+            </a:pPr>
+            <a:r>
+              <a:rPr>
+                <a:latin typeface="Courier"/>
+              </a:rPr>
+              <a:t>&gt; v &lt;- c(4, 0, 0, 0, 4, 0, 0, 0, 4)
+&gt; m &lt;- matrix(v, nrow=3)
+&gt; m
+     [,1] [,2] [,3]
+[1,]    4    0    0
+[2,]    0    4    0
+[3,]    0    0    4</a:t>
+            </a:r>
+          </a:p>
+        </p:txBody>
+      </p:sp>
+    </p:spTree>
+  </p:cSld>
+</p:sld>
+</file>
+
+<file path=ppt/slides/slide32.xml><?xml version="1.0" encoding="utf-8"?>
+<p:sld xmlns:a="http://schemas.openxmlformats.org/drawingml/2006/main" xmlns:r="http://schemas.openxmlformats.org/officeDocument/2006/relationships" xmlns:p="http://schemas.openxmlformats.org/presentationml/2006/main">
+  <p:cSld>
+    <p:spTree>
+      <p:nvGrpSpPr>
+        <p:cNvPr id="1" name=""/>
+        <p:cNvGrpSpPr/>
+        <p:nvPr/>
+      </p:nvGrpSpPr>
+      <p:grpSpPr>
+        <a:xfrm>
+          <a:off x="0" y="0"/>
+          <a:ext cx="0" cy="0"/>
+          <a:chOff x="0" y="0"/>
+          <a:chExt cx="0" cy="0"/>
+        </a:xfrm>
+      </p:grpSpPr>
+      <p:sp>
+        <p:nvSpPr>
+          <p:cNvPr id="2" name="Title 1"/>
+          <p:cNvSpPr>
+            <a:spLocks noGrp="1"/>
+          </p:cNvSpPr>
+          <p:nvPr>
+            <p:ph type="title"/>
+          </p:nvPr>
+        </p:nvSpPr>
+        <p:spPr/>
+        <p:txBody>
+          <a:bodyPr/>
+          <a:lstStyle/>
+          <a:p>
+            <a:pPr lvl="0" indent="0" marL="0">
+              <a:buNone/>
+            </a:pPr>
+            <a:r>
+              <a:rPr/>
+              <a:t>Fisher-Freeman-Halton test in R (1/2)</a:t>
+            </a:r>
+          </a:p>
+        </p:txBody>
+      </p:sp>
+      <p:sp>
+        <p:nvSpPr>
+          <p:cNvPr id="3" name="Content Placeholder 2"/>
+          <p:cNvSpPr>
+            <a:spLocks noGrp="1"/>
+          </p:cNvSpPr>
+          <p:nvPr>
+            <p:ph idx="1"/>
+          </p:nvPr>
+        </p:nvSpPr>
+        <p:spPr/>
+        <p:txBody>
+          <a:bodyPr/>
+          <a:lstStyle/>
+          <a:p>
+            <a:pPr lvl="0" indent="0">
+              <a:buNone/>
+            </a:pPr>
+            <a:r>
+              <a:rPr>
+                <a:latin typeface="Courier"/>
+              </a:rPr>
+              <a:t>&gt; fisher.test(m)
+    Fisher's Exact Test for Count Data
+data:  m
+p-value = 0.0001732
+alternative hypothesis: two.sided </a:t>
+            </a:r>
+          </a:p>
+        </p:txBody>
+      </p:sp>
+    </p:spTree>
+  </p:cSld>
+</p:sld>
+</file>
+
+<file path=ppt/slides/slide33.xml><?xml version="1.0" encoding="utf-8"?>
+<p:sld xmlns:a="http://schemas.openxmlformats.org/drawingml/2006/main" xmlns:r="http://schemas.openxmlformats.org/officeDocument/2006/relationships" xmlns:p="http://schemas.openxmlformats.org/presentationml/2006/main">
+  <p:cSld>
+    <p:spTree>
+      <p:nvGrpSpPr>
+        <p:cNvPr id="1" name=""/>
+        <p:cNvGrpSpPr/>
+        <p:nvPr/>
+      </p:nvGrpSpPr>
+      <p:grpSpPr>
+        <a:xfrm>
+          <a:off x="0" y="0"/>
+          <a:ext cx="0" cy="0"/>
+          <a:chOff x="0" y="0"/>
+          <a:chExt cx="0" cy="0"/>
+        </a:xfrm>
+      </p:grpSpPr>
+      <p:sp>
+        <p:nvSpPr>
+          <p:cNvPr id="2" name="Title 1"/>
+          <p:cNvSpPr>
+            <a:spLocks noGrp="1"/>
+          </p:cNvSpPr>
+          <p:nvPr>
+            <p:ph type="title"/>
+          </p:nvPr>
+        </p:nvSpPr>
+        <p:spPr/>
+        <p:txBody>
+          <a:bodyPr/>
+          <a:lstStyle/>
+          <a:p>
+            <a:pPr lvl="0" indent="0" marL="0">
+              <a:buNone/>
+            </a:pPr>
+            <a:r>
+              <a:rPr/>
               <a:t>Mann-Whitney U</a:t>
+            </a:r>
+          </a:p>
+        </p:txBody>
+      </p:sp>
+      <p:sp>
+        <p:nvSpPr>
+          <p:cNvPr id="3" name="Content Placeholder 2"/>
+          <p:cNvSpPr>
+            <a:spLocks noGrp="1"/>
+          </p:cNvSpPr>
+          <p:nvPr>
+            <p:ph idx="1"/>
+          </p:nvPr>
+        </p:nvSpPr>
+        <p:spPr/>
+        <p:txBody>
+          <a:bodyPr/>
+          <a:lstStyle/>
+          <a:p>
+            <a:pPr lvl="0" indent="0" marL="0">
+              <a:buNone/>
+            </a:pPr>
+            <a:r>
+              <a:rPr/>
+              <a:t>Hypothetical data</a:t>
+            </a:r>
+          </a:p>
+          <a:p>
+            <a:pPr lvl="0" indent="0">
+              <a:buNone/>
+            </a:pPr>
+            <a:r>
+              <a:rPr>
+                <a:latin typeface="Courier"/>
+              </a:rPr>
+              <a:t>T: 14, 23, 37
+C: 12, 13, 15, 25</a:t>
+            </a:r>
+          </a:p>
+        </p:txBody>
+      </p:sp>
+    </p:spTree>
+  </p:cSld>
+</p:sld>
+</file>
+
+<file path=ppt/slides/slide34.xml><?xml version="1.0" encoding="utf-8"?>
+<p:sld xmlns:a="http://schemas.openxmlformats.org/drawingml/2006/main" xmlns:r="http://schemas.openxmlformats.org/officeDocument/2006/relationships" xmlns:p="http://schemas.openxmlformats.org/presentationml/2006/main">
+  <p:cSld>
+    <p:spTree>
+      <p:nvGrpSpPr>
+        <p:cNvPr id="1" name=""/>
+        <p:cNvGrpSpPr/>
+        <p:nvPr/>
+      </p:nvGrpSpPr>
+      <p:grpSpPr>
+        <a:xfrm>
+          <a:off x="0" y="0"/>
+          <a:ext cx="0" cy="0"/>
+          <a:chOff x="0" y="0"/>
+          <a:chExt cx="0" cy="0"/>
+        </a:xfrm>
+      </p:grpSpPr>
+      <p:sp>
+        <p:nvSpPr>
+          <p:cNvPr id="2" name="Title 1"/>
+          <p:cNvSpPr>
+            <a:spLocks noGrp="1"/>
+          </p:cNvSpPr>
+          <p:nvPr>
+            <p:ph type="title"/>
+          </p:nvPr>
+        </p:nvSpPr>
+        <p:spPr/>
+        <p:txBody>
+          <a:bodyPr/>
+          <a:lstStyle/>
+          <a:p>
+            <a:pPr lvl="0" indent="0" marL="0">
+              <a:buNone/>
+            </a:pPr>
+            <a:r>
+              <a:rPr/>
+              <a:t>Rank the data</a:t>
+            </a:r>
+          </a:p>
+        </p:txBody>
+      </p:sp>
+      <p:sp>
+        <p:nvSpPr>
+          <p:cNvPr id="3" name="Content Placeholder 2"/>
+          <p:cNvSpPr>
+            <a:spLocks noGrp="1"/>
+          </p:cNvSpPr>
+          <p:nvPr>
+            <p:ph idx="1"/>
+          </p:nvPr>
+        </p:nvSpPr>
+        <p:spPr/>
+        <p:txBody>
+          <a:bodyPr/>
+          <a:lstStyle/>
+          <a:p>
+            <a:pPr lvl="0" indent="0">
+              <a:buNone/>
+            </a:pPr>
+            <a:r>
+              <a:rPr>
+                <a:latin typeface="Courier"/>
+              </a:rPr>
+              <a:t>T:  3,  5,  7
+C:  1,  2,  4,  6</a:t>
+            </a:r>
+          </a:p>
+        </p:txBody>
+      </p:sp>
+    </p:spTree>
+  </p:cSld>
+</p:sld>
+</file>
+
+<file path=ppt/slides/slide35.xml><?xml version="1.0" encoding="utf-8"?>
+<p:sld xmlns:a="http://schemas.openxmlformats.org/drawingml/2006/main" xmlns:r="http://schemas.openxmlformats.org/officeDocument/2006/relationships" xmlns:p="http://schemas.openxmlformats.org/presentationml/2006/main">
+  <p:cSld>
+    <p:spTree>
+      <p:nvGrpSpPr>
+        <p:cNvPr id="1" name=""/>
+        <p:cNvGrpSpPr/>
+        <p:nvPr/>
+      </p:nvGrpSpPr>
+      <p:grpSpPr>
+        <a:xfrm>
+          <a:off x="0" y="0"/>
+          <a:ext cx="0" cy="0"/>
+          <a:chOff x="0" y="0"/>
+          <a:chExt cx="0" cy="0"/>
+        </a:xfrm>
+      </p:grpSpPr>
+      <p:sp>
+        <p:nvSpPr>
+          <p:cNvPr id="2" name="Title 1"/>
+          <p:cNvSpPr>
+            <a:spLocks noGrp="1"/>
+          </p:cNvSpPr>
+          <p:nvPr>
+            <p:ph type="title"/>
+          </p:nvPr>
+        </p:nvSpPr>
+        <p:spPr/>
+        <p:txBody>
+          <a:bodyPr/>
+          <a:lstStyle/>
+          <a:p>
+            <a:pPr lvl="0" indent="0" marL="0">
+              <a:buNone/>
+            </a:pPr>
+            <a:r>
+              <a:rPr/>
+              <a:t>Sum of the ranks</a:t>
+            </a:r>
+          </a:p>
+        </p:txBody>
+      </p:sp>
+      <p:sp>
+        <p:nvSpPr>
+          <p:cNvPr id="3" name="Content Placeholder 2"/>
+          <p:cNvSpPr>
+            <a:spLocks noGrp="1"/>
+          </p:cNvSpPr>
+          <p:nvPr>
+            <p:ph idx="1"/>
+          </p:nvPr>
+        </p:nvSpPr>
+        <p:spPr/>
+        <p:txBody>
+          <a:bodyPr/>
+          <a:lstStyle/>
+          <a:p>
+            <a:pPr lvl="0" indent="0">
+              <a:buNone/>
+            </a:pPr>
+            <a:r>
+              <a:rPr>
+                <a:latin typeface="Courier"/>
+              </a:rPr>
+              <a:t>T = 15
+C = 13</a:t>
+            </a:r>
+          </a:p>
+          <a:p>
+            <a:pPr lvl="0" indent="0" marL="0">
+              <a:buNone/>
+            </a:pPr>
+            <a:r>
+              <a:rPr/>
+              <a:t>How likely is this result under the null hypothesis?</a:t>
+            </a:r>
+          </a:p>
+        </p:txBody>
+      </p:sp>
+    </p:spTree>
+  </p:cSld>
+</p:sld>
+</file>
+
+<file path=ppt/slides/slide36.xml><?xml version="1.0" encoding="utf-8"?>
+<p:sld xmlns:a="http://schemas.openxmlformats.org/drawingml/2006/main" xmlns:r="http://schemas.openxmlformats.org/officeDocument/2006/relationships" xmlns:p="http://schemas.openxmlformats.org/presentationml/2006/main">
+  <p:cSld>
+    <p:spTree>
+      <p:nvGrpSpPr>
+        <p:cNvPr id="1" name=""/>
+        <p:cNvGrpSpPr/>
+        <p:nvPr/>
+      </p:nvGrpSpPr>
+      <p:grpSpPr>
+        <a:xfrm>
+          <a:off x="0" y="0"/>
+          <a:ext cx="0" cy="0"/>
+          <a:chOff x="0" y="0"/>
+          <a:chExt cx="0" cy="0"/>
+        </a:xfrm>
+      </p:grpSpPr>
+      <p:sp>
+        <p:nvSpPr>
+          <p:cNvPr id="2" name="Title 1"/>
+          <p:cNvSpPr>
+            <a:spLocks noGrp="1"/>
+          </p:cNvSpPr>
+          <p:nvPr>
+            <p:ph type="title"/>
+          </p:nvPr>
+        </p:nvSpPr>
+        <p:spPr/>
+        <p:txBody>
+          <a:bodyPr/>
+          <a:lstStyle/>
+          <a:p>
+            <a:pPr lvl="0" indent="0" marL="0">
+              <a:buNone/>
+            </a:pPr>
+            <a:r>
+              <a:rPr/>
+              <a:t>List all possible ranking for T</a:t>
+            </a:r>
+          </a:p>
+        </p:txBody>
+      </p:sp>
+      <p:sp>
+        <p:nvSpPr>
+          <p:cNvPr id="3" name="Content Placeholder 2"/>
+          <p:cNvSpPr>
+            <a:spLocks noGrp="1"/>
+          </p:cNvSpPr>
+          <p:nvPr>
+            <p:ph idx="1"/>
+          </p:nvPr>
+        </p:nvSpPr>
+        <p:spPr/>
+        <p:txBody>
+          <a:bodyPr/>
+          <a:lstStyle/>
+          <a:p>
+            <a:pPr lvl="0" indent="0">
+              <a:buNone/>
+            </a:pPr>
+            <a:r>
+              <a:rPr>
+                <a:latin typeface="Courier"/>
+              </a:rPr>
+              <a:t>1,2,3  1,2,4  1,2,5  1,2,6  1,2,7
+1,3,4  1,3,5  1,3,6  1,3,7  1,4,5
+1,4,6  1,4,7  1,5,6  1,5,7  1,6,7
+2,3,4  2,3,5  2,3,6  2,3,7  2,4,5
+2,4,6  2,4,7  2,5,6  2,5,7  2,6,7
+3,4,5  3,4,6  3,4,7  3,5,6  3,5,7
+3,6,7  4,5,6  4,5,7  4,6,7  5,6,7</a:t>
+            </a:r>
+          </a:p>
+        </p:txBody>
+      </p:sp>
+    </p:spTree>
+  </p:cSld>
+</p:sld>
+</file>
+
+<file path=ppt/slides/slide37.xml><?xml version="1.0" encoding="utf-8"?>
+<p:sld xmlns:a="http://schemas.openxmlformats.org/drawingml/2006/main" xmlns:r="http://schemas.openxmlformats.org/officeDocument/2006/relationships" xmlns:p="http://schemas.openxmlformats.org/presentationml/2006/main">
+  <p:cSld>
+    <p:spTree>
+      <p:nvGrpSpPr>
+        <p:cNvPr id="1" name=""/>
+        <p:cNvGrpSpPr/>
+        <p:nvPr/>
+      </p:nvGrpSpPr>
+      <p:grpSpPr>
+        <a:xfrm>
+          <a:off x="0" y="0"/>
+          <a:ext cx="0" cy="0"/>
+          <a:chOff x="0" y="0"/>
+          <a:chExt cx="0" cy="0"/>
+        </a:xfrm>
+      </p:grpSpPr>
+      <p:sp>
+        <p:nvSpPr>
+          <p:cNvPr id="2" name="Title 1"/>
+          <p:cNvSpPr>
+            <a:spLocks noGrp="1"/>
+          </p:cNvSpPr>
+          <p:nvPr>
+            <p:ph type="title"/>
+          </p:nvPr>
+        </p:nvSpPr>
+        <p:spPr/>
+        <p:txBody>
+          <a:bodyPr/>
+          <a:lstStyle/>
+          <a:p>
+            <a:pPr lvl="0" indent="0" marL="0">
+              <a:buNone/>
+            </a:pPr>
+            <a:r>
+              <a:rPr/>
+              <a:t>Select more extreme rankings</a:t>
+            </a:r>
+          </a:p>
+        </p:txBody>
+      </p:sp>
+      <p:sp>
+        <p:nvSpPr>
+          <p:cNvPr id="3" name="Content Placeholder 2"/>
+          <p:cNvSpPr>
+            <a:spLocks noGrp="1"/>
+          </p:cNvSpPr>
+          <p:nvPr>
+            <p:ph idx="1"/>
+          </p:nvPr>
+        </p:nvSpPr>
+        <p:spPr/>
+        <p:txBody>
+          <a:bodyPr/>
+          <a:lstStyle/>
+          <a:p>
+            <a:pPr lvl="0" indent="0">
+              <a:buNone/>
+            </a:pPr>
+            <a:r>
+              <a:rPr>
+                <a:latin typeface="Courier"/>
+              </a:rPr>
+              <a:t>
+                            2,6,7
+                            3,5,7
+3,6,7  4,5,6  4,5,7  4,6,7  5,6,7</a:t>
+            </a:r>
+          </a:p>
+          <a:p>
+            <a:pPr lvl="0" indent="0" marL="0">
+              <a:buNone/>
+            </a:pPr>
+            <a:r>
+              <a:rPr/>
+              <a:t>p-value = 7/35 = 0.20</a:t>
+            </a:r>
+          </a:p>
+        </p:txBody>
+      </p:sp>
+    </p:spTree>
+  </p:cSld>
+</p:sld>
+</file>
+
+<file path=ppt/slides/slide38.xml><?xml version="1.0" encoding="utf-8"?>
+<p:sld xmlns:a="http://schemas.openxmlformats.org/drawingml/2006/main" xmlns:r="http://schemas.openxmlformats.org/officeDocument/2006/relationships" xmlns:p="http://schemas.openxmlformats.org/presentationml/2006/main">
+  <p:cSld>
+    <p:spTree>
+      <p:nvGrpSpPr>
+        <p:cNvPr id="1" name=""/>
+        <p:cNvGrpSpPr/>
+        <p:nvPr/>
+      </p:nvGrpSpPr>
+      <p:grpSpPr>
+        <a:xfrm>
+          <a:off x="0" y="0"/>
+          <a:ext cx="0" cy="0"/>
+          <a:chOff x="0" y="0"/>
+          <a:chExt cx="0" cy="0"/>
+        </a:xfrm>
+      </p:grpSpPr>
+    </p:spTree>
+  </p:cSld>
+</p:sld>
+</file>
+
+<file path=ppt/slides/slide39.xml><?xml version="1.0" encoding="utf-8"?>
+<p:sld xmlns:a="http://schemas.openxmlformats.org/drawingml/2006/main" xmlns:r="http://schemas.openxmlformats.org/officeDocument/2006/relationships" xmlns:p="http://schemas.openxmlformats.org/presentationml/2006/main">
+  <p:cSld>
+    <p:spTree>
+      <p:nvGrpSpPr>
+        <p:cNvPr id="1" name=""/>
+        <p:cNvGrpSpPr/>
+        <p:nvPr/>
+      </p:nvGrpSpPr>
+      <p:grpSpPr>
+        <a:xfrm>
+          <a:off x="0" y="0"/>
+          <a:ext cx="0" cy="0"/>
+          <a:chOff x="0" y="0"/>
+          <a:chExt cx="0" cy="0"/>
+        </a:xfrm>
+      </p:grpSpPr>
+      <p:sp>
+        <p:nvSpPr>
+          <p:cNvPr id="2" name="Title 1"/>
+          <p:cNvSpPr>
+            <a:spLocks noGrp="1"/>
+          </p:cNvSpPr>
+          <p:nvPr>
+            <p:ph type="title"/>
+          </p:nvPr>
+        </p:nvSpPr>
+        <p:spPr/>
+        <p:txBody>
+          <a:bodyPr/>
+          <a:lstStyle/>
+          <a:p>
+            <a:pPr lvl="0" indent="0" marL="0">
+              <a:buNone/>
+            </a:pPr>
+            <a:r>
+              <a:rPr/>
+              <a:t>Calculation for a two-sided test</a:t>
             </a:r>
           </a:p>
         </p:txBody>
@@ -6581,7 +7279,18 @@
               <a:t>1,2,3  1,2,4  1,2,5  1,2,6
 1,3,4  1,3,5
 2,3,4
-</a:t>
+                            2,6,7
+                            3,5,7
+3,6,7  4,5,6  4,5,7  4,6,7  5,6,7</a:t>
+            </a:r>
+          </a:p>
+          <a:p>
+            <a:pPr lvl="0" indent="0" marL="0">
+              <a:buNone/>
+            </a:pPr>
+            <a:r>
+              <a:rPr/>
+              <a:t>p-value = 14/35 = 0.40</a:t>
             </a:r>
           </a:p>
         </p:txBody>
@@ -6591,7 +7300,559 @@
 </p:sld>
 </file>
 
-<file path=ppt/slides/slide31.xml><?xml version="1.0" encoding="utf-8"?>
+<file path=ppt/slides/slide4.xml><?xml version="1.0" encoding="utf-8"?>
+<p:sld xmlns:a="http://schemas.openxmlformats.org/drawingml/2006/main" xmlns:r="http://schemas.openxmlformats.org/officeDocument/2006/relationships" xmlns:p="http://schemas.openxmlformats.org/presentationml/2006/main">
+  <p:cSld>
+    <p:spTree>
+      <p:nvGrpSpPr>
+        <p:cNvPr id="1" name=""/>
+        <p:cNvGrpSpPr/>
+        <p:nvPr/>
+      </p:nvGrpSpPr>
+      <p:grpSpPr>
+        <a:xfrm>
+          <a:off x="0" y="0"/>
+          <a:ext cx="0" cy="0"/>
+          <a:chOff x="0" y="0"/>
+          <a:chExt cx="0" cy="0"/>
+        </a:xfrm>
+      </p:grpSpPr>
+      <p:sp>
+        <p:nvSpPr>
+          <p:cNvPr id="2" name="Title 1"/>
+          <p:cNvSpPr>
+            <a:spLocks noGrp="1"/>
+          </p:cNvSpPr>
+          <p:nvPr>
+            <p:ph type="title"/>
+          </p:nvPr>
+        </p:nvSpPr>
+        <p:spPr/>
+        <p:txBody>
+          <a:bodyPr/>
+          <a:lstStyle/>
+          <a:p>
+            <a:pPr lvl="0" indent="0" marL="0">
+              <a:buNone/>
+            </a:pPr>
+            <a:r>
+              <a:rPr/>
+              <a:t>Outline of topics</a:t>
+            </a:r>
+          </a:p>
+        </p:txBody>
+      </p:sp>
+      <p:sp>
+        <p:nvSpPr>
+          <p:cNvPr id="3" name="Content Placeholder 2"/>
+          <p:cNvSpPr>
+            <a:spLocks noGrp="1"/>
+          </p:cNvSpPr>
+          <p:nvPr>
+            <p:ph idx="1"/>
+          </p:nvPr>
+        </p:nvSpPr>
+        <p:spPr/>
+        <p:txBody>
+          <a:bodyPr/>
+          <a:lstStyle/>
+          <a:p>
+            <a:pPr lvl="0"/>
+            <a:r>
+              <a:rPr/>
+              <a:t>Historical origins of Fisher’s Exact Test</a:t>
+            </a:r>
+          </a:p>
+          <a:p>
+            <a:pPr lvl="0"/>
+            <a:r>
+              <a:rPr/>
+              <a:t>Other exact tests</a:t>
+            </a:r>
+          </a:p>
+          <a:p>
+            <a:pPr lvl="0"/>
+            <a:r>
+              <a:rPr/>
+              <a:t>Randomization tests</a:t>
+            </a:r>
+          </a:p>
+          <a:p>
+            <a:pPr lvl="0"/>
+            <a:r>
+              <a:rPr/>
+              <a:t>Programming requirements</a:t>
+            </a:r>
+          </a:p>
+          <a:p>
+            <a:pPr lvl="0"/>
+            <a:r>
+              <a:rPr/>
+              <a:t>When should you use these tests</a:t>
+            </a:r>
+          </a:p>
+        </p:txBody>
+      </p:sp>
+    </p:spTree>
+  </p:cSld>
+</p:sld>
+</file>
+
+<file path=ppt/slides/slide40.xml><?xml version="1.0" encoding="utf-8"?>
+<p:sld xmlns:a="http://schemas.openxmlformats.org/drawingml/2006/main" xmlns:r="http://schemas.openxmlformats.org/officeDocument/2006/relationships" xmlns:p="http://schemas.openxmlformats.org/presentationml/2006/main">
+  <p:cSld>
+    <p:spTree>
+      <p:nvGrpSpPr>
+        <p:cNvPr id="1" name=""/>
+        <p:cNvGrpSpPr/>
+        <p:nvPr/>
+      </p:nvGrpSpPr>
+      <p:grpSpPr>
+        <a:xfrm>
+          <a:off x="0" y="0"/>
+          <a:ext cx="0" cy="0"/>
+          <a:chOff x="0" y="0"/>
+          <a:chExt cx="0" cy="0"/>
+        </a:xfrm>
+      </p:grpSpPr>
+      <p:sp>
+        <p:nvSpPr>
+          <p:cNvPr id="2" name="Title 1"/>
+          <p:cNvSpPr>
+            <a:spLocks noGrp="1"/>
+          </p:cNvSpPr>
+          <p:nvPr>
+            <p:ph type="title"/>
+          </p:nvPr>
+        </p:nvSpPr>
+        <p:spPr/>
+        <p:txBody>
+          <a:bodyPr/>
+          <a:lstStyle/>
+          <a:p>
+            <a:pPr lvl="0" indent="0" marL="0">
+              <a:buNone/>
+            </a:pPr>
+            <a:r>
+              <a:rPr/>
+              <a:t>Mann-Whitney test in SAS (1/3)</a:t>
+            </a:r>
+          </a:p>
+        </p:txBody>
+      </p:sp>
+      <p:sp>
+        <p:nvSpPr>
+          <p:cNvPr id="3" name="Content Placeholder 2"/>
+          <p:cNvSpPr>
+            <a:spLocks noGrp="1"/>
+          </p:cNvSpPr>
+          <p:nvPr>
+            <p:ph idx="1"/>
+          </p:nvPr>
+        </p:nvSpPr>
+        <p:spPr/>
+        <p:txBody>
+          <a:bodyPr/>
+          <a:lstStyle/>
+          <a:p>
+            <a:pPr lvl="0" indent="0">
+              <a:buNone/>
+            </a:pPr>
+            <a:r>
+              <a:rPr>
+                <a:latin typeface="Courier"/>
+              </a:rPr>
+              <a:t>data a;
+  input grp $ x;
+datalines;
+proc npar1way wilcoxon;
+  class grp;
+  var x;
+  exact wilcoxon;
+run;</a:t>
+            </a:r>
+          </a:p>
+        </p:txBody>
+      </p:sp>
+    </p:spTree>
+  </p:cSld>
+</p:sld>
+</file>
+
+<file path=ppt/slides/slide41.xml><?xml version="1.0" encoding="utf-8"?>
+<p:sld xmlns:a="http://schemas.openxmlformats.org/drawingml/2006/main" xmlns:r="http://schemas.openxmlformats.org/officeDocument/2006/relationships" xmlns:p="http://schemas.openxmlformats.org/presentationml/2006/main">
+  <p:cSld>
+    <p:spTree>
+      <p:nvGrpSpPr>
+        <p:cNvPr id="1" name=""/>
+        <p:cNvGrpSpPr/>
+        <p:nvPr/>
+      </p:nvGrpSpPr>
+      <p:grpSpPr>
+        <a:xfrm>
+          <a:off x="0" y="0"/>
+          <a:ext cx="0" cy="0"/>
+          <a:chOff x="0" y="0"/>
+          <a:chExt cx="0" cy="0"/>
+        </a:xfrm>
+      </p:grpSpPr>
+      <p:sp>
+        <p:nvSpPr>
+          <p:cNvPr id="2" name="Title 1"/>
+          <p:cNvSpPr>
+            <a:spLocks noGrp="1"/>
+          </p:cNvSpPr>
+          <p:nvPr>
+            <p:ph type="title"/>
+          </p:nvPr>
+        </p:nvSpPr>
+        <p:spPr/>
+        <p:txBody>
+          <a:bodyPr/>
+          <a:lstStyle/>
+          <a:p>
+            <a:pPr lvl="0" indent="0" marL="0">
+              <a:buNone/>
+            </a:pPr>
+            <a:r>
+              <a:rPr/>
+              <a:t>Mann-Whitney test in SAS (2/3)</a:t>
+            </a:r>
+          </a:p>
+        </p:txBody>
+      </p:sp>
+      <p:sp>
+        <p:nvSpPr>
+          <p:cNvPr id="3" name="Content Placeholder 2"/>
+          <p:cNvSpPr>
+            <a:spLocks noGrp="1"/>
+          </p:cNvSpPr>
+          <p:nvPr>
+            <p:ph idx="1"/>
+          </p:nvPr>
+        </p:nvSpPr>
+        <p:spPr/>
+        <p:txBody>
+          <a:bodyPr/>
+          <a:lstStyle/>
+          <a:p>
+            <a:pPr lvl="0" indent="0">
+              <a:buNone/>
+            </a:pPr>
+            <a:r>
+              <a:rPr>
+                <a:latin typeface="Courier"/>
+              </a:rPr>
+              <a:t>T 14
+T 23
+T 37
+C 12
+C 13
+C 15
+C 25
+run;</a:t>
+            </a:r>
+          </a:p>
+        </p:txBody>
+      </p:sp>
+    </p:spTree>
+  </p:cSld>
+</p:sld>
+</file>
+
+<file path=ppt/slides/slide42.xml><?xml version="1.0" encoding="utf-8"?>
+<p:sld xmlns:a="http://schemas.openxmlformats.org/drawingml/2006/main" xmlns:r="http://schemas.openxmlformats.org/officeDocument/2006/relationships" xmlns:p="http://schemas.openxmlformats.org/presentationml/2006/main">
+  <p:cSld>
+    <p:spTree>
+      <p:nvGrpSpPr>
+        <p:cNvPr id="1" name=""/>
+        <p:cNvGrpSpPr/>
+        <p:nvPr/>
+      </p:nvGrpSpPr>
+      <p:grpSpPr>
+        <a:xfrm>
+          <a:off x="0" y="0"/>
+          <a:ext cx="0" cy="0"/>
+          <a:chOff x="0" y="0"/>
+          <a:chExt cx="0" cy="0"/>
+        </a:xfrm>
+      </p:grpSpPr>
+      <p:sp>
+        <p:nvSpPr>
+          <p:cNvPr id="2" name="Title 1"/>
+          <p:cNvSpPr>
+            <a:spLocks noGrp="1"/>
+          </p:cNvSpPr>
+          <p:nvPr>
+            <p:ph type="title"/>
+          </p:nvPr>
+        </p:nvSpPr>
+        <p:spPr/>
+        <p:txBody>
+          <a:bodyPr/>
+          <a:lstStyle/>
+          <a:p>
+            <a:pPr lvl="0" indent="0" marL="0">
+              <a:buNone/>
+            </a:pPr>
+            <a:r>
+              <a:rPr/>
+              <a:t>Mann-Whitney test in SAS (3/5)</a:t>
+            </a:r>
+          </a:p>
+        </p:txBody>
+      </p:sp>
+      <p:sp>
+        <p:nvSpPr>
+          <p:cNvPr id="3" name="Content Placeholder 2"/>
+          <p:cNvSpPr>
+            <a:spLocks noGrp="1"/>
+          </p:cNvSpPr>
+          <p:nvPr>
+            <p:ph idx="1"/>
+          </p:nvPr>
+        </p:nvSpPr>
+        <p:spPr/>
+        <p:txBody>
+          <a:bodyPr/>
+          <a:lstStyle/>
+          <a:p>
+            <a:pPr lvl="0" indent="0">
+              <a:buNone/>
+            </a:pPr>
+            <a:r>
+              <a:rPr>
+                <a:latin typeface="Courier"/>
+              </a:rPr>
+              <a:t>proc npar1way wilcoxon;
+  class grp;
+  var x;
+  exact wilcoxon;
+run;</a:t>
+            </a:r>
+          </a:p>
+        </p:txBody>
+      </p:sp>
+    </p:spTree>
+  </p:cSld>
+</p:sld>
+</file>
+
+<file path=ppt/slides/slide43.xml><?xml version="1.0" encoding="utf-8"?>
+<p:sld xmlns:a="http://schemas.openxmlformats.org/drawingml/2006/main" xmlns:r="http://schemas.openxmlformats.org/officeDocument/2006/relationships" xmlns:p="http://schemas.openxmlformats.org/presentationml/2006/main">
+  <p:cSld>
+    <p:spTree>
+      <p:nvGrpSpPr>
+        <p:cNvPr id="1" name=""/>
+        <p:cNvGrpSpPr/>
+        <p:nvPr/>
+      </p:nvGrpSpPr>
+      <p:grpSpPr>
+        <a:xfrm>
+          <a:off x="0" y="0"/>
+          <a:ext cx="0" cy="0"/>
+          <a:chOff x="0" y="0"/>
+          <a:chExt cx="0" cy="0"/>
+        </a:xfrm>
+      </p:grpSpPr>
+      <p:sp>
+        <p:nvSpPr>
+          <p:cNvPr id="2" name="Title 1"/>
+          <p:cNvSpPr>
+            <a:spLocks noGrp="1"/>
+          </p:cNvSpPr>
+          <p:nvPr>
+            <p:ph type="title"/>
+          </p:nvPr>
+        </p:nvSpPr>
+        <p:spPr/>
+        <p:txBody>
+          <a:bodyPr/>
+          <a:lstStyle/>
+          <a:p>
+            <a:pPr lvl="0" indent="0" marL="0">
+              <a:buNone/>
+            </a:pPr>
+            <a:r>
+              <a:rPr/>
+              <a:t>Mann-Whitney test in SAS (4/5)</a:t>
+            </a:r>
+          </a:p>
+        </p:txBody>
+      </p:sp>
+      <p:pic>
+        <p:nvPicPr>
+          <p:cNvPr descr="fig:  ../images/sas-output-1.png" id="0" name="Picture 1"/>
+          <p:cNvPicPr>
+            <a:picLocks noGrp="1" noChangeAspect="1"/>
+          </p:cNvPicPr>
+          <p:nvPr/>
+        </p:nvPicPr>
+        <p:blipFill>
+          <a:blip r:embed="rId2"/>
+          <a:stretch>
+            <a:fillRect/>
+          </a:stretch>
+        </p:blipFill>
+        <p:spPr bwMode="auto">
+          <a:xfrm>
+            <a:off x="3098800" y="1600200"/>
+            <a:ext cx="6007100" cy="4013200"/>
+          </a:xfrm>
+          <a:prstGeom prst="rect">
+            <a:avLst/>
+          </a:prstGeom>
+          <a:noFill/>
+          <a:ln w="9525">
+            <a:noFill/>
+            <a:headEnd/>
+            <a:tailEnd/>
+          </a:ln>
+        </p:spPr>
+      </p:pic>
+      <p:sp>
+        <p:nvSpPr>
+          <p:cNvPr id="1" name="TextBox 3"/>
+          <p:cNvSpPr txBox="1"/>
+          <p:nvPr/>
+        </p:nvSpPr>
+        <p:spPr>
+          <a:xfrm>
+            <a:off x="609600" y="5613400"/>
+            <a:ext cx="10972800" cy="508000"/>
+          </a:xfrm>
+          <a:prstGeom prst="rect">
+            <a:avLst/>
+          </a:prstGeom>
+          <a:noFill/>
+        </p:spPr>
+        <p:txBody>
+          <a:bodyPr/>
+          <a:lstStyle/>
+          <a:p>
+            <a:pPr lvl="0" indent="0" marL="0" algn="ctr">
+              <a:buNone/>
+            </a:pPr>
+            <a:r>
+              <a:rPr/>
+              <a:t>Figure x. SAS output</a:t>
+            </a:r>
+          </a:p>
+        </p:txBody>
+      </p:sp>
+    </p:spTree>
+  </p:cSld>
+</p:sld>
+</file>
+
+<file path=ppt/slides/slide44.xml><?xml version="1.0" encoding="utf-8"?>
+<p:sld xmlns:a="http://schemas.openxmlformats.org/drawingml/2006/main" xmlns:r="http://schemas.openxmlformats.org/officeDocument/2006/relationships" xmlns:p="http://schemas.openxmlformats.org/presentationml/2006/main">
+  <p:cSld>
+    <p:spTree>
+      <p:nvGrpSpPr>
+        <p:cNvPr id="1" name=""/>
+        <p:cNvGrpSpPr/>
+        <p:nvPr/>
+      </p:nvGrpSpPr>
+      <p:grpSpPr>
+        <a:xfrm>
+          <a:off x="0" y="0"/>
+          <a:ext cx="0" cy="0"/>
+          <a:chOff x="0" y="0"/>
+          <a:chExt cx="0" cy="0"/>
+        </a:xfrm>
+      </p:grpSpPr>
+      <p:sp>
+        <p:nvSpPr>
+          <p:cNvPr id="2" name="Title 1"/>
+          <p:cNvSpPr>
+            <a:spLocks noGrp="1"/>
+          </p:cNvSpPr>
+          <p:nvPr>
+            <p:ph type="title"/>
+          </p:nvPr>
+        </p:nvSpPr>
+        <p:spPr/>
+        <p:txBody>
+          <a:bodyPr/>
+          <a:lstStyle/>
+          <a:p>
+            <a:pPr lvl="0" indent="0" marL="0">
+              <a:buNone/>
+            </a:pPr>
+            <a:r>
+              <a:rPr/>
+              <a:t>Mann-Whitney test in SAS (5/5)</a:t>
+            </a:r>
+          </a:p>
+        </p:txBody>
+      </p:sp>
+      <p:pic>
+        <p:nvPicPr>
+          <p:cNvPr descr="fig:  ../images/sas-output-2.png" id="0" name="Picture 1"/>
+          <p:cNvPicPr>
+            <a:picLocks noGrp="1" noChangeAspect="1"/>
+          </p:cNvPicPr>
+          <p:nvPr/>
+        </p:nvPicPr>
+        <p:blipFill>
+          <a:blip r:embed="rId2"/>
+          <a:stretch>
+            <a:fillRect/>
+          </a:stretch>
+        </p:blipFill>
+        <p:spPr bwMode="auto">
+          <a:xfrm>
+            <a:off x="4699000" y="1600200"/>
+            <a:ext cx="2794000" cy="4013200"/>
+          </a:xfrm>
+          <a:prstGeom prst="rect">
+            <a:avLst/>
+          </a:prstGeom>
+          <a:noFill/>
+          <a:ln w="9525">
+            <a:noFill/>
+            <a:headEnd/>
+            <a:tailEnd/>
+          </a:ln>
+        </p:spPr>
+      </p:pic>
+      <p:sp>
+        <p:nvSpPr>
+          <p:cNvPr id="1" name="TextBox 3"/>
+          <p:cNvSpPr txBox="1"/>
+          <p:nvPr/>
+        </p:nvSpPr>
+        <p:spPr>
+          <a:xfrm>
+            <a:off x="609600" y="5613400"/>
+            <a:ext cx="10972800" cy="508000"/>
+          </a:xfrm>
+          <a:prstGeom prst="rect">
+            <a:avLst/>
+          </a:prstGeom>
+          <a:noFill/>
+        </p:spPr>
+        <p:txBody>
+          <a:bodyPr/>
+          <a:lstStyle/>
+          <a:p>
+            <a:pPr lvl="0" indent="0" marL="0" algn="ctr">
+              <a:buNone/>
+            </a:pPr>
+            <a:r>
+              <a:rPr/>
+              <a:t>Figure x. SAS output</a:t>
+            </a:r>
+          </a:p>
+        </p:txBody>
+      </p:sp>
+    </p:spTree>
+  </p:cSld>
+</p:sld>
+</file>
+
+<file path=ppt/slides/slide45.xml><?xml version="1.0" encoding="utf-8"?>
 <p:sld xmlns:a="http://schemas.openxmlformats.org/drawingml/2006/main" xmlns:r="http://schemas.openxmlformats.org/officeDocument/2006/relationships" xmlns:p="http://schemas.openxmlformats.org/presentationml/2006/main">
   <p:cSld>
     <p:spTree>
@@ -6698,7 +7959,7 @@
 </p:sld>
 </file>
 
-<file path=ppt/slides/slide32.xml><?xml version="1.0" encoding="utf-8"?>
+<file path=ppt/slides/slide46.xml><?xml version="1.0" encoding="utf-8"?>
 <p:sld xmlns:a="http://schemas.openxmlformats.org/drawingml/2006/main" xmlns:r="http://schemas.openxmlformats.org/officeDocument/2006/relationships" xmlns:p="http://schemas.openxmlformats.org/presentationml/2006/main">
   <p:cSld>
     <p:spTree>
@@ -6805,7 +8066,7 @@
 </p:sld>
 </file>
 
-<file path=ppt/slides/slide33.xml><?xml version="1.0" encoding="utf-8"?>
+<file path=ppt/slides/slide47.xml><?xml version="1.0" encoding="utf-8"?>
 <p:sld xmlns:a="http://schemas.openxmlformats.org/drawingml/2006/main" xmlns:r="http://schemas.openxmlformats.org/officeDocument/2006/relationships" xmlns:p="http://schemas.openxmlformats.org/presentationml/2006/main">
   <p:cSld>
     <p:spTree>
@@ -6912,7 +8173,7 @@
 </p:sld>
 </file>
 
-<file path=ppt/slides/slide4.xml><?xml version="1.0" encoding="utf-8"?>
+<file path=ppt/slides/slide48.xml><?xml version="1.0" encoding="utf-8"?>
 <p:sld xmlns:a="http://schemas.openxmlformats.org/drawingml/2006/main" xmlns:r="http://schemas.openxmlformats.org/officeDocument/2006/relationships" xmlns:p="http://schemas.openxmlformats.org/presentationml/2006/main">
   <p:cSld>
     <p:spTree>
@@ -6949,7 +8210,54 @@
             </a:pPr>
             <a:r>
               <a:rPr/>
-              <a:t>What you’ll learn today</a:t>
+              <a:t>When should you use exact or randomization tests?</a:t>
+            </a:r>
+          </a:p>
+        </p:txBody>
+      </p:sp>
+    </p:spTree>
+  </p:cSld>
+</p:sld>
+</file>
+
+<file path=ppt/slides/slide49.xml><?xml version="1.0" encoding="utf-8"?>
+<p:sld xmlns:a="http://schemas.openxmlformats.org/drawingml/2006/main" xmlns:r="http://schemas.openxmlformats.org/officeDocument/2006/relationships" xmlns:p="http://schemas.openxmlformats.org/presentationml/2006/main">
+  <p:cSld>
+    <p:spTree>
+      <p:nvGrpSpPr>
+        <p:cNvPr id="1" name=""/>
+        <p:cNvGrpSpPr/>
+        <p:nvPr/>
+      </p:nvGrpSpPr>
+      <p:grpSpPr>
+        <a:xfrm>
+          <a:off x="0" y="0"/>
+          <a:ext cx="0" cy="0"/>
+          <a:chOff x="0" y="0"/>
+          <a:chExt cx="0" cy="0"/>
+        </a:xfrm>
+      </p:grpSpPr>
+      <p:sp>
+        <p:nvSpPr>
+          <p:cNvPr id="2" name="Title 1"/>
+          <p:cNvSpPr>
+            <a:spLocks noGrp="1"/>
+          </p:cNvSpPr>
+          <p:nvPr>
+            <p:ph type="title"/>
+          </p:nvPr>
+        </p:nvSpPr>
+        <p:spPr/>
+        <p:txBody>
+          <a:bodyPr/>
+          <a:lstStyle/>
+          <a:p>
+            <a:pPr lvl="0" indent="0" marL="0">
+              <a:buNone/>
+            </a:pPr>
+            <a:r>
+              <a:rPr/>
+              <a:t>Fisher’s Exact Test in R (1/2)</a:t>
             </a:r>
           </a:p>
         </p:txBody>
@@ -6969,52 +8277,21 @@
           <a:bodyPr/>
           <a:lstStyle/>
           <a:p>
-            <a:pPr lvl="0"/>
-            <a:r>
-              <a:rPr/>
-              <a:t>Historical origins</a:t>
-            </a:r>
-          </a:p>
-          <a:p>
-            <a:pPr lvl="0"/>
-            <a:r>
-              <a:rPr/>
-              <a:t>Fisher’s Exact Test</a:t>
-            </a:r>
-          </a:p>
-          <a:p>
-            <a:pPr lvl="0"/>
-            <a:r>
-              <a:rPr/>
-              <a:t>Other exact tests</a:t>
-            </a:r>
-          </a:p>
-          <a:p>
-            <a:pPr lvl="0"/>
-            <a:r>
-              <a:rPr/>
-              <a:t>Ranomization tests</a:t>
-            </a:r>
-          </a:p>
-          <a:p>
-            <a:pPr lvl="0"/>
-            <a:r>
-              <a:rPr/>
-              <a:t>Three specific randomization tests</a:t>
-            </a:r>
-          </a:p>
-          <a:p>
-            <a:pPr lvl="0"/>
-            <a:r>
-              <a:rPr/>
-              <a:t>Programming requirements</a:t>
-            </a:r>
-          </a:p>
-          <a:p>
-            <a:pPr lvl="0"/>
-            <a:r>
-              <a:rPr/>
-              <a:t>When should you use these tests</a:t>
+            <a:pPr lvl="0" indent="0">
+              <a:buNone/>
+            </a:pPr>
+            <a:r>
+              <a:rPr>
+                <a:latin typeface="Courier"/>
+              </a:rPr>
+              <a:t>labs &lt;- c(
+  "Milk first",
+  "Tea first")
+guess &lt;- c(1, 2, 1, 2, 2, 2, 1, 1) 
+truth &lt;- c(2, 2, 1, 2, 2, 1, 1, 1)
+fisher.test(
+  factor(guess, labels=labs), 
+  factor(truth, labels=labs))</a:t>
             </a:r>
           </a:p>
         </p:txBody>
@@ -7122,6 +8399,86 @@
             <a:r>
               <a:rPr/>
               <a:t>Figure 1. Ronald A. Fisher</a:t>
+            </a:r>
+          </a:p>
+        </p:txBody>
+      </p:sp>
+    </p:spTree>
+  </p:cSld>
+</p:sld>
+</file>
+
+<file path=ppt/slides/slide50.xml><?xml version="1.0" encoding="utf-8"?>
+<p:sld xmlns:a="http://schemas.openxmlformats.org/drawingml/2006/main" xmlns:r="http://schemas.openxmlformats.org/officeDocument/2006/relationships" xmlns:p="http://schemas.openxmlformats.org/presentationml/2006/main">
+  <p:cSld>
+    <p:spTree>
+      <p:nvGrpSpPr>
+        <p:cNvPr id="1" name=""/>
+        <p:cNvGrpSpPr/>
+        <p:nvPr/>
+      </p:nvGrpSpPr>
+      <p:grpSpPr>
+        <a:xfrm>
+          <a:off x="0" y="0"/>
+          <a:ext cx="0" cy="0"/>
+          <a:chOff x="0" y="0"/>
+          <a:chExt cx="0" cy="0"/>
+        </a:xfrm>
+      </p:grpSpPr>
+      <p:sp>
+        <p:nvSpPr>
+          <p:cNvPr id="2" name="Title 1"/>
+          <p:cNvSpPr>
+            <a:spLocks noGrp="1"/>
+          </p:cNvSpPr>
+          <p:nvPr>
+            <p:ph type="title"/>
+          </p:nvPr>
+        </p:nvSpPr>
+        <p:spPr/>
+        <p:txBody>
+          <a:bodyPr/>
+          <a:lstStyle/>
+          <a:p>
+            <a:pPr lvl="0" indent="0" marL="0">
+              <a:buNone/>
+            </a:pPr>
+            <a:r>
+              <a:rPr/>
+              <a:t>Fisher’s Exact Test in R (2/2)</a:t>
+            </a:r>
+          </a:p>
+        </p:txBody>
+      </p:sp>
+      <p:sp>
+        <p:nvSpPr>
+          <p:cNvPr id="3" name="Content Placeholder 2"/>
+          <p:cNvSpPr>
+            <a:spLocks noGrp="1"/>
+          </p:cNvSpPr>
+          <p:nvPr>
+            <p:ph idx="1"/>
+          </p:nvPr>
+        </p:nvSpPr>
+        <p:spPr/>
+        <p:txBody>
+          <a:bodyPr/>
+          <a:lstStyle/>
+          <a:p>
+            <a:pPr lvl="0" indent="0">
+              <a:buNone/>
+            </a:pPr>
+            <a:r>
+              <a:rPr>
+                <a:latin typeface="Courier"/>
+              </a:rPr>
+              <a:t>p-value = 0.4857
+alternative hypothesis: true odds ratio is not equal to 1
+95 percent confidence interval:
+   0.2117329 621.9337505
+sample estimates:
+odds ratio 
+  6.408309 </a:t>
             </a:r>
           </a:p>
         </p:txBody>

</xml_diff>

<commit_message>
Added titanic examples to exact-tests
</commit_message>
<xml_diff>
--- a/exact-tests/results/exact-and-randomization-tests.pptx
+++ b/exact-tests/results/exact-and-randomization-tests.pptx
@@ -5,7 +5,7 @@
     <p:sldMasterId id="2147483648" r:id="rId1"/>
   </p:sldMasterIdLst>
   <p:notesMasterIdLst>
-    <p:notesMasterId r:id="rId52"/>
+    <p:notesMasterId r:id="rId61"/>
   </p:notesMasterIdLst>
   <p:sldIdLst>
     <p:sldId id="256" r:id="rId2"/>
@@ -58,6 +58,15 @@
     <p:sldId id="303" r:id="rId49"/>
     <p:sldId id="304" r:id="rId50"/>
     <p:sldId id="305" r:id="rId51"/>
+    <p:sldId id="306" r:id="rId52"/>
+    <p:sldId id="307" r:id="rId53"/>
+    <p:sldId id="308" r:id="rId54"/>
+    <p:sldId id="309" r:id="rId55"/>
+    <p:sldId id="310" r:id="rId56"/>
+    <p:sldId id="311" r:id="rId57"/>
+    <p:sldId id="312" r:id="rId58"/>
+    <p:sldId id="313" r:id="rId59"/>
+    <p:sldId id="314" r:id="rId60"/>
   </p:sldIdLst>
   <p:sldSz cx="12192000" cy="6858000"/>
   <p:notesSz cx="6858000" cy="9144000"/>
@@ -606,6 +615,744 @@
 </p:notes>
 </file>
 
+<file path=ppt/notesSlides/notesSlide10.xml><?xml version="1.0" encoding="utf-8"?>
+<p:notes xmlns:a="http://schemas.openxmlformats.org/drawingml/2006/main" xmlns:r="http://schemas.openxmlformats.org/officeDocument/2006/relationships" xmlns:p="http://schemas.openxmlformats.org/presentationml/2006/main">
+  <p:cSld>
+    <p:spTree>
+      <p:nvGrpSpPr>
+        <p:cNvPr id="1" name=""/>
+        <p:cNvGrpSpPr/>
+        <p:nvPr/>
+      </p:nvGrpSpPr>
+      <p:grpSpPr>
+        <a:xfrm>
+          <a:off x="0" y="0"/>
+          <a:ext cx="0" cy="0"/>
+          <a:chOff x="0" y="0"/>
+          <a:chExt cx="0" cy="0"/>
+        </a:xfrm>
+      </p:grpSpPr>
+      <p:sp>
+        <p:nvSpPr>
+          <p:cNvPr id="2" name="Slide Image Placeholder 1"/>
+          <p:cNvSpPr>
+            <a:spLocks noGrp="1" noRot="1" noChangeAspect="1"/>
+          </p:cNvSpPr>
+          <p:nvPr>
+            <p:ph type="sldImg"/>
+          </p:nvPr>
+        </p:nvSpPr>
+        <p:spPr/>
+      </p:sp>
+      <p:sp>
+        <p:nvSpPr>
+          <p:cNvPr id="3" name="Notes Placeholder 2"/>
+          <p:cNvSpPr>
+            <a:spLocks noGrp="1"/>
+          </p:cNvSpPr>
+          <p:nvPr>
+            <p:ph type="body" idx="1"/>
+          </p:nvPr>
+        </p:nvSpPr>
+        <p:spPr/>
+        <p:txBody>
+          <a:bodyPr/>
+          <a:lstStyle/>
+          <a:p>
+            <a:pPr lvl="0" indent="0" marL="0">
+              <a:buNone/>
+            </a:pPr>
+            <a:r>
+              <a:rPr/>
+              <a:t>To make things interesting, let’s propose a different result. Suppose the Bristol was missed on one cup but identifed three others correctly.</a:t>
+            </a:r>
+          </a:p>
+        </p:txBody>
+      </p:sp>
+      <p:sp>
+        <p:nvSpPr>
+          <p:cNvPr id="4" name="Slide Number Placeholder 3"/>
+          <p:cNvSpPr>
+            <a:spLocks noGrp="1"/>
+          </p:cNvSpPr>
+          <p:nvPr>
+            <p:ph type="sldNum" sz="quarter" idx="10"/>
+          </p:nvPr>
+        </p:nvSpPr>
+        <p:spPr/>
+        <p:txBody>
+          <a:bodyPr/>
+          <a:lstStyle/>
+          <a:p>
+            <a:fld id="{18BDFEC3-8487-43E8-A154-7C12CBC1FFF2}" type="slidenum">
+              <a:rPr lang="en-US"/>
+              <a:t>12</a:t>
+            </a:fld>
+            <a:endParaRPr lang="en-US"/>
+          </a:p>
+        </p:txBody>
+      </p:sp>
+    </p:spTree>
+  </p:cSld>
+</p:notes>
+</file>
+
+<file path=ppt/notesSlides/notesSlide11.xml><?xml version="1.0" encoding="utf-8"?>
+<p:notes xmlns:a="http://schemas.openxmlformats.org/drawingml/2006/main" xmlns:r="http://schemas.openxmlformats.org/officeDocument/2006/relationships" xmlns:p="http://schemas.openxmlformats.org/presentationml/2006/main">
+  <p:cSld>
+    <p:spTree>
+      <p:nvGrpSpPr>
+        <p:cNvPr id="1" name=""/>
+        <p:cNvGrpSpPr/>
+        <p:nvPr/>
+      </p:nvGrpSpPr>
+      <p:grpSpPr>
+        <a:xfrm>
+          <a:off x="0" y="0"/>
+          <a:ext cx="0" cy="0"/>
+          <a:chOff x="0" y="0"/>
+          <a:chExt cx="0" cy="0"/>
+        </a:xfrm>
+      </p:grpSpPr>
+      <p:sp>
+        <p:nvSpPr>
+          <p:cNvPr id="2" name="Slide Image Placeholder 1"/>
+          <p:cNvSpPr>
+            <a:spLocks noGrp="1" noRot="1" noChangeAspect="1"/>
+          </p:cNvSpPr>
+          <p:nvPr>
+            <p:ph type="sldImg"/>
+          </p:nvPr>
+        </p:nvSpPr>
+        <p:spPr/>
+      </p:sp>
+      <p:sp>
+        <p:nvSpPr>
+          <p:cNvPr id="3" name="Notes Placeholder 2"/>
+          <p:cNvSpPr>
+            <a:spLocks noGrp="1"/>
+          </p:cNvSpPr>
+          <p:nvPr>
+            <p:ph type="body" idx="1"/>
+          </p:nvPr>
+        </p:nvSpPr>
+        <p:spPr/>
+        <p:txBody>
+          <a:bodyPr/>
+          <a:lstStyle/>
+          <a:p>
+            <a:pPr lvl="0" indent="0" marL="0">
+              <a:buNone/>
+            </a:pPr>
+            <a:r>
+              <a:rPr/>
+              <a:t>The calculations get quite a bit messier in this case. There are four probabilities you have to compute here. The probability that the first cup is identified incorrectly and the remaining three are identified incorrectly starts with the same 4/8 because if you are choosing at random there are four cups that you could choose incorrectly. Once this is done, your chances get a little bit better, because there are four cups that would represent a correct choice and only three left that represent an incorrect choice. The other probabilities are computed similarly.</a:t>
+            </a:r>
+          </a:p>
+          <a:p>
+            <a:pPr lvl="0" indent="0" marL="0">
+              <a:buNone/>
+            </a:pPr>
+          </a:p>
+          <a:p>
+            <a:pPr lvl="0" indent="0" marL="0">
+              <a:buNone/>
+            </a:pPr>
+            <a:r>
+              <a:rPr/>
+              <a:t>But you have to account for another case, one where the first cup is choosen correctly, the second incorrectly, and the remaining two correctly. This is getting a bit tedious, but you can calculate the probability with a bit of work.</a:t>
+            </a:r>
+          </a:p>
+          <a:p>
+            <a:pPr lvl="0" indent="0" marL="0">
+              <a:buNone/>
+            </a:pPr>
+          </a:p>
+          <a:p>
+            <a:pPr lvl="0" indent="0" marL="0">
+              <a:buNone/>
+            </a:pPr>
+            <a:r>
+              <a:rPr/>
+              <a:t>But the dot-dot-dot tells you that you are still not done. There are two more cases to consider: one where the third cup chosen is the one that is mistaken and one where the mistake happens on the last cup.</a:t>
+            </a:r>
+          </a:p>
+          <a:p>
+            <a:pPr lvl="0" indent="0" marL="0">
+              <a:buNone/>
+            </a:pPr>
+          </a:p>
+          <a:p>
+            <a:pPr lvl="0" indent="0" marL="0">
+              <a:buNone/>
+            </a:pPr>
+            <a:r>
+              <a:rPr/>
+              <a:t>Now I don’t mind tedious. Tedious is part of being a statistician. But there is a simpler way. You can rely on a well known distribution, the hypergeometric distribution, to calculate the probabilities for you.</a:t>
+            </a:r>
+          </a:p>
+        </p:txBody>
+      </p:sp>
+      <p:sp>
+        <p:nvSpPr>
+          <p:cNvPr id="4" name="Slide Number Placeholder 3"/>
+          <p:cNvSpPr>
+            <a:spLocks noGrp="1"/>
+          </p:cNvSpPr>
+          <p:nvPr>
+            <p:ph type="sldNum" sz="quarter" idx="10"/>
+          </p:nvPr>
+        </p:nvSpPr>
+        <p:spPr/>
+        <p:txBody>
+          <a:bodyPr/>
+          <a:lstStyle/>
+          <a:p>
+            <a:fld id="{18BDFEC3-8487-43E8-A154-7C12CBC1FFF2}" type="slidenum">
+              <a:rPr lang="en-US"/>
+              <a:t>13</a:t>
+            </a:fld>
+            <a:endParaRPr lang="en-US"/>
+          </a:p>
+        </p:txBody>
+      </p:sp>
+    </p:spTree>
+  </p:cSld>
+</p:notes>
+</file>
+
+<file path=ppt/notesSlides/notesSlide12.xml><?xml version="1.0" encoding="utf-8"?>
+<p:notes xmlns:a="http://schemas.openxmlformats.org/drawingml/2006/main" xmlns:r="http://schemas.openxmlformats.org/officeDocument/2006/relationships" xmlns:p="http://schemas.openxmlformats.org/presentationml/2006/main">
+  <p:cSld>
+    <p:spTree>
+      <p:nvGrpSpPr>
+        <p:cNvPr id="1" name=""/>
+        <p:cNvGrpSpPr/>
+        <p:nvPr/>
+      </p:nvGrpSpPr>
+      <p:grpSpPr>
+        <a:xfrm>
+          <a:off x="0" y="0"/>
+          <a:ext cx="0" cy="0"/>
+          <a:chOff x="0" y="0"/>
+          <a:chExt cx="0" cy="0"/>
+        </a:xfrm>
+      </p:grpSpPr>
+      <p:sp>
+        <p:nvSpPr>
+          <p:cNvPr id="2" name="Slide Image Placeholder 1"/>
+          <p:cNvSpPr>
+            <a:spLocks noGrp="1" noRot="1" noChangeAspect="1"/>
+          </p:cNvSpPr>
+          <p:nvPr>
+            <p:ph type="sldImg"/>
+          </p:nvPr>
+        </p:nvSpPr>
+        <p:spPr/>
+      </p:sp>
+      <p:sp>
+        <p:nvSpPr>
+          <p:cNvPr id="3" name="Notes Placeholder 2"/>
+          <p:cNvSpPr>
+            <a:spLocks noGrp="1"/>
+          </p:cNvSpPr>
+          <p:nvPr>
+            <p:ph type="body" idx="1"/>
+          </p:nvPr>
+        </p:nvSpPr>
+        <p:spPr/>
+        <p:txBody>
+          <a:bodyPr/>
+          <a:lstStyle/>
+          <a:p>
+            <a:pPr lvl="0" indent="0" marL="0">
+              <a:buNone/>
+            </a:pPr>
+            <a:r>
+              <a:rPr/>
+              <a:t>To understand the hypergeometric distribution, you need to visualize an abstract problem of probability known as drawing balls from an urn.</a:t>
+            </a:r>
+          </a:p>
+          <a:p>
+            <a:pPr lvl="0" indent="0" marL="0">
+              <a:buNone/>
+            </a:pPr>
+          </a:p>
+          <a:p>
+            <a:pPr lvl="0" indent="0" marL="0">
+              <a:buNone/>
+            </a:pPr>
+            <a:r>
+              <a:rPr/>
+              <a:t>Think of the eight cups of tea as an urn with eight balls, four white and four black. The white balls represent correctly identifying the cup of tea as having the milk added first. The black balls represent mistakes in identification. So what is the probability of getting 3 white balls after drawing 4 balls without replacement?</a:t>
+            </a:r>
+          </a:p>
+        </p:txBody>
+      </p:sp>
+      <p:sp>
+        <p:nvSpPr>
+          <p:cNvPr id="4" name="Slide Number Placeholder 3"/>
+          <p:cNvSpPr>
+            <a:spLocks noGrp="1"/>
+          </p:cNvSpPr>
+          <p:nvPr>
+            <p:ph type="sldNum" sz="quarter" idx="10"/>
+          </p:nvPr>
+        </p:nvSpPr>
+        <p:spPr/>
+        <p:txBody>
+          <a:bodyPr/>
+          <a:lstStyle/>
+          <a:p>
+            <a:fld id="{18BDFEC3-8487-43E8-A154-7C12CBC1FFF2}" type="slidenum">
+              <a:rPr lang="en-US"/>
+              <a:t>14</a:t>
+            </a:fld>
+            <a:endParaRPr lang="en-US"/>
+          </a:p>
+        </p:txBody>
+      </p:sp>
+    </p:spTree>
+  </p:cSld>
+</p:notes>
+</file>
+
+<file path=ppt/notesSlides/notesSlide13.xml><?xml version="1.0" encoding="utf-8"?>
+<p:notes xmlns:a="http://schemas.openxmlformats.org/drawingml/2006/main" xmlns:r="http://schemas.openxmlformats.org/officeDocument/2006/relationships" xmlns:p="http://schemas.openxmlformats.org/presentationml/2006/main">
+  <p:cSld>
+    <p:spTree>
+      <p:nvGrpSpPr>
+        <p:cNvPr id="1" name=""/>
+        <p:cNvGrpSpPr/>
+        <p:nvPr/>
+      </p:nvGrpSpPr>
+      <p:grpSpPr>
+        <a:xfrm>
+          <a:off x="0" y="0"/>
+          <a:ext cx="0" cy="0"/>
+          <a:chOff x="0" y="0"/>
+          <a:chExt cx="0" cy="0"/>
+        </a:xfrm>
+      </p:grpSpPr>
+      <p:sp>
+        <p:nvSpPr>
+          <p:cNvPr id="2" name="Slide Image Placeholder 1"/>
+          <p:cNvSpPr>
+            <a:spLocks noGrp="1" noRot="1" noChangeAspect="1"/>
+          </p:cNvSpPr>
+          <p:nvPr>
+            <p:ph type="sldImg"/>
+          </p:nvPr>
+        </p:nvSpPr>
+        <p:spPr/>
+      </p:sp>
+      <p:sp>
+        <p:nvSpPr>
+          <p:cNvPr id="3" name="Notes Placeholder 2"/>
+          <p:cNvSpPr>
+            <a:spLocks noGrp="1"/>
+          </p:cNvSpPr>
+          <p:nvPr>
+            <p:ph type="body" idx="1"/>
+          </p:nvPr>
+        </p:nvSpPr>
+        <p:spPr/>
+        <p:txBody>
+          <a:bodyPr/>
+          <a:lstStyle/>
+          <a:p>
+            <a:pPr lvl="0" indent="0" marL="0">
+              <a:buNone/>
+            </a:pPr>
+            <a:r>
+              <a:rPr/>
+              <a:t>The formula for hypergeometric probabilities uses combinatorics. Say that you want to get the probability of drawing w0 white balls and b0 black balls with n0 draws from an urn containing w1 white balls and b1 black balls (n1 balls total). Then it is W1 choose w0 times b1 choose b0 divided by n1 choose n0 where “choose” is the number of combinations. So the denominator, n1 choose n0, is n1 factorial divided by n0 factorial times (n1-n0) factorial.</a:t>
+            </a:r>
+          </a:p>
+        </p:txBody>
+      </p:sp>
+      <p:sp>
+        <p:nvSpPr>
+          <p:cNvPr id="4" name="Slide Number Placeholder 3"/>
+          <p:cNvSpPr>
+            <a:spLocks noGrp="1"/>
+          </p:cNvSpPr>
+          <p:nvPr>
+            <p:ph type="sldNum" sz="quarter" idx="10"/>
+          </p:nvPr>
+        </p:nvSpPr>
+        <p:spPr/>
+        <p:txBody>
+          <a:bodyPr/>
+          <a:lstStyle/>
+          <a:p>
+            <a:fld id="{18BDFEC3-8487-43E8-A154-7C12CBC1FFF2}" type="slidenum">
+              <a:rPr lang="en-US"/>
+              <a:t>15</a:t>
+            </a:fld>
+            <a:endParaRPr lang="en-US"/>
+          </a:p>
+        </p:txBody>
+      </p:sp>
+    </p:spTree>
+  </p:cSld>
+</p:notes>
+</file>
+
+<file path=ppt/notesSlides/notesSlide14.xml><?xml version="1.0" encoding="utf-8"?>
+<p:notes xmlns:a="http://schemas.openxmlformats.org/drawingml/2006/main" xmlns:r="http://schemas.openxmlformats.org/officeDocument/2006/relationships" xmlns:p="http://schemas.openxmlformats.org/presentationml/2006/main">
+  <p:cSld>
+    <p:spTree>
+      <p:nvGrpSpPr>
+        <p:cNvPr id="1" name=""/>
+        <p:cNvGrpSpPr/>
+        <p:nvPr/>
+      </p:nvGrpSpPr>
+      <p:grpSpPr>
+        <a:xfrm>
+          <a:off x="0" y="0"/>
+          <a:ext cx="0" cy="0"/>
+          <a:chOff x="0" y="0"/>
+          <a:chExt cx="0" cy="0"/>
+        </a:xfrm>
+      </p:grpSpPr>
+      <p:sp>
+        <p:nvSpPr>
+          <p:cNvPr id="2" name="Slide Image Placeholder 1"/>
+          <p:cNvSpPr>
+            <a:spLocks noGrp="1" noRot="1" noChangeAspect="1"/>
+          </p:cNvSpPr>
+          <p:nvPr>
+            <p:ph type="sldImg"/>
+          </p:nvPr>
+        </p:nvSpPr>
+        <p:spPr/>
+      </p:sp>
+      <p:sp>
+        <p:nvSpPr>
+          <p:cNvPr id="3" name="Notes Placeholder 2"/>
+          <p:cNvSpPr>
+            <a:spLocks noGrp="1"/>
+          </p:cNvSpPr>
+          <p:nvPr>
+            <p:ph type="body" idx="1"/>
+          </p:nvPr>
+        </p:nvSpPr>
+        <p:spPr/>
+        <p:txBody>
+          <a:bodyPr/>
+          <a:lstStyle/>
+          <a:p>
+            <a:pPr lvl="0" indent="0" marL="0">
+              <a:buNone/>
+            </a:pPr>
+            <a:r>
+              <a:rPr/>
+              <a:t>The functions to calculate hypergeometric probabilities vary from package to package. SAS uses a PDF function (short for Probability Density Function) with the ‘HYPER’ argument. R uses the dhyper function. Stata uses dis hypergeometricp. SPSS uses the PDF.HYPER function.</a:t>
+            </a:r>
+          </a:p>
+          <a:p>
+            <a:pPr lvl="0" indent="0" marL="0">
+              <a:buNone/>
+            </a:pPr>
+          </a:p>
+          <a:p>
+            <a:pPr lvl="0" indent="0" marL="0">
+              <a:buNone/>
+            </a:pPr>
+            <a:r>
+              <a:rPr/>
+              <a:t>All of these packages arrange the numeric arguments differently.</a:t>
+            </a:r>
+          </a:p>
+          <a:p>
+            <a:pPr lvl="0" indent="0" marL="0">
+              <a:buNone/>
+            </a:pPr>
+          </a:p>
+          <a:p>
+            <a:pPr lvl="0" indent="0" marL="0">
+              <a:buNone/>
+            </a:pPr>
+            <a:r>
+              <a:rPr/>
+              <a:t>Notice that R asks you to specify the number of white balls and the number of black balls. The other packages ask you to specify the number of white balls and the total number of balls, The order that you specify these values in is also inconsistent from package to package.</a:t>
+            </a:r>
+          </a:p>
+          <a:p>
+            <a:pPr lvl="0" indent="0" marL="0">
+              <a:buNone/>
+            </a:pPr>
+          </a:p>
+          <a:p>
+            <a:pPr lvl="0" indent="0" marL="0">
+              <a:buNone/>
+            </a:pPr>
+            <a:r>
+              <a:rPr/>
+              <a:t>I show this to emphasize that if you plan to calculate hypergeometric probabilities, read the manual closely. Fortunately, while it helps to understand that Fisher’s Exact Test relies on hypergeometric probabilities, you don’t have to calculate those probabilities yourself. We’ll show that in just a minute.as you will see in a minute.</a:t>
+            </a:r>
+          </a:p>
+        </p:txBody>
+      </p:sp>
+      <p:sp>
+        <p:nvSpPr>
+          <p:cNvPr id="4" name="Slide Number Placeholder 3"/>
+          <p:cNvSpPr>
+            <a:spLocks noGrp="1"/>
+          </p:cNvSpPr>
+          <p:nvPr>
+            <p:ph type="sldNum" sz="quarter" idx="10"/>
+          </p:nvPr>
+        </p:nvSpPr>
+        <p:spPr/>
+        <p:txBody>
+          <a:bodyPr/>
+          <a:lstStyle/>
+          <a:p>
+            <a:fld id="{18BDFEC3-8487-43E8-A154-7C12CBC1FFF2}" type="slidenum">
+              <a:rPr lang="en-US"/>
+              <a:t>16</a:t>
+            </a:fld>
+            <a:endParaRPr lang="en-US"/>
+          </a:p>
+        </p:txBody>
+      </p:sp>
+    </p:spTree>
+  </p:cSld>
+</p:notes>
+</file>
+
+<file path=ppt/notesSlides/notesSlide15.xml><?xml version="1.0" encoding="utf-8"?>
+<p:notes xmlns:a="http://schemas.openxmlformats.org/drawingml/2006/main" xmlns:r="http://schemas.openxmlformats.org/officeDocument/2006/relationships" xmlns:p="http://schemas.openxmlformats.org/presentationml/2006/main">
+  <p:cSld>
+    <p:spTree>
+      <p:nvGrpSpPr>
+        <p:cNvPr id="1" name=""/>
+        <p:cNvGrpSpPr/>
+        <p:nvPr/>
+      </p:nvGrpSpPr>
+      <p:grpSpPr>
+        <a:xfrm>
+          <a:off x="0" y="0"/>
+          <a:ext cx="0" cy="0"/>
+          <a:chOff x="0" y="0"/>
+          <a:chExt cx="0" cy="0"/>
+        </a:xfrm>
+      </p:grpSpPr>
+      <p:sp>
+        <p:nvSpPr>
+          <p:cNvPr id="2" name="Slide Image Placeholder 1"/>
+          <p:cNvSpPr>
+            <a:spLocks noGrp="1" noRot="1" noChangeAspect="1"/>
+          </p:cNvSpPr>
+          <p:nvPr>
+            <p:ph type="sldImg"/>
+          </p:nvPr>
+        </p:nvSpPr>
+        <p:spPr/>
+      </p:sp>
+      <p:sp>
+        <p:nvSpPr>
+          <p:cNvPr id="3" name="Notes Placeholder 2"/>
+          <p:cNvSpPr>
+            <a:spLocks noGrp="1"/>
+          </p:cNvSpPr>
+          <p:nvPr>
+            <p:ph type="body" idx="1"/>
+          </p:nvPr>
+        </p:nvSpPr>
+        <p:spPr/>
+        <p:txBody>
+          <a:bodyPr/>
+          <a:lstStyle/>
+          <a:p>
+            <a:pPr lvl="0" indent="0" marL="0">
+              <a:buNone/>
+            </a:pPr>
+            <a:r>
+              <a:rPr/>
+              <a:t>In SPSS, choose Analyze, Nonparametric tests, Independent Samples from the menu.</a:t>
+            </a:r>
+          </a:p>
+          <a:p>
+            <a:pPr lvl="0" indent="0" marL="0">
+              <a:buNone/>
+            </a:pPr>
+          </a:p>
+          <a:p>
+            <a:pPr lvl="0" indent="0" marL="0">
+              <a:buNone/>
+            </a:pPr>
+            <a:r>
+              <a:rPr/>
+              <a:t>In R use, the wilcox.test function.</a:t>
+            </a:r>
+          </a:p>
+          <a:p>
+            <a:pPr lvl="0" indent="0" marL="0">
+              <a:buNone/>
+            </a:pPr>
+          </a:p>
+          <a:p>
+            <a:pPr lvl="0" indent="0" marL="0">
+              <a:buNone/>
+            </a:pPr>
+            <a:r>
+              <a:rPr/>
+              <a:t>In Stata, use the </a:t>
+            </a:r>
+            <a:r>
+              <a:rPr>
+                <a:latin typeface="Courier"/>
+              </a:rPr>
+              <a:t>ranksum</a:t>
+            </a:r>
+            <a:r>
+              <a:rPr/>
+              <a:t> command.</a:t>
+            </a:r>
+          </a:p>
+        </p:txBody>
+      </p:sp>
+      <p:sp>
+        <p:nvSpPr>
+          <p:cNvPr id="4" name="Slide Number Placeholder 3"/>
+          <p:cNvSpPr>
+            <a:spLocks noGrp="1"/>
+          </p:cNvSpPr>
+          <p:nvPr>
+            <p:ph type="sldNum" sz="quarter" idx="10"/>
+          </p:nvPr>
+        </p:nvSpPr>
+        <p:spPr/>
+        <p:txBody>
+          <a:bodyPr/>
+          <a:lstStyle/>
+          <a:p>
+            <a:fld id="{18BDFEC3-8487-43E8-A154-7C12CBC1FFF2}" type="slidenum">
+              <a:rPr lang="en-US"/>
+              <a:t>45</a:t>
+            </a:fld>
+            <a:endParaRPr lang="en-US"/>
+          </a:p>
+        </p:txBody>
+      </p:sp>
+    </p:spTree>
+  </p:cSld>
+</p:notes>
+</file>
+
+<file path=ppt/notesSlides/notesSlide16.xml><?xml version="1.0" encoding="utf-8"?>
+<p:notes xmlns:a="http://schemas.openxmlformats.org/drawingml/2006/main" xmlns:r="http://schemas.openxmlformats.org/officeDocument/2006/relationships" xmlns:p="http://schemas.openxmlformats.org/presentationml/2006/main">
+  <p:cSld>
+    <p:spTree>
+      <p:nvGrpSpPr>
+        <p:cNvPr id="1" name=""/>
+        <p:cNvGrpSpPr/>
+        <p:nvPr/>
+      </p:nvGrpSpPr>
+      <p:grpSpPr>
+        <a:xfrm>
+          <a:off x="0" y="0"/>
+          <a:ext cx="0" cy="0"/>
+          <a:chOff x="0" y="0"/>
+          <a:chExt cx="0" cy="0"/>
+        </a:xfrm>
+      </p:grpSpPr>
+      <p:sp>
+        <p:nvSpPr>
+          <p:cNvPr id="2" name="Slide Image Placeholder 1"/>
+          <p:cNvSpPr>
+            <a:spLocks noGrp="1" noRot="1" noChangeAspect="1"/>
+          </p:cNvSpPr>
+          <p:nvPr>
+            <p:ph type="sldImg"/>
+          </p:nvPr>
+        </p:nvSpPr>
+        <p:spPr/>
+      </p:sp>
+      <p:sp>
+        <p:nvSpPr>
+          <p:cNvPr id="3" name="Notes Placeholder 2"/>
+          <p:cNvSpPr>
+            <a:spLocks noGrp="1"/>
+          </p:cNvSpPr>
+          <p:nvPr>
+            <p:ph type="body" idx="1"/>
+          </p:nvPr>
+        </p:nvSpPr>
+        <p:spPr/>
+        <p:txBody>
+          <a:bodyPr/>
+          <a:lstStyle/>
+          <a:p>
+            <a:pPr lvl="0" indent="0" marL="0">
+              <a:buNone/>
+            </a:pPr>
+            <a:r>
+              <a:rPr/>
+              <a:t>There are literally hundreds of possibilities for the use of exact test. Most involve discrete distributions or the use of nonparametric approaches like ranking.</a:t>
+            </a:r>
+          </a:p>
+          <a:p>
+            <a:pPr lvl="0" indent="0" marL="0">
+              <a:buNone/>
+            </a:pPr>
+          </a:p>
+          <a:p>
+            <a:pPr lvl="0" indent="0" marL="0">
+              <a:buNone/>
+            </a:pPr>
+            <a:r>
+              <a:rPr/>
+              <a:t>The general algorithm is to assume a null hypothesis. In the lady tasting tea, the null hypothesis is that the guesses are totally random. For the Mann-Whitney test, the null hypothesis is that all possible rankings are equally likely. Then list every possible outcome and attach a probability to each outcome. Then figure out which outcomes are as extreme or more extreme than your outcome and add up all the probabilities associated with those outcomes. That is your p-value.</a:t>
+            </a:r>
+          </a:p>
+          <a:p>
+            <a:pPr lvl="0" indent="0" marL="0">
+              <a:buNone/>
+            </a:pPr>
+          </a:p>
+          <a:p>
+            <a:pPr lvl="0" indent="0" marL="0">
+              <a:buNone/>
+            </a:pPr>
+            <a:r>
+              <a:rPr/>
+              <a:t>If you find a setting where you want an exact test, but you can’t find one in your software, you might consider a package, StatXact, that can do literally hundreds of exact tests. The programmers at StatXact have figured out really efficient algorithms for listing all possible outcomes, even when the sample size is not trivially small.</a:t>
+            </a:r>
+          </a:p>
+        </p:txBody>
+      </p:sp>
+      <p:sp>
+        <p:nvSpPr>
+          <p:cNvPr id="4" name="Slide Number Placeholder 3"/>
+          <p:cNvSpPr>
+            <a:spLocks noGrp="1"/>
+          </p:cNvSpPr>
+          <p:nvPr>
+            <p:ph type="sldNum" sz="quarter" idx="10"/>
+          </p:nvPr>
+        </p:nvSpPr>
+        <p:spPr/>
+        <p:txBody>
+          <a:bodyPr/>
+          <a:lstStyle/>
+          <a:p>
+            <a:fld id="{18BDFEC3-8487-43E8-A154-7C12CBC1FFF2}" type="slidenum">
+              <a:rPr lang="en-US"/>
+              <a:t>46</a:t>
+            </a:fld>
+            <a:endParaRPr lang="en-US"/>
+          </a:p>
+        </p:txBody>
+      </p:sp>
+    </p:spTree>
+  </p:cSld>
+</p:notes>
+</file>
+
 <file path=ppt/notesSlides/notesSlide2.xml><?xml version="1.0" encoding="utf-8"?>
 <p:notes xmlns:a="http://schemas.openxmlformats.org/drawingml/2006/main" xmlns:r="http://schemas.openxmlformats.org/officeDocument/2006/relationships" xmlns:p="http://schemas.openxmlformats.org/presentationml/2006/main">
   <p:cSld>
@@ -751,6 +1498,20 @@
             </a:pPr>
             <a:r>
               <a:rPr/>
+              <a:t>Here is an outline of the topics you will see today.</a:t>
+            </a:r>
+          </a:p>
+          <a:p>
+            <a:pPr lvl="0" indent="0" marL="0">
+              <a:buNone/>
+            </a:pPr>
+          </a:p>
+          <a:p>
+            <a:pPr lvl="0" indent="0" marL="0">
+              <a:buNone/>
+            </a:pPr>
+            <a:r>
+              <a:rPr/>
               <a:t>First, I will provide a historical overview, with an example derived in 1931, when Statistics was still in its infancy.</a:t>
             </a:r>
           </a:p>
@@ -833,7 +1594,49 @@
             </a:pPr>
             <a:r>
               <a:rPr/>
-              <a:t>Let’s start with a historical overview.</a:t>
+              <a:t>Let’s start with a historical overview. Ronald Fisher was a pioneer in the field of statistics. He developed many foundational methodologies, such as the use of designed experiments and p-values.</a:t>
+            </a:r>
+          </a:p>
+          <a:p>
+            <a:pPr lvl="0" indent="0" marL="0">
+              <a:buNone/>
+            </a:pPr>
+          </a:p>
+          <a:p>
+            <a:pPr lvl="0" indent="0" marL="0">
+              <a:buNone/>
+            </a:pPr>
+            <a:r>
+              <a:rPr/>
+              <a:t>He does have a checkered past, unfortunately. He was a sharp critic of efforts in the 1950s and 60s to draw a link between cigarette smoking and cancer. He felt, quite wrongly as it turned out, that you could only show a link between smoking and cancer through randomized trials.</a:t>
+            </a:r>
+          </a:p>
+          <a:p>
+            <a:pPr lvl="0" indent="0" marL="0">
+              <a:buNone/>
+            </a:pPr>
+          </a:p>
+          <a:p>
+            <a:pPr lvl="0" indent="0" marL="0">
+              <a:buNone/>
+            </a:pPr>
+            <a:r>
+              <a:rPr/>
+              <a:t>Even worse were his blatantly racist views and his support for eugenics. This is the topic for another talk. But I did want to highlight a simple experiment he proposed in his 1935 book, The Design of Experiments, known as “The lady testing tea.”</a:t>
+            </a:r>
+          </a:p>
+          <a:p>
+            <a:pPr lvl="0" indent="0" marL="0">
+              <a:buNone/>
+            </a:pPr>
+          </a:p>
+          <a:p>
+            <a:pPr lvl="0" indent="0" marL="0">
+              <a:buNone/>
+            </a:pPr>
+            <a:r>
+              <a:rPr/>
+              <a:t>This was a simple example of the use of randomization and blinding to test a simple hypothesis.</a:t>
             </a:r>
           </a:p>
         </p:txBody>
@@ -915,7 +1718,7 @@
             </a:pPr>
             <a:r>
               <a:rPr/>
-              <a:t>Most of the discussion of these functions describe the hypergeometric distribution as an abstract problem of drawing balls from an urn. So think of the eight cups of tea as an urn with eight balls, four white and four black. The white balls represent correctly identifying the cup of tea as having the milk added first. The black balls represent mistakes in identification. So what is the probability of getting 3 white balls after drawing 4 balls without replacement?</a:t>
+              <a:t>In England, there is an interesting practice of pouring hot tea into a cup and then adding milk. It’s not something that I like. Just give me the tea straight. No milk, no sugar, no lemon slices. But tea served with milk is quite popular in England and elsewhere.</a:t>
             </a:r>
           </a:p>
         </p:txBody>
@@ -937,7 +1740,7 @@
           <a:p>
             <a:fld id="{18BDFEC3-8487-43E8-A154-7C12CBC1FFF2}" type="slidenum">
               <a:rPr lang="en-US"/>
-              <a:t>14</a:t>
+              <a:t>6</a:t>
             </a:fld>
             <a:endParaRPr lang="en-US"/>
           </a:p>
@@ -997,21 +1800,21 @@
             </a:pPr>
             <a:r>
               <a:rPr/>
-              <a:t>The functions to calculate hypergeometric probabilities vary from package to package. SAS uses a PDF function (short for Probability Density Function) with the ‘HYPER’ argument. R uses the dhyper function. Stata uses dis hypergeometricp. SPSS uses the PDF.HYPER function.</a:t>
-            </a:r>
-          </a:p>
-          <a:p>
-            <a:pPr lvl="0" indent="0" marL="0">
-              <a:buNone/>
-            </a:pPr>
-          </a:p>
-          <a:p>
-            <a:pPr lvl="0" indent="0" marL="0">
-              <a:buNone/>
-            </a:pPr>
-            <a:r>
-              <a:rPr/>
-              <a:t>All of these packages arrange the numeric arguments differently.</a:t>
+              <a:t>You could change the order, though, putting milk in the cup first and then adding the tea.</a:t>
+            </a:r>
+          </a:p>
+          <a:p>
+            <a:pPr lvl="0" indent="0" marL="0">
+              <a:buNone/>
+            </a:pPr>
+          </a:p>
+          <a:p>
+            <a:pPr lvl="0" indent="0" marL="0">
+              <a:buNone/>
+            </a:pPr>
+            <a:r>
+              <a:rPr/>
+              <a:t>A colleague of Fisher’s, Muriel Bristol, claimed that she could tell, just by tasting, whether a cup had the tea first with milk added or milk first with tea added. She preferred the latter. When she told Fisher this, he scoffed and said that no one could tell the difference between tea with milk added and milk with tea added. Along with another colleague, William Roach, they designed an experiment to prove her wrong.</a:t>
             </a:r>
           </a:p>
         </p:txBody>
@@ -1033,7 +1836,7 @@
           <a:p>
             <a:fld id="{18BDFEC3-8487-43E8-A154-7C12CBC1FFF2}" type="slidenum">
               <a:rPr lang="en-US"/>
-              <a:t>15</a:t>
+              <a:t>7</a:t>
             </a:fld>
             <a:endParaRPr lang="en-US"/>
           </a:p>
@@ -1093,35 +1896,7 @@
             </a:pPr>
             <a:r>
               <a:rPr/>
-              <a:t>Notice that R asks you to specify the number of white balls and the number of black balls. The other packages ask you to specify the number of white balls and the total number of balls, The order that you specify these values in is also inconsistent from package to package.</a:t>
-            </a:r>
-          </a:p>
-          <a:p>
-            <a:pPr lvl="0" indent="0" marL="0">
-              <a:buNone/>
-            </a:pPr>
-          </a:p>
-          <a:p>
-            <a:pPr lvl="0" indent="0" marL="0">
-              <a:buNone/>
-            </a:pPr>
-            <a:r>
-              <a:rPr/>
-              <a:t>I show this to emphasize that if you plan to calculate hypergeometric probabilities, read the manual closely. It also helps to first do some simple calculations like an urn with 4 white and 4 black balls. Compare what the statistical package tells you with what you calculated by hand.</a:t>
-            </a:r>
-          </a:p>
-          <a:p>
-            <a:pPr lvl="0" indent="0" marL="0">
-              <a:buNone/>
-            </a:pPr>
-          </a:p>
-          <a:p>
-            <a:pPr lvl="0" indent="0" marL="0">
-              <a:buNone/>
-            </a:pPr>
-            <a:r>
-              <a:rPr/>
-              <a:t>Fortunately, you don’t need to resort to the hypergeometric probabilities.</a:t>
+              <a:t>Fisher and Roach prepared eight cups of tea, four with the tea added first and four with the milk added first. They presented the eight cups to Bristol in a random order and had her taste each cup and identify which of the four had milk added first.</a:t>
             </a:r>
           </a:p>
         </p:txBody>
@@ -1143,7 +1918,199 @@
           <a:p>
             <a:fld id="{18BDFEC3-8487-43E8-A154-7C12CBC1FFF2}" type="slidenum">
               <a:rPr lang="en-US"/>
-              <a:t>16</a:t>
+              <a:t>8</a:t>
+            </a:fld>
+            <a:endParaRPr lang="en-US"/>
+          </a:p>
+        </p:txBody>
+      </p:sp>
+    </p:spTree>
+  </p:cSld>
+</p:notes>
+</file>
+
+<file path=ppt/notesSlides/notesSlide8.xml><?xml version="1.0" encoding="utf-8"?>
+<p:notes xmlns:a="http://schemas.openxmlformats.org/drawingml/2006/main" xmlns:r="http://schemas.openxmlformats.org/officeDocument/2006/relationships" xmlns:p="http://schemas.openxmlformats.org/presentationml/2006/main">
+  <p:cSld>
+    <p:spTree>
+      <p:nvGrpSpPr>
+        <p:cNvPr id="1" name=""/>
+        <p:cNvGrpSpPr/>
+        <p:nvPr/>
+      </p:nvGrpSpPr>
+      <p:grpSpPr>
+        <a:xfrm>
+          <a:off x="0" y="0"/>
+          <a:ext cx="0" cy="0"/>
+          <a:chOff x="0" y="0"/>
+          <a:chExt cx="0" cy="0"/>
+        </a:xfrm>
+      </p:grpSpPr>
+      <p:sp>
+        <p:nvSpPr>
+          <p:cNvPr id="2" name="Slide Image Placeholder 1"/>
+          <p:cNvSpPr>
+            <a:spLocks noGrp="1" noRot="1" noChangeAspect="1"/>
+          </p:cNvSpPr>
+          <p:nvPr>
+            <p:ph type="sldImg"/>
+          </p:nvPr>
+        </p:nvSpPr>
+        <p:spPr/>
+      </p:sp>
+      <p:sp>
+        <p:nvSpPr>
+          <p:cNvPr id="3" name="Notes Placeholder 2"/>
+          <p:cNvSpPr>
+            <a:spLocks noGrp="1"/>
+          </p:cNvSpPr>
+          <p:nvPr>
+            <p:ph type="body" idx="1"/>
+          </p:nvPr>
+        </p:nvSpPr>
+        <p:spPr/>
+        <p:txBody>
+          <a:bodyPr/>
+          <a:lstStyle/>
+          <a:p>
+            <a:pPr lvl="0" indent="0" marL="0">
+              <a:buNone/>
+            </a:pPr>
+            <a:r>
+              <a:rPr/>
+              <a:t>To their surprise, after tasting all eight cups, she correctly identified the four cups that had the milk added first. This is indeed a surprising results, but how surprising?</a:t>
+            </a:r>
+          </a:p>
+        </p:txBody>
+      </p:sp>
+      <p:sp>
+        <p:nvSpPr>
+          <p:cNvPr id="4" name="Slide Number Placeholder 3"/>
+          <p:cNvSpPr>
+            <a:spLocks noGrp="1"/>
+          </p:cNvSpPr>
+          <p:nvPr>
+            <p:ph type="sldNum" sz="quarter" idx="10"/>
+          </p:nvPr>
+        </p:nvSpPr>
+        <p:spPr/>
+        <p:txBody>
+          <a:bodyPr/>
+          <a:lstStyle/>
+          <a:p>
+            <a:fld id="{18BDFEC3-8487-43E8-A154-7C12CBC1FFF2}" type="slidenum">
+              <a:rPr lang="en-US"/>
+              <a:t>9</a:t>
+            </a:fld>
+            <a:endParaRPr lang="en-US"/>
+          </a:p>
+        </p:txBody>
+      </p:sp>
+    </p:spTree>
+  </p:cSld>
+</p:notes>
+</file>
+
+<file path=ppt/notesSlides/notesSlide9.xml><?xml version="1.0" encoding="utf-8"?>
+<p:notes xmlns:a="http://schemas.openxmlformats.org/drawingml/2006/main" xmlns:r="http://schemas.openxmlformats.org/officeDocument/2006/relationships" xmlns:p="http://schemas.openxmlformats.org/presentationml/2006/main">
+  <p:cSld>
+    <p:spTree>
+      <p:nvGrpSpPr>
+        <p:cNvPr id="1" name=""/>
+        <p:cNvGrpSpPr/>
+        <p:nvPr/>
+      </p:nvGrpSpPr>
+      <p:grpSpPr>
+        <a:xfrm>
+          <a:off x="0" y="0"/>
+          <a:ext cx="0" cy="0"/>
+          <a:chOff x="0" y="0"/>
+          <a:chExt cx="0" cy="0"/>
+        </a:xfrm>
+      </p:grpSpPr>
+      <p:sp>
+        <p:nvSpPr>
+          <p:cNvPr id="2" name="Slide Image Placeholder 1"/>
+          <p:cNvSpPr>
+            <a:spLocks noGrp="1" noRot="1" noChangeAspect="1"/>
+          </p:cNvSpPr>
+          <p:nvPr>
+            <p:ph type="sldImg"/>
+          </p:nvPr>
+        </p:nvSpPr>
+        <p:spPr/>
+      </p:sp>
+      <p:sp>
+        <p:nvSpPr>
+          <p:cNvPr id="3" name="Notes Placeholder 2"/>
+          <p:cNvSpPr>
+            <a:spLocks noGrp="1"/>
+          </p:cNvSpPr>
+          <p:nvPr>
+            <p:ph type="body" idx="1"/>
+          </p:nvPr>
+        </p:nvSpPr>
+        <p:spPr/>
+        <p:txBody>
+          <a:bodyPr/>
+          <a:lstStyle/>
+          <a:p>
+            <a:pPr lvl="0" indent="0" marL="0">
+              <a:buNone/>
+            </a:pPr>
+            <a:r>
+              <a:rPr/>
+              <a:t>If Bristol had no ability to tell whether the milk was added first and was effectively picking at random, for the first choice, the probability would be 50-50 or four out of eight, since there were the same number of cups with tea added first and milk added first.</a:t>
+            </a:r>
+          </a:p>
+          <a:p>
+            <a:pPr lvl="0" indent="0" marL="0">
+              <a:buNone/>
+            </a:pPr>
+          </a:p>
+          <a:p>
+            <a:pPr lvl="0" indent="0" marL="0">
+              <a:buNone/>
+            </a:pPr>
+            <a:r>
+              <a:rPr/>
+              <a:t>If she picked this correctly, the chances that her second selection would be correct, assuming that she was choosing randomly would be 3/7 since only three of the remaining seven cups had the mill added first. It gets even harder for the third choice, assuming that she got the first two correct. There are only two cups now with milk added first out of the remaining six. The last choice is the hardest of all. The probability is one out of five, assuming she got the first three correct. Multiply these four probabilities to get 1/70. So this is quite surprising indeed. If she had no clue which cups had the milk added first, it would take quite a streak of good luck for her to correctly identify four in a row.</a:t>
+            </a:r>
+          </a:p>
+          <a:p>
+            <a:pPr lvl="0" indent="0" marL="0">
+              <a:buNone/>
+            </a:pPr>
+          </a:p>
+          <a:p>
+            <a:pPr lvl="0" indent="0" marL="0">
+              <a:buNone/>
+            </a:pPr>
+            <a:r>
+              <a:rPr/>
+              <a:t>Now notice that the probability is not 1/2 raised to the fourth power. The probabilities change because once a cup is identified correctly, it is taken out of the pool of cups. This is analogous to the concept sampling without replacement.</a:t>
+            </a:r>
+          </a:p>
+        </p:txBody>
+      </p:sp>
+      <p:sp>
+        <p:nvSpPr>
+          <p:cNvPr id="4" name="Slide Number Placeholder 3"/>
+          <p:cNvSpPr>
+            <a:spLocks noGrp="1"/>
+          </p:cNvSpPr>
+          <p:nvPr>
+            <p:ph type="sldNum" sz="quarter" idx="10"/>
+          </p:nvPr>
+        </p:nvSpPr>
+        <p:spPr/>
+        <p:txBody>
+          <a:bodyPr/>
+          <a:lstStyle/>
+          <a:p>
+            <a:fld id="{18BDFEC3-8487-43E8-A154-7C12CBC1FFF2}" type="slidenum">
+              <a:rPr lang="en-US"/>
+              <a:t>10</a:t>
             </a:fld>
             <a:endParaRPr lang="en-US"/>
           </a:p>
@@ -4272,15 +5239,6 @@
               <a:bodyPr/>
               <a:lstStyle/>
               <a:p>
-                <a:pPr lvl="0" indent="0" marL="0">
-                  <a:buNone/>
-                </a:pPr>
-                <a:r>
-                  <a:rPr/>
-                  <a:t>If the lady had no ability to tell whether the milk was added first and was effectively picking at random, the probability would be</a:t>
-                </a:r>
-              </a:p>
-              <a:p>
                 <a:pPr lvl="0"/>
                 <a14:m>
                   <m:oMath xmlns:m="http://schemas.openxmlformats.org/officeDocument/2006/math">
@@ -4477,7 +5435,7 @@
             </a:pPr>
             <a:r>
               <a:rPr/>
-              <a:t>Break #2</a:t>
+              <a:t>Break #1</a:t>
             </a:r>
           </a:p>
         </p:txBody>
@@ -4512,6 +5470,15 @@
             <a:r>
               <a:rPr/>
               <a:t>What is coming next? + The hypergeometric distribution</a:t>
+            </a:r>
+          </a:p>
+          <a:p>
+            <a:pPr lvl="0" indent="0" marL="0">
+              <a:buNone/>
+            </a:pPr>
+            <a:r>
+              <a:rPr/>
+              <a:t>Any questions?</a:t>
             </a:r>
           </a:p>
         </p:txBody>
@@ -4572,7 +5539,7 @@
           <p:nvPr/>
         </p:nvPicPr>
         <p:blipFill>
-          <a:blip r:embed="rId2"/>
+          <a:blip r:embed="rId3"/>
           <a:stretch>
             <a:fillRect/>
           </a:stretch>
@@ -4771,10 +5738,22 @@
                       </m:den>
                     </m:f>
                     <m:r>
+                      <m:t> </m:t>
+                    </m:r>
+                    <m:r>
+                      <m:t> </m:t>
+                    </m:r>
+                    <m:r>
                       <m:rPr>
                         <m:sty m:val="p"/>
                       </m:rPr>
                       <m:t>+</m:t>
+                    </m:r>
+                    <m:r>
+                      <m:t> </m:t>
+                    </m:r>
+                    <m:r>
+                      <m:t> </m:t>
                     </m:r>
                     <m:f>
                       <m:fPr>
@@ -4855,10 +5834,22 @@
                       </m:den>
                     </m:f>
                     <m:r>
+                      <m:t> </m:t>
+                    </m:r>
+                    <m:r>
+                      <m:t> </m:t>
+                    </m:r>
+                    <m:r>
                       <m:rPr>
                         <m:sty m:val="p"/>
                       </m:rPr>
                       <m:t>+</m:t>
+                    </m:r>
+                    <m:r>
+                      <m:t> </m:t>
+                    </m:r>
+                    <m:r>
+                      <m:t> </m:t>
                     </m:r>
                     <m:r>
                       <m:rPr>
@@ -5018,55 +6009,393 @@
             </a:pPr>
             <a:r>
               <a:rPr/>
-              <a:t>Use the hypergeometric distribution</a:t>
-            </a:r>
-          </a:p>
-        </p:txBody>
-      </p:sp>
-      <p:sp>
-        <p:nvSpPr>
-          <p:cNvPr id="3" name="Content Placeholder 2"/>
-          <p:cNvSpPr>
-            <a:spLocks noGrp="1"/>
-          </p:cNvSpPr>
-          <p:nvPr>
-            <p:ph idx="1"/>
-          </p:nvPr>
-        </p:nvSpPr>
-        <p:spPr/>
-        <p:txBody>
-          <a:bodyPr/>
-          <a:lstStyle/>
-          <a:p>
-            <a:pPr lvl="0"/>
-            <a:r>
-              <a:rPr/>
-              <a:t>SAS: PDF(‘HYPER’, 3, 8, 4, 4)</a:t>
-            </a:r>
-          </a:p>
-          <a:p>
-            <a:pPr lvl="0"/>
-            <a:r>
-              <a:rPr/>
-              <a:t>R: dhyper(3, 4, 4, 4)</a:t>
-            </a:r>
-          </a:p>
-          <a:p>
-            <a:pPr lvl="0"/>
-            <a:r>
-              <a:rPr/>
-              <a:t>Stata: dis hypergeometricp(8, 4, 4, 3)</a:t>
-            </a:r>
-          </a:p>
-          <a:p>
-            <a:pPr lvl="0"/>
-            <a:r>
-              <a:rPr/>
-              <a:t>SPSS: PDF.HYPER(3, 8, 4, 4)</a:t>
-            </a:r>
-          </a:p>
-        </p:txBody>
-      </p:sp>
+              <a:t>Formula for hypergeometric probabilities</a:t>
+            </a:r>
+          </a:p>
+        </p:txBody>
+      </p:sp>
+      <mc:AlternateContent xmlns:mc="http://schemas.openxmlformats.org/markup-compatibility/2006">
+        <mc:Choice xmlns:a14="http://schemas.microsoft.com/office/drawing/2010/main" Requires="a14">
+          <p:sp>
+            <p:nvSpPr>
+              <p:cNvPr id="3" name="Content Placeholder 2"/>
+              <p:cNvSpPr>
+                <a:spLocks noGrp="1"/>
+              </p:cNvSpPr>
+              <p:nvPr>
+                <p:ph idx="1"/>
+              </p:nvPr>
+            </p:nvSpPr>
+            <p:spPr/>
+            <p:txBody>
+              <a:bodyPr/>
+              <a:lstStyle/>
+              <a:p>
+                <a:pPr lvl="0" indent="0" marL="0">
+                  <a:buNone/>
+                </a:pPr>
+                <a14:m>
+                  <m:oMathPara xmlns:m="http://schemas.openxmlformats.org/officeDocument/2006/math">
+                    <m:oMathParaPr>
+                      <m:jc m:val="center"/>
+                    </m:oMathParaPr>
+                    <m:oMath>
+                      <m:f>
+                        <m:fPr>
+                          <m:type m:val="bar"/>
+                        </m:fPr>
+                        <m:num>
+                          <m:d>
+                            <m:dPr>
+                              <m:begChr m:val="("/>
+                              <m:endChr m:val=")"/>
+                              <m:sepChr m:val=""/>
+                              <m:grow/>
+                            </m:dPr>
+                            <m:e>
+                              <m:f>
+                                <m:fPr>
+                                  <m:type m:val="noBar"/>
+                                </m:fPr>
+                                <m:num>
+                                  <m:sSub>
+                                    <m:e>
+                                      <m:r>
+                                        <m:t>w</m:t>
+                                      </m:r>
+                                    </m:e>
+                                    <m:sub>
+                                      <m:r>
+                                        <m:t>1</m:t>
+                                      </m:r>
+                                    </m:sub>
+                                  </m:sSub>
+                                </m:num>
+                                <m:den>
+                                  <m:sSub>
+                                    <m:e>
+                                      <m:r>
+                                        <m:t>w</m:t>
+                                      </m:r>
+                                    </m:e>
+                                    <m:sub>
+                                      <m:r>
+                                        <m:t>0</m:t>
+                                      </m:r>
+                                    </m:sub>
+                                  </m:sSub>
+                                </m:den>
+                              </m:f>
+                            </m:e>
+                          </m:d>
+                          <m:d>
+                            <m:dPr>
+                              <m:begChr m:val="("/>
+                              <m:endChr m:val=")"/>
+                              <m:sepChr m:val=""/>
+                              <m:grow/>
+                            </m:dPr>
+                            <m:e>
+                              <m:f>
+                                <m:fPr>
+                                  <m:type m:val="noBar"/>
+                                </m:fPr>
+                                <m:num>
+                                  <m:sSub>
+                                    <m:e>
+                                      <m:r>
+                                        <m:t>b</m:t>
+                                      </m:r>
+                                    </m:e>
+                                    <m:sub>
+                                      <m:r>
+                                        <m:t>1</m:t>
+                                      </m:r>
+                                    </m:sub>
+                                  </m:sSub>
+                                </m:num>
+                                <m:den>
+                                  <m:sSub>
+                                    <m:e>
+                                      <m:r>
+                                        <m:t>b</m:t>
+                                      </m:r>
+                                    </m:e>
+                                    <m:sub>
+                                      <m:r>
+                                        <m:t>0</m:t>
+                                      </m:r>
+                                    </m:sub>
+                                  </m:sSub>
+                                </m:den>
+                              </m:f>
+                            </m:e>
+                          </m:d>
+                        </m:num>
+                        <m:den>
+                          <m:d>
+                            <m:dPr>
+                              <m:begChr m:val="("/>
+                              <m:endChr m:val=")"/>
+                              <m:sepChr m:val=""/>
+                              <m:grow/>
+                            </m:dPr>
+                            <m:e>
+                              <m:f>
+                                <m:fPr>
+                                  <m:type m:val="noBar"/>
+                                </m:fPr>
+                                <m:num>
+                                  <m:sSub>
+                                    <m:e>
+                                      <m:r>
+                                        <m:t>n</m:t>
+                                      </m:r>
+                                    </m:e>
+                                    <m:sub>
+                                      <m:r>
+                                        <m:t>1</m:t>
+                                      </m:r>
+                                    </m:sub>
+                                  </m:sSub>
+                                </m:num>
+                                <m:den>
+                                  <m:sSub>
+                                    <m:e>
+                                      <m:r>
+                                        <m:t>n</m:t>
+                                      </m:r>
+                                    </m:e>
+                                    <m:sub>
+                                      <m:r>
+                                        <m:t>0</m:t>
+                                      </m:r>
+                                    </m:sub>
+                                  </m:sSub>
+                                </m:den>
+                              </m:f>
+                            </m:e>
+                          </m:d>
+                        </m:den>
+                      </m:f>
+                    </m:oMath>
+                  </m:oMathPara>
+                </a14:m>
+              </a:p>
+              <a:p>
+                <a:pPr lvl="0"/>
+                <a14:m>
+                  <m:oMath xmlns:m="http://schemas.openxmlformats.org/officeDocument/2006/math">
+                    <m:sSub>
+                      <m:e>
+                        <m:r>
+                          <m:t>w</m:t>
+                        </m:r>
+                      </m:e>
+                      <m:sub>
+                        <m:r>
+                          <m:t>1</m:t>
+                        </m:r>
+                      </m:sub>
+                    </m:sSub>
+                  </m:oMath>
+                </a14:m>
+                <a:r>
+                  <a:rPr/>
+                  <a:t> = # of white balls in the urn</a:t>
+                </a:r>
+              </a:p>
+              <a:p>
+                <a:pPr lvl="0"/>
+                <a14:m>
+                  <m:oMath xmlns:m="http://schemas.openxmlformats.org/officeDocument/2006/math">
+                    <m:sSub>
+                      <m:e>
+                        <m:r>
+                          <m:t>b</m:t>
+                        </m:r>
+                      </m:e>
+                      <m:sub>
+                        <m:r>
+                          <m:t>1</m:t>
+                        </m:r>
+                      </m:sub>
+                    </m:sSub>
+                  </m:oMath>
+                </a14:m>
+                <a:r>
+                  <a:rPr/>
+                  <a:t> = # of black balls in the urn</a:t>
+                </a:r>
+              </a:p>
+              <a:p>
+                <a:pPr lvl="0"/>
+                <a14:m>
+                  <m:oMath xmlns:m="http://schemas.openxmlformats.org/officeDocument/2006/math">
+                    <m:sSub>
+                      <m:e>
+                        <m:r>
+                          <m:t>n</m:t>
+                        </m:r>
+                      </m:e>
+                      <m:sub>
+                        <m:r>
+                          <m:t>1</m:t>
+                        </m:r>
+                      </m:sub>
+                    </m:sSub>
+                    <m:r>
+                      <m:rPr>
+                        <m:sty m:val="p"/>
+                      </m:rPr>
+                      <m:t>=</m:t>
+                    </m:r>
+                    <m:sSub>
+                      <m:e>
+                        <m:r>
+                          <m:t>w</m:t>
+                        </m:r>
+                      </m:e>
+                      <m:sub>
+                        <m:r>
+                          <m:t>1</m:t>
+                        </m:r>
+                      </m:sub>
+                    </m:sSub>
+                    <m:r>
+                      <m:rPr>
+                        <m:sty m:val="p"/>
+                      </m:rPr>
+                      <m:t>+</m:t>
+                    </m:r>
+                    <m:sSub>
+                      <m:e>
+                        <m:r>
+                          <m:t>b</m:t>
+                        </m:r>
+                      </m:e>
+                      <m:sub>
+                        <m:r>
+                          <m:t>1</m:t>
+                        </m:r>
+                      </m:sub>
+                    </m:sSub>
+                  </m:oMath>
+                </a14:m>
+                <a:r>
+                  <a:rPr/>
+                  <a:t> = total # of balls in the urn</a:t>
+                </a:r>
+              </a:p>
+              <a:p>
+                <a:pPr lvl="0"/>
+                <a14:m>
+                  <m:oMath xmlns:m="http://schemas.openxmlformats.org/officeDocument/2006/math">
+                    <m:sSub>
+                      <m:e>
+                        <m:r>
+                          <m:t>w</m:t>
+                        </m:r>
+                      </m:e>
+                      <m:sub>
+                        <m:r>
+                          <m:t>0</m:t>
+                        </m:r>
+                      </m:sub>
+                    </m:sSub>
+                  </m:oMath>
+                </a14:m>
+                <a:r>
+                  <a:rPr/>
+                  <a:t> = # white balls drawn from the urn</a:t>
+                </a:r>
+              </a:p>
+              <a:p>
+                <a:pPr lvl="0"/>
+                <a14:m>
+                  <m:oMath xmlns:m="http://schemas.openxmlformats.org/officeDocument/2006/math">
+                    <m:sSub>
+                      <m:e>
+                        <m:r>
+                          <m:t>b</m:t>
+                        </m:r>
+                      </m:e>
+                      <m:sub>
+                        <m:r>
+                          <m:t>0</m:t>
+                        </m:r>
+                      </m:sub>
+                    </m:sSub>
+                  </m:oMath>
+                </a14:m>
+                <a:r>
+                  <a:rPr/>
+                  <a:t> = # black balls drawn from the urn</a:t>
+                </a:r>
+              </a:p>
+              <a:p>
+                <a:pPr lvl="0"/>
+                <a14:m>
+                  <m:oMath xmlns:m="http://schemas.openxmlformats.org/officeDocument/2006/math">
+                    <m:sSub>
+                      <m:e>
+                        <m:r>
+                          <m:t>n</m:t>
+                        </m:r>
+                      </m:e>
+                      <m:sub>
+                        <m:r>
+                          <m:t>0</m:t>
+                        </m:r>
+                      </m:sub>
+                    </m:sSub>
+                    <m:r>
+                      <m:rPr>
+                        <m:sty m:val="p"/>
+                      </m:rPr>
+                      <m:t>=</m:t>
+                    </m:r>
+                    <m:sSub>
+                      <m:e>
+                        <m:r>
+                          <m:t>w</m:t>
+                        </m:r>
+                      </m:e>
+                      <m:sub>
+                        <m:r>
+                          <m:t>0</m:t>
+                        </m:r>
+                      </m:sub>
+                    </m:sSub>
+                    <m:r>
+                      <m:rPr>
+                        <m:sty m:val="p"/>
+                      </m:rPr>
+                      <m:t>+</m:t>
+                    </m:r>
+                    <m:sSub>
+                      <m:e>
+                        <m:r>
+                          <m:t>b</m:t>
+                        </m:r>
+                      </m:e>
+                      <m:sub>
+                        <m:r>
+                          <m:t>0</m:t>
+                        </m:r>
+                      </m:sub>
+                    </m:sSub>
+                  </m:oMath>
+                </a14:m>
+                <a:r>
+                  <a:rPr/>
+                  <a:t> = total # of balls drawn</a:t>
+                </a:r>
+              </a:p>
+            </p:txBody>
+          </p:sp>
+        </mc:Choice>
+      </mc:AlternateContent>
     </p:spTree>
   </p:cSld>
 </p:sld>
@@ -5109,7 +6438,7 @@
             </a:pPr>
             <a:r>
               <a:rPr/>
-              <a:t>Use the hypergeometric distribution</a:t>
+              <a:t>Functions for computing hypergeometric probabilities</a:t>
             </a:r>
           </a:p>
         </p:txBody>
@@ -5132,63 +6461,28 @@
             <a:pPr lvl="0"/>
             <a:r>
               <a:rPr/>
-              <a:t>W=# of white balls in the urn</a:t>
+              <a:t>SAS: PDF(‘HYPER’, w0, n1, w1, n0)</a:t>
             </a:r>
           </a:p>
           <a:p>
             <a:pPr lvl="0"/>
             <a:r>
               <a:rPr/>
-              <a:t>B=# of black balls in the urn</a:t>
+              <a:t>R: dhyper(w0, w1, b1, n0)</a:t>
             </a:r>
           </a:p>
           <a:p>
             <a:pPr lvl="0"/>
             <a:r>
               <a:rPr/>
-              <a:t>N=W+B=# of balls total in the urn</a:t>
+              <a:t>Stata: dis hypergeometricp(n1, w1, n0, w0)</a:t>
             </a:r>
           </a:p>
           <a:p>
             <a:pPr lvl="0"/>
             <a:r>
               <a:rPr/>
-              <a:t>d=# of balls drawn from the urn</a:t>
-            </a:r>
-          </a:p>
-          <a:p>
-            <a:pPr lvl="0"/>
-            <a:r>
-              <a:rPr/>
-              <a:t>x=# of drawn balls that are white</a:t>
-            </a:r>
-          </a:p>
-          <a:p>
-            <a:pPr lvl="1"/>
-            <a:r>
-              <a:rPr/>
-              <a:t>SAS: PDF(‘HYPER’, x, N, W, d)</a:t>
-            </a:r>
-          </a:p>
-          <a:p>
-            <a:pPr lvl="1"/>
-            <a:r>
-              <a:rPr/>
-              <a:t>R: dhyper(x, W, B, d)</a:t>
-            </a:r>
-          </a:p>
-          <a:p>
-            <a:pPr lvl="1"/>
-            <a:r>
-              <a:rPr/>
-              <a:t>Stata: dis hypergeometricp(N, W, d, x)</a:t>
-            </a:r>
-          </a:p>
-          <a:p>
-            <a:pPr lvl="1"/>
-            <a:r>
-              <a:rPr/>
-              <a:t>SPSS: PDF.HYPER(x, N, W, D)</a:t>
+              <a:t>SPSS: PDF.HYPER(w0, n1, w1, n0)</a:t>
             </a:r>
           </a:p>
         </p:txBody>
@@ -5316,7 +6610,7 @@
             </a:pPr>
             <a:r>
               <a:rPr/>
-              <a:t>Fisher’s Exact Test in SPSS (1/4)</a:t>
+              <a:t>SPSS data for Fisher’s Exact Test</a:t>
             </a:r>
           </a:p>
         </p:txBody>
@@ -5423,7 +6717,7 @@
             </a:pPr>
             <a:r>
               <a:rPr/>
-              <a:t>Fisher’s Exact Test in SPSS (2/4)</a:t>
+              <a:t>SPSS dialog boxes for Fisher’s Exact Test (1/2)</a:t>
             </a:r>
           </a:p>
         </p:txBody>
@@ -5483,7 +6777,7 @@
             </a:pPr>
             <a:r>
               <a:rPr/>
-              <a:t>Figure 7. SPSS Dialog box</a:t>
+              <a:t>Figure 8. SPSS Dialog box</a:t>
             </a:r>
           </a:p>
         </p:txBody>
@@ -5607,7 +6901,7 @@
             </a:pPr>
             <a:r>
               <a:rPr/>
-              <a:t>Fisher’s Exact Test in SPSS (3/4)</a:t>
+              <a:t>SPSS dialog boxes for Fisher’s Exact Test (2/2)</a:t>
             </a:r>
           </a:p>
         </p:txBody>
@@ -5667,7 +6961,7 @@
             </a:pPr>
             <a:r>
               <a:rPr/>
-              <a:t>Figure 7. SPSS Dialog box</a:t>
+              <a:t>Figure 9. SPSS Dialog box</a:t>
             </a:r>
           </a:p>
         </p:txBody>
@@ -5714,7 +7008,7 @@
             </a:pPr>
             <a:r>
               <a:rPr/>
-              <a:t>Fisher’s Exact Test in SPSS (4/4)</a:t>
+              <a:t>SPSS output for Fisher’s Exact Test</a:t>
             </a:r>
           </a:p>
         </p:txBody>
@@ -5774,7 +7068,7 @@
             </a:pPr>
             <a:r>
               <a:rPr/>
-              <a:t>Figure 7. SPSS output box</a:t>
+              <a:t>Figure 10. SPSS output box</a:t>
             </a:r>
           </a:p>
         </p:txBody>
@@ -5821,36 +7115,67 @@
             </a:pPr>
             <a:r>
               <a:rPr/>
-              <a:t>Fisher’s Exact Test in Stata</a:t>
-            </a:r>
-          </a:p>
-        </p:txBody>
-      </p:sp>
-      <p:sp>
-        <p:nvSpPr>
-          <p:cNvPr id="3" name="Content Placeholder 2"/>
-          <p:cNvSpPr>
-            <a:spLocks noGrp="1"/>
-          </p:cNvSpPr>
-          <p:nvPr>
-            <p:ph idx="1"/>
-          </p:nvPr>
-        </p:nvSpPr>
-        <p:spPr/>
-        <p:txBody>
-          <a:bodyPr/>
-          <a:lstStyle/>
-          <a:p>
-            <a:pPr lvl="0" indent="0">
-              <a:buNone/>
-            </a:pPr>
-            <a:r>
-              <a:rPr>
-                <a:latin typeface="Courier"/>
-              </a:rPr>
-              <a:t>. tabulate guess truth, exact
-           Fisher's exact =                 0.486
-   1-sided Fisher's exact =                 0.243</a:t>
+              <a:t>Stata data for Fisher’s Exact Test</a:t>
+            </a:r>
+          </a:p>
+        </p:txBody>
+      </p:sp>
+      <p:pic>
+        <p:nvPicPr>
+          <p:cNvPr descr="fig:  ../images/stata-data.png" id="0" name="Picture 1"/>
+          <p:cNvPicPr>
+            <a:picLocks noGrp="1" noChangeAspect="1"/>
+          </p:cNvPicPr>
+          <p:nvPr/>
+        </p:nvPicPr>
+        <p:blipFill>
+          <a:blip r:embed="rId2"/>
+          <a:stretch>
+            <a:fillRect/>
+          </a:stretch>
+        </p:blipFill>
+        <p:spPr bwMode="auto">
+          <a:xfrm>
+            <a:off x="3060700" y="1600200"/>
+            <a:ext cx="6070600" cy="4013200"/>
+          </a:xfrm>
+          <a:prstGeom prst="rect">
+            <a:avLst/>
+          </a:prstGeom>
+          <a:noFill/>
+          <a:ln w="9525">
+            <a:noFill/>
+            <a:headEnd/>
+            <a:tailEnd/>
+          </a:ln>
+        </p:spPr>
+      </p:pic>
+      <p:sp>
+        <p:nvSpPr>
+          <p:cNvPr id="1" name="TextBox 3"/>
+          <p:cNvSpPr txBox="1"/>
+          <p:nvPr/>
+        </p:nvSpPr>
+        <p:spPr>
+          <a:xfrm>
+            <a:off x="609600" y="5613400"/>
+            <a:ext cx="10972800" cy="508000"/>
+          </a:xfrm>
+          <a:prstGeom prst="rect">
+            <a:avLst/>
+          </a:prstGeom>
+          <a:noFill/>
+        </p:spPr>
+        <p:txBody>
+          <a:bodyPr/>
+          <a:lstStyle/>
+          <a:p>
+            <a:pPr lvl="0" indent="0" marL="0" algn="ctr">
+              <a:buNone/>
+            </a:pPr>
+            <a:r>
+              <a:rPr/>
+              <a:t>Figure 11. Stata data</a:t>
             </a:r>
           </a:p>
         </p:txBody>
@@ -5897,7 +7222,7 @@
             </a:pPr>
             <a:r>
               <a:rPr/>
-              <a:t>Break #3</a:t>
+              <a:t>Stata code and output for Fisher’s Exact Test</a:t>
             </a:r>
           </a:p>
         </p:txBody>
@@ -5917,21 +7242,16 @@
           <a:bodyPr/>
           <a:lstStyle/>
           <a:p>
-            <a:pPr lvl="0" indent="0" marL="0">
-              <a:buNone/>
-            </a:pPr>
-            <a:r>
-              <a:rPr/>
-              <a:t>What have you learned? + Using SPSS and Stata</a:t>
-            </a:r>
-          </a:p>
-          <a:p>
-            <a:pPr lvl="0" indent="0" marL="0">
-              <a:buNone/>
-            </a:pPr>
-            <a:r>
-              <a:rPr/>
-              <a:t>What’s coming next? + Details on the p-value computation</a:t>
+            <a:pPr lvl="0" indent="0">
+              <a:buNone/>
+            </a:pPr>
+            <a:r>
+              <a:rPr>
+                <a:latin typeface="Courier"/>
+              </a:rPr>
+              <a:t>. tabulate guess truth, exact
+        Fisher's exact = 0.486
+1-sided Fisher's exact = 0.243</a:t>
             </a:r>
           </a:p>
         </p:txBody>
@@ -5978,7 +7298,7 @@
             </a:pPr>
             <a:r>
               <a:rPr/>
-              <a:t>Details on the p-value computation (1/5)</a:t>
+              <a:t>SAS and R code for Fisher’s Exact test</a:t>
             </a:r>
           </a:p>
         </p:txBody>
@@ -6003,16 +7323,40 @@
             </a:pPr>
             <a:r>
               <a:rPr/>
-              <a:t>p-value=P[sample results or more extreme| H0]</a:t>
-            </a:r>
-          </a:p>
-          <a:p>
-            <a:pPr lvl="0" indent="0" marL="0">
-              <a:buNone/>
-            </a:pPr>
-            <a:r>
-              <a:rPr/>
-              <a:t>What does “more extreme” mean?</a:t>
+              <a:t>In SAS,</a:t>
+            </a:r>
+          </a:p>
+          <a:p>
+            <a:pPr lvl="0" indent="0">
+              <a:buNone/>
+            </a:pPr>
+            <a:r>
+              <a:rPr>
+                <a:latin typeface="Courier"/>
+              </a:rPr>
+              <a:t>proc freq;
+  tables guess*truth / fisher;
+run;</a:t>
+            </a:r>
+          </a:p>
+          <a:p>
+            <a:pPr lvl="0" indent="0" marL="0">
+              <a:buNone/>
+            </a:pPr>
+            <a:r>
+              <a:rPr/>
+              <a:t>In R,</a:t>
+            </a:r>
+          </a:p>
+          <a:p>
+            <a:pPr lvl="0" indent="0">
+              <a:buNone/>
+            </a:pPr>
+            <a:r>
+              <a:rPr>
+                <a:latin typeface="Courier"/>
+              </a:rPr>
+              <a:t>fisher.test(guess, truth)</a:t>
             </a:r>
           </a:p>
         </p:txBody>
@@ -6059,7 +7403,7 @@
             </a:pPr>
             <a:r>
               <a:rPr/>
-              <a:t>Details on the p-value computation (2/5)</a:t>
+              <a:t>Break #3</a:t>
             </a:r>
           </a:p>
         </p:txBody>
@@ -6084,21 +7428,16 @@
             </a:pPr>
             <a:r>
               <a:rPr/>
-              <a:t>List all possible 2 by 2 tables</a:t>
-            </a:r>
-          </a:p>
-          <a:p>
-            <a:pPr lvl="0" indent="0">
-              <a:buNone/>
-            </a:pPr>
-            <a:r>
-              <a:rPr>
-                <a:latin typeface="Courier"/>
-              </a:rPr>
-              <a:t>  ? ? | 4
-  ? ? | 4
-  ----+--
-  4 4 | 8</a:t>
+              <a:t>What have you learned? + Using SPSS and Stata</a:t>
+            </a:r>
+          </a:p>
+          <a:p>
+            <a:pPr lvl="0" indent="0" marL="0">
+              <a:buNone/>
+            </a:pPr>
+            <a:r>
+              <a:rPr/>
+              <a:t>What’s coming next? + Details on the p-value computation</a:t>
             </a:r>
           </a:p>
         </p:txBody>
@@ -6145,7 +7484,7 @@
             </a:pPr>
             <a:r>
               <a:rPr/>
-              <a:t>Details on the p-value computation (3/5)</a:t>
+              <a:t>Recall the definition of a p-value</a:t>
             </a:r>
           </a:p>
         </p:txBody>
@@ -6165,16 +7504,21 @@
           <a:bodyPr/>
           <a:lstStyle/>
           <a:p>
-            <a:pPr lvl="0" indent="0">
-              <a:buNone/>
-            </a:pPr>
-            <a:r>
-              <a:rPr>
-                <a:latin typeface="Courier"/>
-              </a:rPr>
-              <a:t> 4  0    3  1    2  2    1  3    0  4
- 0  4    1  3    2  2    3  1    4  0
-0.014   0.229   0.514   0.229   0.014</a:t>
+            <a:pPr lvl="0" indent="0" marL="0">
+              <a:buNone/>
+            </a:pPr>
+            <a:r>
+              <a:rPr/>
+              <a:t>p-value=P[sample results or more extreme| H0]</a:t>
+            </a:r>
+          </a:p>
+          <a:p>
+            <a:pPr lvl="0" indent="0" marL="0">
+              <a:buNone/>
+            </a:pPr>
+            <a:r>
+              <a:rPr/>
+              <a:t>What does “more extreme” mean?</a:t>
             </a:r>
           </a:p>
         </p:txBody>
@@ -6221,7 +7565,7 @@
             </a:pPr>
             <a:r>
               <a:rPr/>
-              <a:t>Details on the p-value computation (4/5)</a:t>
+              <a:t>List all possible 2 by 2 tables</a:t>
             </a:r>
           </a:p>
         </p:txBody>
@@ -6241,12 +7585,10 @@
           <a:bodyPr/>
           <a:lstStyle/>
           <a:p>
-            <a:pPr lvl="0" indent="0" marL="0">
-              <a:buNone/>
-            </a:pPr>
-            <a:r>
-              <a:rPr/>
-              <a:t>For a one-sided p-value</a:t>
+            <a:pPr lvl="0"/>
+            <a:r>
+              <a:rPr/>
+              <a:t>Restricted to common marginal totals</a:t>
             </a:r>
           </a:p>
           <a:p>
@@ -6257,10 +7599,10 @@
               <a:rPr>
                 <a:latin typeface="Courier"/>
               </a:rPr>
-              <a:t> 4  0    3  1
- 0  4    1  3
-0.014 + 0.229
-p-value = 0.243</a:t>
+              <a:t>  ? ? | 4
+  ? ? | 4
+  ----+--
+  4 4 | 8</a:t>
             </a:r>
           </a:p>
         </p:txBody>
@@ -6307,7 +7649,7 @@
             </a:pPr>
             <a:r>
               <a:rPr/>
-              <a:t>Details on the p-value computation (5/5)</a:t>
+              <a:t>There are five tables with the same marginal totals</a:t>
             </a:r>
           </a:p>
         </p:txBody>
@@ -6326,15 +7668,6 @@
         <p:txBody>
           <a:bodyPr/>
           <a:lstStyle/>
-          <a:p>
-            <a:pPr lvl="0" indent="0" marL="0">
-              <a:buNone/>
-            </a:pPr>
-            <a:r>
-              <a:rPr/>
-              <a:t>For a two sided p-value</a:t>
-            </a:r>
-          </a:p>
           <a:p>
             <a:pPr lvl="0" indent="0">
               <a:buNone/>
@@ -6343,10 +7676,9 @@
               <a:rPr>
                 <a:latin typeface="Courier"/>
               </a:rPr>
-              <a:t> 4  0    3  1            1  3    0  4
- 0  4    1  3            3  1    4  0
-0.014 + 0.229     +     0.229 + 0.014
-p-value = 0.486</a:t>
+              <a:t> 4  0    3  1    2  2    1  3    0  4
+ 0  4    1  3    2  2    3  1    4  0
+0.014   0.229   0.514   0.229   0.014</a:t>
             </a:r>
           </a:p>
         </p:txBody>
@@ -6393,7 +7725,7 @@
             </a:pPr>
             <a:r>
               <a:rPr/>
-              <a:t>Break #4</a:t>
+              <a:t>Consider only tables that are more extreme</a:t>
             </a:r>
           </a:p>
         </p:txBody>
@@ -6418,16 +7750,21 @@
             </a:pPr>
             <a:r>
               <a:rPr/>
-              <a:t>What have you learned? + Details on the p-value computation</a:t>
-            </a:r>
-          </a:p>
-          <a:p>
-            <a:pPr lvl="0" indent="0" marL="0">
-              <a:buNone/>
-            </a:pPr>
-            <a:r>
-              <a:rPr/>
-              <a:t>What’s coming next? + More exact tests</a:t>
+              <a:t>For a one-sided p-value</a:t>
+            </a:r>
+          </a:p>
+          <a:p>
+            <a:pPr lvl="0" indent="0">
+              <a:buNone/>
+            </a:pPr>
+            <a:r>
+              <a:rPr>
+                <a:latin typeface="Courier"/>
+              </a:rPr>
+              <a:t> 4  0    3  1
+ 0  4    1  3
+0.014 + 0.229
+p-value = 0.243</a:t>
             </a:r>
           </a:p>
         </p:txBody>
@@ -6576,7 +7913,7 @@
             </a:pPr>
             <a:r>
               <a:rPr/>
-              <a:t>Fisher-Freeman-Halton test</a:t>
+              <a:t>More extreme tables for a two-sided test</a:t>
             </a:r>
           </a:p>
         </p:txBody>
@@ -6596,24 +7933,26 @@
           <a:bodyPr/>
           <a:lstStyle/>
           <a:p>
-            <a:pPr lvl="0"/>
-            <a:r>
-              <a:rPr/>
-              <a:t>Generalization of Fisher’s Exact test</a:t>
-            </a:r>
-          </a:p>
-          <a:p>
-            <a:pPr lvl="0"/>
-            <a:r>
-              <a:rPr/>
-              <a:t>Tabulate all possible R by C tables</a:t>
-            </a:r>
-          </a:p>
-          <a:p>
-            <a:pPr lvl="1"/>
-            <a:r>
-              <a:rPr/>
-              <a:t>Fixed row and column totals</a:t>
+            <a:pPr lvl="0" indent="0" marL="0">
+              <a:buNone/>
+            </a:pPr>
+            <a:r>
+              <a:rPr/>
+              <a:t>For a two sided p-value</a:t>
+            </a:r>
+          </a:p>
+          <a:p>
+            <a:pPr lvl="0" indent="0">
+              <a:buNone/>
+            </a:pPr>
+            <a:r>
+              <a:rPr>
+                <a:latin typeface="Courier"/>
+              </a:rPr>
+              <a:t> 4  0    3  1            1  3    0  4
+ 0  4    1  3            3  1    4  0
+0.014 + 0.229     +     0.229 + 0.014
+p-value = 0.486</a:t>
             </a:r>
           </a:p>
         </p:txBody>
@@ -6660,7 +7999,7 @@
             </a:pPr>
             <a:r>
               <a:rPr/>
-              <a:t>Fisher-Freeman-Halton test in R (1/2)</a:t>
+              <a:t>Break #4</a:t>
             </a:r>
           </a:p>
         </p:txBody>
@@ -6680,20 +8019,21 @@
           <a:bodyPr/>
           <a:lstStyle/>
           <a:p>
-            <a:pPr lvl="0" indent="0">
-              <a:buNone/>
-            </a:pPr>
-            <a:r>
-              <a:rPr>
-                <a:latin typeface="Courier"/>
-              </a:rPr>
-              <a:t>&gt; v &lt;- c(4, 0, 0, 0, 4, 0, 0, 0, 4)
-&gt; m &lt;- matrix(v, nrow=3)
-&gt; m
-     [,1] [,2] [,3]
-[1,]    4    0    0
-[2,]    0    4    0
-[3,]    0    0    4</a:t>
+            <a:pPr lvl="0" indent="0" marL="0">
+              <a:buNone/>
+            </a:pPr>
+            <a:r>
+              <a:rPr/>
+              <a:t>What have you learned? + Details on the p-value computation</a:t>
+            </a:r>
+          </a:p>
+          <a:p>
+            <a:pPr lvl="0" indent="0" marL="0">
+              <a:buNone/>
+            </a:pPr>
+            <a:r>
+              <a:rPr/>
+              <a:t>What’s coming next? + More exact tests</a:t>
             </a:r>
           </a:p>
         </p:txBody>
@@ -6740,7 +8080,7 @@
             </a:pPr>
             <a:r>
               <a:rPr/>
-              <a:t>Fisher-Freeman-Halton test in R (1/2)</a:t>
+              <a:t>Fisher-Freeman-Halton test</a:t>
             </a:r>
           </a:p>
         </p:txBody>
@@ -6760,18 +8100,24 @@
           <a:bodyPr/>
           <a:lstStyle/>
           <a:p>
-            <a:pPr lvl="0" indent="0">
-              <a:buNone/>
-            </a:pPr>
-            <a:r>
-              <a:rPr>
-                <a:latin typeface="Courier"/>
-              </a:rPr>
-              <a:t>&gt; fisher.test(m)
-    Fisher's Exact Test for Count Data
-data:  m
-p-value = 0.0001732
-alternative hypothesis: two.sided </a:t>
+            <a:pPr lvl="0"/>
+            <a:r>
+              <a:rPr/>
+              <a:t>Generalization of Fisher’s Exact test</a:t>
+            </a:r>
+          </a:p>
+          <a:p>
+            <a:pPr lvl="0"/>
+            <a:r>
+              <a:rPr/>
+              <a:t>Tabulate all possible R by C tables</a:t>
+            </a:r>
+          </a:p>
+          <a:p>
+            <a:pPr lvl="1"/>
+            <a:r>
+              <a:rPr/>
+              <a:t>Fixed row and column totals</a:t>
             </a:r>
           </a:p>
         </p:txBody>
@@ -6818,7 +8164,7 @@
             </a:pPr>
             <a:r>
               <a:rPr/>
-              <a:t>Mann-Whitney U</a:t>
+              <a:t>R code for Fisher-Freeman-Halton test</a:t>
             </a:r>
           </a:p>
         </p:txBody>
@@ -6837,15 +8183,6 @@
         <p:txBody>
           <a:bodyPr/>
           <a:lstStyle/>
-          <a:p>
-            <a:pPr lvl="0" indent="0" marL="0">
-              <a:buNone/>
-            </a:pPr>
-            <a:r>
-              <a:rPr/>
-              <a:t>Hypothetical data</a:t>
-            </a:r>
-          </a:p>
           <a:p>
             <a:pPr lvl="0" indent="0">
               <a:buNone/>
@@ -6854,8 +8191,13 @@
               <a:rPr>
                 <a:latin typeface="Courier"/>
               </a:rPr>
-              <a:t>T: 14, 23, 37
-C: 12, 13, 15, 25</a:t>
+              <a:t>&gt; v &lt;- c(4, 0, 0, 0, 4, 0, 0, 0, 4)
+&gt; m &lt;- matrix(v, nrow=3)
+&gt; m
+     [,1] [,2] [,3]
+[1,]    4    0    0
+[2,]    0    4    0
+[3,]    0    0    4</a:t>
             </a:r>
           </a:p>
         </p:txBody>
@@ -6902,7 +8244,7 @@
             </a:pPr>
             <a:r>
               <a:rPr/>
-              <a:t>Rank the data</a:t>
+              <a:t>R output for Fisher-Freeman-Halton test in R</a:t>
             </a:r>
           </a:p>
         </p:txBody>
@@ -6929,8 +8271,11 @@
               <a:rPr>
                 <a:latin typeface="Courier"/>
               </a:rPr>
-              <a:t>T:  3,  5,  7
-C:  1,  2,  4,  6</a:t>
+              <a:t>&gt; fisher.test(m)
+    Fisher's Exact Test for Count Data
+data:  m
+p-value = 0.0001732
+alternative hypothesis: two.sided </a:t>
             </a:r>
           </a:p>
         </p:txBody>
@@ -6977,7 +8322,7 @@
             </a:pPr>
             <a:r>
               <a:rPr/>
-              <a:t>Sum of the ranks</a:t>
+              <a:t>Code for R, Stata, SPSS</a:t>
             </a:r>
           </a:p>
         </p:txBody>
@@ -6997,24 +8342,24 @@
           <a:bodyPr/>
           <a:lstStyle/>
           <a:p>
-            <a:pPr lvl="0" indent="0">
-              <a:buNone/>
-            </a:pPr>
-            <a:r>
-              <a:rPr>
-                <a:latin typeface="Courier"/>
-              </a:rPr>
-              <a:t>T = 15
-C = 13</a:t>
-            </a:r>
-          </a:p>
-          <a:p>
-            <a:pPr lvl="0" indent="0" marL="0">
-              <a:buNone/>
-            </a:pPr>
-            <a:r>
-              <a:rPr/>
-              <a:t>How likely is this result under the null hypothesis?</a:t>
+            <a:pPr lvl="0"/>
+            <a:r>
+              <a:rPr/>
+              <a:t>SAS: Same as for a 2 by 2 table.</a:t>
+            </a:r>
+          </a:p>
+          <a:p>
+            <a:pPr lvl="0"/>
+            <a:r>
+              <a:rPr/>
+              <a:t>Stata: Same as for a 2 by 2 table.</a:t>
+            </a:r>
+          </a:p>
+          <a:p>
+            <a:pPr lvl="0"/>
+            <a:r>
+              <a:rPr/>
+              <a:t>SPSS: Same as for a 2 by 2 table.</a:t>
             </a:r>
           </a:p>
         </p:txBody>
@@ -7061,7 +8406,7 @@
             </a:pPr>
             <a:r>
               <a:rPr/>
-              <a:t>List all possible ranking for T</a:t>
+              <a:t>Mann-Whitney U</a:t>
             </a:r>
           </a:p>
         </p:txBody>
@@ -7080,6 +8425,15 @@
         <p:txBody>
           <a:bodyPr/>
           <a:lstStyle/>
+          <a:p>
+            <a:pPr lvl="0" indent="0" marL="0">
+              <a:buNone/>
+            </a:pPr>
+            <a:r>
+              <a:rPr/>
+              <a:t>Hypothetical data</a:t>
+            </a:r>
+          </a:p>
           <a:p>
             <a:pPr lvl="0" indent="0">
               <a:buNone/>
@@ -7088,13 +8442,8 @@
               <a:rPr>
                 <a:latin typeface="Courier"/>
               </a:rPr>
-              <a:t>1,2,3  1,2,4  1,2,5  1,2,6  1,2,7
-1,3,4  1,3,5  1,3,6  1,3,7  1,4,5
-1,4,6  1,4,7  1,5,6  1,5,7  1,6,7
-2,3,4  2,3,5  2,3,6  2,3,7  2,4,5
-2,4,6  2,4,7  2,5,6  2,5,7  2,6,7
-3,4,5  3,4,6  3,4,7  3,5,6  3,5,7
-3,6,7  4,5,6  4,5,7  4,6,7  5,6,7</a:t>
+              <a:t>T: 14, 23, 37
+C: 12, 13, 15, 25</a:t>
             </a:r>
           </a:p>
         </p:txBody>
@@ -7141,7 +8490,7 @@
             </a:pPr>
             <a:r>
               <a:rPr/>
-              <a:t>Select more extreme rankings</a:t>
+              <a:t>Rank the data</a:t>
             </a:r>
           </a:p>
         </p:txBody>
@@ -7168,19 +8517,8 @@
               <a:rPr>
                 <a:latin typeface="Courier"/>
               </a:rPr>
-              <a:t>
-                            2,6,7
-                            3,5,7
-3,6,7  4,5,6  4,5,7  4,6,7  5,6,7</a:t>
-            </a:r>
-          </a:p>
-          <a:p>
-            <a:pPr lvl="0" indent="0" marL="0">
-              <a:buNone/>
-            </a:pPr>
-            <a:r>
-              <a:rPr/>
-              <a:t>p-value = 7/35 = 0.20</a:t>
+              <a:t>T:  3,  5,  7
+C:  1,  2,  4,  6</a:t>
             </a:r>
           </a:p>
         </p:txBody>
@@ -7207,6 +8545,68 @@
           <a:chExt cx="0" cy="0"/>
         </a:xfrm>
       </p:grpSpPr>
+      <p:sp>
+        <p:nvSpPr>
+          <p:cNvPr id="2" name="Title 1"/>
+          <p:cNvSpPr>
+            <a:spLocks noGrp="1"/>
+          </p:cNvSpPr>
+          <p:nvPr>
+            <p:ph type="title"/>
+          </p:nvPr>
+        </p:nvSpPr>
+        <p:spPr/>
+        <p:txBody>
+          <a:bodyPr/>
+          <a:lstStyle/>
+          <a:p>
+            <a:pPr lvl="0" indent="0" marL="0">
+              <a:buNone/>
+            </a:pPr>
+            <a:r>
+              <a:rPr/>
+              <a:t>Sum of the ranks</a:t>
+            </a:r>
+          </a:p>
+        </p:txBody>
+      </p:sp>
+      <p:sp>
+        <p:nvSpPr>
+          <p:cNvPr id="3" name="Content Placeholder 2"/>
+          <p:cNvSpPr>
+            <a:spLocks noGrp="1"/>
+          </p:cNvSpPr>
+          <p:nvPr>
+            <p:ph idx="1"/>
+          </p:nvPr>
+        </p:nvSpPr>
+        <p:spPr/>
+        <p:txBody>
+          <a:bodyPr/>
+          <a:lstStyle/>
+          <a:p>
+            <a:pPr lvl="0" indent="0">
+              <a:buNone/>
+            </a:pPr>
+            <a:r>
+              <a:rPr>
+                <a:latin typeface="Courier"/>
+              </a:rPr>
+              <a:t>T = 15
+C = 13</a:t>
+            </a:r>
+          </a:p>
+          <a:p>
+            <a:pPr lvl="0" indent="0" marL="0">
+              <a:buNone/>
+            </a:pPr>
+            <a:r>
+              <a:rPr/>
+              <a:t>How likely is this result under the null hypothesis?</a:t>
+            </a:r>
+          </a:p>
+        </p:txBody>
+      </p:sp>
     </p:spTree>
   </p:cSld>
 </p:sld>
@@ -7249,7 +8649,7 @@
             </a:pPr>
             <a:r>
               <a:rPr/>
-              <a:t>Calculation for a two-sided test</a:t>
+              <a:t>List all possible ranking for T</a:t>
             </a:r>
           </a:p>
         </p:txBody>
@@ -7276,21 +8676,13 @@
               <a:rPr>
                 <a:latin typeface="Courier"/>
               </a:rPr>
-              <a:t>1,2,3  1,2,4  1,2,5  1,2,6
-1,3,4  1,3,5
-2,3,4
-                            2,6,7
-                            3,5,7
+              <a:t>1,2,3  1,2,4  1,2,5  1,2,6  1,2,7
+1,3,4  1,3,5  1,3,6  1,3,7  1,4,5
+1,4,6  1,4,7  1,5,6  1,5,7  1,6,7
+2,3,4  2,3,5  2,3,6  2,3,7  2,4,5
+2,4,6  2,4,7  2,5,6  2,5,7  2,6,7
+3,4,5  3,4,6  3,4,7  3,5,6  3,5,7
 3,6,7  4,5,6  4,5,7  4,6,7  5,6,7</a:t>
-            </a:r>
-          </a:p>
-          <a:p>
-            <a:pPr lvl="0" indent="0" marL="0">
-              <a:buNone/>
-            </a:pPr>
-            <a:r>
-              <a:rPr/>
-              <a:t>p-value = 14/35 = 0.40</a:t>
             </a:r>
           </a:p>
         </p:txBody>
@@ -7435,7 +8827,7 @@
             </a:pPr>
             <a:r>
               <a:rPr/>
-              <a:t>Mann-Whitney test in SAS (1/3)</a:t>
+              <a:t>Select more extreme rankings</a:t>
             </a:r>
           </a:p>
         </p:txBody>
@@ -7462,14 +8854,19 @@
               <a:rPr>
                 <a:latin typeface="Courier"/>
               </a:rPr>
-              <a:t>data a;
-  input grp $ x;
-datalines;
-proc npar1way wilcoxon;
-  class grp;
-  var x;
-  exact wilcoxon;
-run;</a:t>
+              <a:t>
+                            2,6,7
+                            3,5,7
+3,6,7  4,5,6  4,5,7  4,6,7  5,6,7</a:t>
+            </a:r>
+          </a:p>
+          <a:p>
+            <a:pPr lvl="0" indent="0" marL="0">
+              <a:buNone/>
+            </a:pPr>
+            <a:r>
+              <a:rPr/>
+              <a:t>p-value = 7/35 = 0.20</a:t>
             </a:r>
           </a:p>
         </p:txBody>
@@ -7516,7 +8913,7 @@
             </a:pPr>
             <a:r>
               <a:rPr/>
-              <a:t>Mann-Whitney test in SAS (2/3)</a:t>
+              <a:t>More extreme rankings for a two-sided test</a:t>
             </a:r>
           </a:p>
         </p:txBody>
@@ -7543,14 +8940,21 @@
               <a:rPr>
                 <a:latin typeface="Courier"/>
               </a:rPr>
-              <a:t>T 14
-T 23
-T 37
-C 12
-C 13
-C 15
-C 25
-run;</a:t>
+              <a:t>1,2,3  1,2,4  1,2,5  1,2,6
+1,3,4  1,3,5
+2,3,4
+                            2,6,7
+                            3,5,7
+3,6,7  4,5,6  4,5,7  4,6,7  5,6,7</a:t>
+            </a:r>
+          </a:p>
+          <a:p>
+            <a:pPr lvl="0" indent="0" marL="0">
+              <a:buNone/>
+            </a:pPr>
+            <a:r>
+              <a:rPr/>
+              <a:t>p-value = 14/35 = 0.40</a:t>
             </a:r>
           </a:p>
         </p:txBody>
@@ -7597,7 +9001,7 @@
             </a:pPr>
             <a:r>
               <a:rPr/>
-              <a:t>Mann-Whitney test in SAS (3/5)</a:t>
+              <a:t>SAS code for Mann-Whitney test in SAS</a:t>
             </a:r>
           </a:p>
         </p:txBody>
@@ -7675,7 +9079,7 @@
             </a:pPr>
             <a:r>
               <a:rPr/>
-              <a:t>Mann-Whitney test in SAS (4/5)</a:t>
+              <a:t>SAS output for Mann-Whitney test (1/2)</a:t>
             </a:r>
           </a:p>
         </p:txBody>
@@ -7735,7 +9139,7 @@
             </a:pPr>
             <a:r>
               <a:rPr/>
-              <a:t>Figure x. SAS output</a:t>
+              <a:t>Figure 12. SAS output</a:t>
             </a:r>
           </a:p>
         </p:txBody>
@@ -7782,7 +9186,7 @@
             </a:pPr>
             <a:r>
               <a:rPr/>
-              <a:t>Mann-Whitney test in SAS (5/5)</a:t>
+              <a:t>SAS output for Mann-Whitney test (2/2)</a:t>
             </a:r>
           </a:p>
         </p:txBody>
@@ -7842,7 +9246,7 @@
             </a:pPr>
             <a:r>
               <a:rPr/>
-              <a:t>Figure x. SAS output</a:t>
+              <a:t>Figure 13. SAS output</a:t>
             </a:r>
           </a:p>
         </p:txBody>
@@ -7853,6 +9257,814 @@
 </file>
 
 <file path=ppt/slides/slide45.xml><?xml version="1.0" encoding="utf-8"?>
+<p:sld xmlns:a="http://schemas.openxmlformats.org/drawingml/2006/main" xmlns:r="http://schemas.openxmlformats.org/officeDocument/2006/relationships" xmlns:p="http://schemas.openxmlformats.org/presentationml/2006/main">
+  <p:cSld>
+    <p:spTree>
+      <p:nvGrpSpPr>
+        <p:cNvPr id="1" name=""/>
+        <p:cNvGrpSpPr/>
+        <p:nvPr/>
+      </p:nvGrpSpPr>
+      <p:grpSpPr>
+        <a:xfrm>
+          <a:off x="0" y="0"/>
+          <a:ext cx="0" cy="0"/>
+          <a:chOff x="0" y="0"/>
+          <a:chExt cx="0" cy="0"/>
+        </a:xfrm>
+      </p:grpSpPr>
+      <p:sp>
+        <p:nvSpPr>
+          <p:cNvPr id="2" name="Title 1"/>
+          <p:cNvSpPr>
+            <a:spLocks noGrp="1"/>
+          </p:cNvSpPr>
+          <p:nvPr>
+            <p:ph type="title"/>
+          </p:nvPr>
+        </p:nvSpPr>
+        <p:spPr/>
+        <p:txBody>
+          <a:bodyPr/>
+          <a:lstStyle/>
+          <a:p>
+            <a:pPr lvl="0" indent="0" marL="0">
+              <a:buNone/>
+            </a:pPr>
+            <a:r>
+              <a:rPr/>
+              <a:t>R, Stata, and SPSS</a:t>
+            </a:r>
+          </a:p>
+        </p:txBody>
+      </p:sp>
+      <p:sp>
+        <p:nvSpPr>
+          <p:cNvPr id="3" name="Content Placeholder 2"/>
+          <p:cNvSpPr>
+            <a:spLocks noGrp="1"/>
+          </p:cNvSpPr>
+          <p:nvPr>
+            <p:ph idx="1"/>
+          </p:nvPr>
+        </p:nvSpPr>
+        <p:spPr/>
+        <p:txBody>
+          <a:bodyPr/>
+          <a:lstStyle/>
+          <a:p>
+            <a:pPr lvl="0"/>
+            <a:r>
+              <a:rPr/>
+              <a:t>R: wilcox.test</a:t>
+            </a:r>
+          </a:p>
+          <a:p>
+            <a:pPr lvl="0"/>
+            <a:r>
+              <a:rPr/>
+              <a:t>Stata: ranksum</a:t>
+            </a:r>
+          </a:p>
+          <a:p>
+            <a:pPr lvl="0"/>
+            <a:r>
+              <a:rPr/>
+              <a:t>SPSS: Analyze, Nonparametric tests, Independent Samples</a:t>
+            </a:r>
+          </a:p>
+        </p:txBody>
+      </p:sp>
+    </p:spTree>
+  </p:cSld>
+</p:sld>
+</file>
+
+<file path=ppt/slides/slide46.xml><?xml version="1.0" encoding="utf-8"?>
+<p:sld xmlns:a="http://schemas.openxmlformats.org/drawingml/2006/main" xmlns:r="http://schemas.openxmlformats.org/officeDocument/2006/relationships" xmlns:p="http://schemas.openxmlformats.org/presentationml/2006/main">
+  <p:cSld>
+    <p:spTree>
+      <p:nvGrpSpPr>
+        <p:cNvPr id="1" name=""/>
+        <p:cNvGrpSpPr/>
+        <p:nvPr/>
+      </p:nvGrpSpPr>
+      <p:grpSpPr>
+        <a:xfrm>
+          <a:off x="0" y="0"/>
+          <a:ext cx="0" cy="0"/>
+          <a:chOff x="0" y="0"/>
+          <a:chExt cx="0" cy="0"/>
+        </a:xfrm>
+      </p:grpSpPr>
+      <p:sp>
+        <p:nvSpPr>
+          <p:cNvPr id="2" name="Title 1"/>
+          <p:cNvSpPr>
+            <a:spLocks noGrp="1"/>
+          </p:cNvSpPr>
+          <p:nvPr>
+            <p:ph type="title"/>
+          </p:nvPr>
+        </p:nvSpPr>
+        <p:spPr/>
+        <p:txBody>
+          <a:bodyPr/>
+          <a:lstStyle/>
+          <a:p>
+            <a:pPr lvl="0" indent="0" marL="0">
+              <a:buNone/>
+            </a:pPr>
+            <a:r>
+              <a:rPr/>
+              <a:t>Still more exact tests</a:t>
+            </a:r>
+          </a:p>
+        </p:txBody>
+      </p:sp>
+      <p:sp>
+        <p:nvSpPr>
+          <p:cNvPr id="3" name="Content Placeholder 2"/>
+          <p:cNvSpPr>
+            <a:spLocks noGrp="1"/>
+          </p:cNvSpPr>
+          <p:nvPr>
+            <p:ph idx="1"/>
+          </p:nvPr>
+        </p:nvSpPr>
+        <p:spPr/>
+        <p:txBody>
+          <a:bodyPr/>
+          <a:lstStyle/>
+          <a:p>
+            <a:pPr lvl="0"/>
+            <a:r>
+              <a:rPr/>
+              <a:t>General algorithm</a:t>
+            </a:r>
+          </a:p>
+          <a:p>
+            <a:pPr lvl="1"/>
+            <a:r>
+              <a:rPr/>
+              <a:t>Assume a null hypothesis</a:t>
+            </a:r>
+          </a:p>
+          <a:p>
+            <a:pPr lvl="1"/>
+            <a:r>
+              <a:rPr/>
+              <a:t>List all possible outcomes</a:t>
+            </a:r>
+          </a:p>
+          <a:p>
+            <a:pPr lvl="1"/>
+            <a:r>
+              <a:rPr/>
+              <a:t>Find probabilities for each</a:t>
+            </a:r>
+          </a:p>
+          <a:p>
+            <a:pPr lvl="1"/>
+            <a:r>
+              <a:rPr/>
+              <a:t>Add up as extreme or more extreme probabilities</a:t>
+            </a:r>
+          </a:p>
+          <a:p>
+            <a:pPr lvl="0"/>
+            <a:r>
+              <a:rPr/>
+              <a:t>StatXact software</a:t>
+            </a:r>
+          </a:p>
+        </p:txBody>
+      </p:sp>
+    </p:spTree>
+  </p:cSld>
+</p:sld>
+</file>
+
+<file path=ppt/slides/slide47.xml><?xml version="1.0" encoding="utf-8"?>
+<p:sld xmlns:a="http://schemas.openxmlformats.org/drawingml/2006/main" xmlns:r="http://schemas.openxmlformats.org/officeDocument/2006/relationships" xmlns:p="http://schemas.openxmlformats.org/presentationml/2006/main">
+  <p:cSld>
+    <p:spTree>
+      <p:nvGrpSpPr>
+        <p:cNvPr id="1" name=""/>
+        <p:cNvGrpSpPr/>
+        <p:nvPr/>
+      </p:nvGrpSpPr>
+      <p:grpSpPr>
+        <a:xfrm>
+          <a:off x="0" y="0"/>
+          <a:ext cx="0" cy="0"/>
+          <a:chOff x="0" y="0"/>
+          <a:chExt cx="0" cy="0"/>
+        </a:xfrm>
+      </p:grpSpPr>
+      <p:sp>
+        <p:nvSpPr>
+          <p:cNvPr id="2" name="Title 1"/>
+          <p:cNvSpPr>
+            <a:spLocks noGrp="1"/>
+          </p:cNvSpPr>
+          <p:nvPr>
+            <p:ph type="title"/>
+          </p:nvPr>
+        </p:nvSpPr>
+        <p:spPr/>
+        <p:txBody>
+          <a:bodyPr/>
+          <a:lstStyle/>
+          <a:p>
+            <a:pPr lvl="0" indent="0" marL="0">
+              <a:buNone/>
+            </a:pPr>
+            <a:r>
+              <a:rPr/>
+              <a:t>Break #5</a:t>
+            </a:r>
+          </a:p>
+        </p:txBody>
+      </p:sp>
+    </p:spTree>
+  </p:cSld>
+</p:sld>
+</file>
+
+<file path=ppt/slides/slide48.xml><?xml version="1.0" encoding="utf-8"?>
+<p:sld xmlns:a="http://schemas.openxmlformats.org/drawingml/2006/main" xmlns:r="http://schemas.openxmlformats.org/officeDocument/2006/relationships" xmlns:p="http://schemas.openxmlformats.org/presentationml/2006/main">
+  <p:cSld>
+    <p:spTree>
+      <p:nvGrpSpPr>
+        <p:cNvPr id="1" name=""/>
+        <p:cNvGrpSpPr/>
+        <p:nvPr/>
+      </p:nvGrpSpPr>
+      <p:grpSpPr>
+        <a:xfrm>
+          <a:off x="0" y="0"/>
+          <a:ext cx="0" cy="0"/>
+          <a:chOff x="0" y="0"/>
+          <a:chExt cx="0" cy="0"/>
+        </a:xfrm>
+      </p:grpSpPr>
+      <p:sp>
+        <p:nvSpPr>
+          <p:cNvPr id="2" name="Title 1"/>
+          <p:cNvSpPr>
+            <a:spLocks noGrp="1"/>
+          </p:cNvSpPr>
+          <p:nvPr>
+            <p:ph type="title"/>
+          </p:nvPr>
+        </p:nvSpPr>
+        <p:spPr/>
+        <p:txBody>
+          <a:bodyPr/>
+          <a:lstStyle/>
+          <a:p>
+            <a:pPr lvl="0" indent="0" marL="0">
+              <a:buNone/>
+            </a:pPr>
+            <a:r>
+              <a:rPr/>
+              <a:t>Randomization tests</a:t>
+            </a:r>
+          </a:p>
+        </p:txBody>
+      </p:sp>
+      <p:sp>
+        <p:nvSpPr>
+          <p:cNvPr id="3" name="Content Placeholder 2"/>
+          <p:cNvSpPr>
+            <a:spLocks noGrp="1"/>
+          </p:cNvSpPr>
+          <p:nvPr>
+            <p:ph idx="1"/>
+          </p:nvPr>
+        </p:nvSpPr>
+        <p:spPr/>
+        <p:txBody>
+          <a:bodyPr/>
+          <a:lstStyle/>
+          <a:p>
+            <a:pPr lvl="0"/>
+            <a:r>
+              <a:rPr/>
+              <a:t>Impractical to list all possible outcomes</a:t>
+            </a:r>
+          </a:p>
+          <a:p>
+            <a:pPr lvl="0"/>
+            <a:r>
+              <a:rPr/>
+              <a:t>Randomly sample instead</a:t>
+            </a:r>
+          </a:p>
+        </p:txBody>
+      </p:sp>
+    </p:spTree>
+  </p:cSld>
+</p:sld>
+</file>
+
+<file path=ppt/slides/slide49.xml><?xml version="1.0" encoding="utf-8"?>
+<p:sld xmlns:a="http://schemas.openxmlformats.org/drawingml/2006/main" xmlns:r="http://schemas.openxmlformats.org/officeDocument/2006/relationships" xmlns:p="http://schemas.openxmlformats.org/presentationml/2006/main">
+  <p:cSld>
+    <p:spTree>
+      <p:nvGrpSpPr>
+        <p:cNvPr id="1" name=""/>
+        <p:cNvGrpSpPr/>
+        <p:nvPr/>
+      </p:nvGrpSpPr>
+      <p:grpSpPr>
+        <a:xfrm>
+          <a:off x="0" y="0"/>
+          <a:ext cx="0" cy="0"/>
+          <a:chOff x="0" y="0"/>
+          <a:chExt cx="0" cy="0"/>
+        </a:xfrm>
+      </p:grpSpPr>
+      <p:sp>
+        <p:nvSpPr>
+          <p:cNvPr id="2" name="Title 1"/>
+          <p:cNvSpPr>
+            <a:spLocks noGrp="1"/>
+          </p:cNvSpPr>
+          <p:nvPr>
+            <p:ph type="title"/>
+          </p:nvPr>
+        </p:nvSpPr>
+        <p:spPr/>
+        <p:txBody>
+          <a:bodyPr/>
+          <a:lstStyle/>
+          <a:p>
+            <a:pPr lvl="0" indent="0" marL="0">
+              <a:buNone/>
+            </a:pPr>
+            <a:r>
+              <a:rPr/>
+              <a:t>Titanic data</a:t>
+            </a:r>
+          </a:p>
+        </p:txBody>
+      </p:sp>
+      <p:sp>
+        <p:nvSpPr>
+          <p:cNvPr id="3" name="Content Placeholder 2"/>
+          <p:cNvSpPr>
+            <a:spLocks noGrp="1"/>
+          </p:cNvSpPr>
+          <p:nvPr>
+            <p:ph idx="1"/>
+          </p:nvPr>
+        </p:nvSpPr>
+        <p:spPr/>
+        <p:txBody>
+          <a:bodyPr/>
+          <a:lstStyle/>
+          <a:p>
+            <a:pPr lvl="0" indent="0">
+              <a:buNone/>
+            </a:pPr>
+            <a:r>
+              <a:rPr>
+                <a:latin typeface="Courier"/>
+              </a:rPr>
+              <a:t>        Alive    Dead    Total
+Female  308   154      462
+Male      142     709      851
+Total     450     863  1,313
+Average age
+  Alive 29.4
+  Dead  31.1</a:t>
+            </a:r>
+          </a:p>
+        </p:txBody>
+      </p:sp>
+    </p:spTree>
+  </p:cSld>
+</p:sld>
+</file>
+
+<file path=ppt/slides/slide5.xml><?xml version="1.0" encoding="utf-8"?>
+<p:sld xmlns:a="http://schemas.openxmlformats.org/drawingml/2006/main" xmlns:r="http://schemas.openxmlformats.org/officeDocument/2006/relationships" xmlns:p="http://schemas.openxmlformats.org/presentationml/2006/main">
+  <p:cSld>
+    <p:spTree>
+      <p:nvGrpSpPr>
+        <p:cNvPr id="1" name=""/>
+        <p:cNvGrpSpPr/>
+        <p:nvPr/>
+      </p:nvGrpSpPr>
+      <p:grpSpPr>
+        <a:xfrm>
+          <a:off x="0" y="0"/>
+          <a:ext cx="0" cy="0"/>
+          <a:chOff x="0" y="0"/>
+          <a:chExt cx="0" cy="0"/>
+        </a:xfrm>
+      </p:grpSpPr>
+      <p:sp>
+        <p:nvSpPr>
+          <p:cNvPr id="2" name="Title 1"/>
+          <p:cNvSpPr>
+            <a:spLocks noGrp="1"/>
+          </p:cNvSpPr>
+          <p:nvPr>
+            <p:ph type="title"/>
+          </p:nvPr>
+        </p:nvSpPr>
+        <p:spPr/>
+        <p:txBody>
+          <a:bodyPr/>
+          <a:lstStyle/>
+          <a:p>
+            <a:pPr lvl="0" indent="0" marL="0">
+              <a:buNone/>
+            </a:pPr>
+            <a:r>
+              <a:rPr/>
+              <a:t>Historical origins of Fisher’s Exact Test</a:t>
+            </a:r>
+          </a:p>
+        </p:txBody>
+      </p:sp>
+      <p:pic>
+        <p:nvPicPr>
+          <p:cNvPr descr="fig:  ../images/Ronald_Aylmer_Fisher_1952.jpg" id="0" name="Picture 1"/>
+          <p:cNvPicPr>
+            <a:picLocks noGrp="1" noChangeAspect="1"/>
+          </p:cNvPicPr>
+          <p:nvPr/>
+        </p:nvPicPr>
+        <p:blipFill>
+          <a:blip r:embed="rId3"/>
+          <a:stretch>
+            <a:fillRect/>
+          </a:stretch>
+        </p:blipFill>
+        <p:spPr bwMode="auto">
+          <a:xfrm>
+            <a:off x="4584700" y="1600200"/>
+            <a:ext cx="3035300" cy="4013200"/>
+          </a:xfrm>
+          <a:prstGeom prst="rect">
+            <a:avLst/>
+          </a:prstGeom>
+          <a:noFill/>
+          <a:ln w="9525">
+            <a:noFill/>
+            <a:headEnd/>
+            <a:tailEnd/>
+          </a:ln>
+        </p:spPr>
+      </p:pic>
+      <p:sp>
+        <p:nvSpPr>
+          <p:cNvPr id="1" name="TextBox 3"/>
+          <p:cNvSpPr txBox="1"/>
+          <p:nvPr/>
+        </p:nvSpPr>
+        <p:spPr>
+          <a:xfrm>
+            <a:off x="609600" y="5613400"/>
+            <a:ext cx="10972800" cy="508000"/>
+          </a:xfrm>
+          <a:prstGeom prst="rect">
+            <a:avLst/>
+          </a:prstGeom>
+          <a:noFill/>
+        </p:spPr>
+        <p:txBody>
+          <a:bodyPr/>
+          <a:lstStyle/>
+          <a:p>
+            <a:pPr lvl="0" indent="0" marL="0" algn="ctr">
+              <a:buNone/>
+            </a:pPr>
+            <a:r>
+              <a:rPr/>
+              <a:t>Figure 1. Ronald A. Fisher</a:t>
+            </a:r>
+          </a:p>
+        </p:txBody>
+      </p:sp>
+    </p:spTree>
+  </p:cSld>
+</p:sld>
+</file>
+
+<file path=ppt/slides/slide50.xml><?xml version="1.0" encoding="utf-8"?>
+<p:sld xmlns:a="http://schemas.openxmlformats.org/drawingml/2006/main" xmlns:r="http://schemas.openxmlformats.org/officeDocument/2006/relationships" xmlns:p="http://schemas.openxmlformats.org/presentationml/2006/main">
+  <p:cSld>
+    <p:spTree>
+      <p:nvGrpSpPr>
+        <p:cNvPr id="1" name=""/>
+        <p:cNvGrpSpPr/>
+        <p:nvPr/>
+      </p:nvGrpSpPr>
+      <p:grpSpPr>
+        <a:xfrm>
+          <a:off x="0" y="0"/>
+          <a:ext cx="0" cy="0"/>
+          <a:chOff x="0" y="0"/>
+          <a:chExt cx="0" cy="0"/>
+        </a:xfrm>
+      </p:grpSpPr>
+      <p:sp>
+        <p:nvSpPr>
+          <p:cNvPr id="2" name="Title 1"/>
+          <p:cNvSpPr>
+            <a:spLocks noGrp="1"/>
+          </p:cNvSpPr>
+          <p:nvPr>
+            <p:ph type="title"/>
+          </p:nvPr>
+        </p:nvSpPr>
+        <p:spPr/>
+        <p:txBody>
+          <a:bodyPr/>
+          <a:lstStyle/>
+          <a:p>
+            <a:pPr lvl="0" indent="0" marL="0">
+              <a:buNone/>
+            </a:pPr>
+            <a:r>
+              <a:rPr/>
+              <a:t>Titanic data</a:t>
+            </a:r>
+          </a:p>
+        </p:txBody>
+      </p:sp>
+    </p:spTree>
+  </p:cSld>
+</p:sld>
+</file>
+
+<file path=ppt/slides/slide51.xml><?xml version="1.0" encoding="utf-8"?>
+<p:sld xmlns:a="http://schemas.openxmlformats.org/drawingml/2006/main" xmlns:r="http://schemas.openxmlformats.org/officeDocument/2006/relationships" xmlns:p="http://schemas.openxmlformats.org/presentationml/2006/main">
+  <p:cSld>
+    <p:spTree>
+      <p:nvGrpSpPr>
+        <p:cNvPr id="1" name=""/>
+        <p:cNvGrpSpPr/>
+        <p:nvPr/>
+      </p:nvGrpSpPr>
+      <p:grpSpPr>
+        <a:xfrm>
+          <a:off x="0" y="0"/>
+          <a:ext cx="0" cy="0"/>
+          <a:chOff x="0" y="0"/>
+          <a:chExt cx="0" cy="0"/>
+        </a:xfrm>
+      </p:grpSpPr>
+      <p:sp>
+        <p:nvSpPr>
+          <p:cNvPr id="2" name="Title 1"/>
+          <p:cNvSpPr>
+            <a:spLocks noGrp="1"/>
+          </p:cNvSpPr>
+          <p:nvPr>
+            <p:ph type="title"/>
+          </p:nvPr>
+        </p:nvSpPr>
+        <p:spPr/>
+        <p:txBody>
+          <a:bodyPr/>
+          <a:lstStyle/>
+          <a:p>
+            <a:pPr lvl="0" indent="0" marL="0">
+              <a:buNone/>
+            </a:pPr>
+            <a:r>
+              <a:rPr/>
+              <a:t>Titanic data</a:t>
+            </a:r>
+          </a:p>
+        </p:txBody>
+      </p:sp>
+      <p:pic>
+        <p:nvPicPr>
+          <p:cNvPr descr="fig:  ../images/titanic-males.png" id="0" name="Picture 1"/>
+          <p:cNvPicPr>
+            <a:picLocks noGrp="1" noChangeAspect="1"/>
+          </p:cNvPicPr>
+          <p:nvPr/>
+        </p:nvPicPr>
+        <p:blipFill>
+          <a:blip r:embed="rId2"/>
+          <a:stretch>
+            <a:fillRect/>
+          </a:stretch>
+        </p:blipFill>
+        <p:spPr bwMode="auto">
+          <a:xfrm>
+            <a:off x="3289300" y="1600200"/>
+            <a:ext cx="5613400" cy="4013200"/>
+          </a:xfrm>
+          <a:prstGeom prst="rect">
+            <a:avLst/>
+          </a:prstGeom>
+          <a:noFill/>
+          <a:ln w="9525">
+            <a:noFill/>
+            <a:headEnd/>
+            <a:tailEnd/>
+          </a:ln>
+        </p:spPr>
+      </p:pic>
+      <p:sp>
+        <p:nvSpPr>
+          <p:cNvPr id="1" name="TextBox 3"/>
+          <p:cNvSpPr txBox="1"/>
+          <p:nvPr/>
+        </p:nvSpPr>
+        <p:spPr>
+          <a:xfrm>
+            <a:off x="609600" y="5613400"/>
+            <a:ext cx="10972800" cy="508000"/>
+          </a:xfrm>
+          <a:prstGeom prst="rect">
+            <a:avLst/>
+          </a:prstGeom>
+          <a:noFill/>
+        </p:spPr>
+        <p:txBody>
+          <a:bodyPr/>
+          <a:lstStyle/>
+          <a:p>
+            <a:pPr lvl="0" indent="0" marL="0" algn="ctr">
+              <a:buNone/>
+            </a:pPr>
+            <a:r>
+              <a:rPr/>
+              <a:t>Figure x. Histogram of randomized counts of male survivors</a:t>
+            </a:r>
+          </a:p>
+        </p:txBody>
+      </p:sp>
+    </p:spTree>
+  </p:cSld>
+</p:sld>
+</file>
+
+<file path=ppt/slides/slide52.xml><?xml version="1.0" encoding="utf-8"?>
+<p:sld xmlns:a="http://schemas.openxmlformats.org/drawingml/2006/main" xmlns:r="http://schemas.openxmlformats.org/officeDocument/2006/relationships" xmlns:p="http://schemas.openxmlformats.org/presentationml/2006/main">
+  <p:cSld>
+    <p:spTree>
+      <p:nvGrpSpPr>
+        <p:cNvPr id="1" name=""/>
+        <p:cNvGrpSpPr/>
+        <p:nvPr/>
+      </p:nvGrpSpPr>
+      <p:grpSpPr>
+        <a:xfrm>
+          <a:off x="0" y="0"/>
+          <a:ext cx="0" cy="0"/>
+          <a:chOff x="0" y="0"/>
+          <a:chExt cx="0" cy="0"/>
+        </a:xfrm>
+      </p:grpSpPr>
+      <p:sp>
+        <p:nvSpPr>
+          <p:cNvPr id="2" name="Title 1"/>
+          <p:cNvSpPr>
+            <a:spLocks noGrp="1"/>
+          </p:cNvSpPr>
+          <p:nvPr>
+            <p:ph type="title"/>
+          </p:nvPr>
+        </p:nvSpPr>
+        <p:spPr/>
+        <p:txBody>
+          <a:bodyPr/>
+          <a:lstStyle/>
+          <a:p>
+            <a:pPr lvl="0" indent="0" marL="0">
+              <a:buNone/>
+            </a:pPr>
+            <a:r>
+              <a:rPr/>
+              <a:t>Titanic data</a:t>
+            </a:r>
+          </a:p>
+        </p:txBody>
+      </p:sp>
+      <p:pic>
+        <p:nvPicPr>
+          <p:cNvPr descr="fig:  ../images/titanic-ages.png" id="0" name="Picture 1"/>
+          <p:cNvPicPr>
+            <a:picLocks noGrp="1" noChangeAspect="1"/>
+          </p:cNvPicPr>
+          <p:nvPr/>
+        </p:nvPicPr>
+        <p:blipFill>
+          <a:blip r:embed="rId2"/>
+          <a:stretch>
+            <a:fillRect/>
+          </a:stretch>
+        </p:blipFill>
+        <p:spPr bwMode="auto">
+          <a:xfrm>
+            <a:off x="3289300" y="1600200"/>
+            <a:ext cx="5613400" cy="4013200"/>
+          </a:xfrm>
+          <a:prstGeom prst="rect">
+            <a:avLst/>
+          </a:prstGeom>
+          <a:noFill/>
+          <a:ln w="9525">
+            <a:noFill/>
+            <a:headEnd/>
+            <a:tailEnd/>
+          </a:ln>
+        </p:spPr>
+      </p:pic>
+      <p:sp>
+        <p:nvSpPr>
+          <p:cNvPr id="1" name="TextBox 3"/>
+          <p:cNvSpPr txBox="1"/>
+          <p:nvPr/>
+        </p:nvSpPr>
+        <p:spPr>
+          <a:xfrm>
+            <a:off x="609600" y="5613400"/>
+            <a:ext cx="10972800" cy="508000"/>
+          </a:xfrm>
+          <a:prstGeom prst="rect">
+            <a:avLst/>
+          </a:prstGeom>
+          <a:noFill/>
+        </p:spPr>
+        <p:txBody>
+          <a:bodyPr/>
+          <a:lstStyle/>
+          <a:p>
+            <a:pPr lvl="0" indent="0" marL="0" algn="ctr">
+              <a:buNone/>
+            </a:pPr>
+            <a:r>
+              <a:rPr/>
+              <a:t>Figure x. Histogram of randomized average ages of survivors</a:t>
+            </a:r>
+          </a:p>
+        </p:txBody>
+      </p:sp>
+    </p:spTree>
+  </p:cSld>
+</p:sld>
+</file>
+
+<file path=ppt/slides/slide53.xml><?xml version="1.0" encoding="utf-8"?>
+<p:sld xmlns:a="http://schemas.openxmlformats.org/drawingml/2006/main" xmlns:r="http://schemas.openxmlformats.org/officeDocument/2006/relationships" xmlns:p="http://schemas.openxmlformats.org/presentationml/2006/main">
+  <p:cSld>
+    <p:spTree>
+      <p:nvGrpSpPr>
+        <p:cNvPr id="1" name=""/>
+        <p:cNvGrpSpPr/>
+        <p:nvPr/>
+      </p:nvGrpSpPr>
+      <p:grpSpPr>
+        <a:xfrm>
+          <a:off x="0" y="0"/>
+          <a:ext cx="0" cy="0"/>
+          <a:chOff x="0" y="0"/>
+          <a:chExt cx="0" cy="0"/>
+        </a:xfrm>
+      </p:grpSpPr>
+      <p:sp>
+        <p:nvSpPr>
+          <p:cNvPr id="2" name="Title 1"/>
+          <p:cNvSpPr>
+            <a:spLocks noGrp="1"/>
+          </p:cNvSpPr>
+          <p:nvPr>
+            <p:ph type="title"/>
+          </p:nvPr>
+        </p:nvSpPr>
+        <p:spPr/>
+        <p:txBody>
+          <a:bodyPr/>
+          <a:lstStyle/>
+          <a:p>
+            <a:pPr lvl="0" indent="0" marL="0">
+              <a:buNone/>
+            </a:pPr>
+            <a:r>
+              <a:rPr/>
+              <a:t>Break #6</a:t>
+            </a:r>
+          </a:p>
+        </p:txBody>
+      </p:sp>
+    </p:spTree>
+  </p:cSld>
+</p:sld>
+</file>
+
+<file path=ppt/slides/slide54.xml><?xml version="1.0" encoding="utf-8"?>
 <p:sld xmlns:a="http://schemas.openxmlformats.org/drawingml/2006/main" xmlns:r="http://schemas.openxmlformats.org/officeDocument/2006/relationships" xmlns:p="http://schemas.openxmlformats.org/presentationml/2006/main">
   <p:cSld>
     <p:spTree>
@@ -7949,7 +10161,7 @@
             </a:pPr>
             <a:r>
               <a:rPr/>
-              <a:t>Figure x. 25 permutations</a:t>
+              <a:t>Figure 14. 7 permutations</a:t>
             </a:r>
           </a:p>
         </p:txBody>
@@ -7959,7 +10171,7 @@
 </p:sld>
 </file>
 
-<file path=ppt/slides/slide46.xml><?xml version="1.0" encoding="utf-8"?>
+<file path=ppt/slides/slide55.xml><?xml version="1.0" encoding="utf-8"?>
 <p:sld xmlns:a="http://schemas.openxmlformats.org/drawingml/2006/main" xmlns:r="http://schemas.openxmlformats.org/officeDocument/2006/relationships" xmlns:p="http://schemas.openxmlformats.org/presentationml/2006/main">
   <p:cSld>
     <p:spTree>
@@ -8056,7 +10268,7 @@
             </a:pPr>
             <a:r>
               <a:rPr/>
-              <a:t>Figure x. 25 permutations</a:t>
+              <a:t>Figure 15. 9 more permutations</a:t>
             </a:r>
           </a:p>
         </p:txBody>
@@ -8066,7 +10278,7 @@
 </p:sld>
 </file>
 
-<file path=ppt/slides/slide47.xml><?xml version="1.0" encoding="utf-8"?>
+<file path=ppt/slides/slide56.xml><?xml version="1.0" encoding="utf-8"?>
 <p:sld xmlns:a="http://schemas.openxmlformats.org/drawingml/2006/main" xmlns:r="http://schemas.openxmlformats.org/officeDocument/2006/relationships" xmlns:p="http://schemas.openxmlformats.org/presentationml/2006/main">
   <p:cSld>
     <p:spTree>
@@ -8163,7 +10375,7 @@
             </a:pPr>
             <a:r>
               <a:rPr/>
-              <a:t>Figure x. 25 permutations</a:t>
+              <a:t>Figure 16. 9 more permutations</a:t>
             </a:r>
           </a:p>
         </p:txBody>
@@ -8173,7 +10385,7 @@
 </p:sld>
 </file>
 
-<file path=ppt/slides/slide48.xml><?xml version="1.0" encoding="utf-8"?>
+<file path=ppt/slides/slide57.xml><?xml version="1.0" encoding="utf-8"?>
 <p:sld xmlns:a="http://schemas.openxmlformats.org/drawingml/2006/main" xmlns:r="http://schemas.openxmlformats.org/officeDocument/2006/relationships" xmlns:p="http://schemas.openxmlformats.org/presentationml/2006/main">
   <p:cSld>
     <p:spTree>
@@ -8210,7 +10422,7 @@
             </a:pPr>
             <a:r>
               <a:rPr/>
-              <a:t>When should you use exact or randomization tests?</a:t>
+              <a:t>Break</a:t>
             </a:r>
           </a:p>
         </p:txBody>
@@ -8220,7 +10432,7 @@
 </p:sld>
 </file>
 
-<file path=ppt/slides/slide49.xml><?xml version="1.0" encoding="utf-8"?>
+<file path=ppt/slides/slide58.xml><?xml version="1.0" encoding="utf-8"?>
 <p:sld xmlns:a="http://schemas.openxmlformats.org/drawingml/2006/main" xmlns:r="http://schemas.openxmlformats.org/officeDocument/2006/relationships" xmlns:p="http://schemas.openxmlformats.org/presentationml/2006/main">
   <p:cSld>
     <p:spTree>
@@ -8257,41 +10469,7 @@
             </a:pPr>
             <a:r>
               <a:rPr/>
-              <a:t>Fisher’s Exact Test in R (1/2)</a:t>
-            </a:r>
-          </a:p>
-        </p:txBody>
-      </p:sp>
-      <p:sp>
-        <p:nvSpPr>
-          <p:cNvPr id="3" name="Content Placeholder 2"/>
-          <p:cNvSpPr>
-            <a:spLocks noGrp="1"/>
-          </p:cNvSpPr>
-          <p:nvPr>
-            <p:ph idx="1"/>
-          </p:nvPr>
-        </p:nvSpPr>
-        <p:spPr/>
-        <p:txBody>
-          <a:bodyPr/>
-          <a:lstStyle/>
-          <a:p>
-            <a:pPr lvl="0" indent="0">
-              <a:buNone/>
-            </a:pPr>
-            <a:r>
-              <a:rPr>
-                <a:latin typeface="Courier"/>
-              </a:rPr>
-              <a:t>labs &lt;- c(
-  "Milk first",
-  "Tea first")
-guess &lt;- c(1, 2, 1, 2, 2, 2, 1, 1) 
-truth &lt;- c(2, 2, 1, 2, 2, 1, 1, 1)
-fisher.test(
-  factor(guess, labels=labs), 
-  factor(truth, labels=labs))</a:t>
+              <a:t>When should you use exact or randomization tests?</a:t>
             </a:r>
           </a:p>
         </p:txBody>
@@ -8301,7 +10479,7 @@
 </p:sld>
 </file>
 
-<file path=ppt/slides/slide5.xml><?xml version="1.0" encoding="utf-8"?>
+<file path=ppt/slides/slide59.xml><?xml version="1.0" encoding="utf-8"?>
 <p:sld xmlns:a="http://schemas.openxmlformats.org/drawingml/2006/main" xmlns:r="http://schemas.openxmlformats.org/officeDocument/2006/relationships" xmlns:p="http://schemas.openxmlformats.org/presentationml/2006/main">
   <p:cSld>
     <p:spTree>
@@ -8338,147 +10516,7 @@
             </a:pPr>
             <a:r>
               <a:rPr/>
-              <a:t>1. Historical origins</a:t>
-            </a:r>
-          </a:p>
-        </p:txBody>
-      </p:sp>
-      <p:pic>
-        <p:nvPicPr>
-          <p:cNvPr descr="fig:  ../images/Ronald_Aylmer_Fisher_1952.jpg" id="0" name="Picture 1"/>
-          <p:cNvPicPr>
-            <a:picLocks noGrp="1" noChangeAspect="1"/>
-          </p:cNvPicPr>
-          <p:nvPr/>
-        </p:nvPicPr>
-        <p:blipFill>
-          <a:blip r:embed="rId3"/>
-          <a:stretch>
-            <a:fillRect/>
-          </a:stretch>
-        </p:blipFill>
-        <p:spPr bwMode="auto">
-          <a:xfrm>
-            <a:off x="4584700" y="1600200"/>
-            <a:ext cx="3035300" cy="4013200"/>
-          </a:xfrm>
-          <a:prstGeom prst="rect">
-            <a:avLst/>
-          </a:prstGeom>
-          <a:noFill/>
-          <a:ln w="9525">
-            <a:noFill/>
-            <a:headEnd/>
-            <a:tailEnd/>
-          </a:ln>
-        </p:spPr>
-      </p:pic>
-      <p:sp>
-        <p:nvSpPr>
-          <p:cNvPr id="1" name="TextBox 3"/>
-          <p:cNvSpPr txBox="1"/>
-          <p:nvPr/>
-        </p:nvSpPr>
-        <p:spPr>
-          <a:xfrm>
-            <a:off x="609600" y="5613400"/>
-            <a:ext cx="10972800" cy="508000"/>
-          </a:xfrm>
-          <a:prstGeom prst="rect">
-            <a:avLst/>
-          </a:prstGeom>
-          <a:noFill/>
-        </p:spPr>
-        <p:txBody>
-          <a:bodyPr/>
-          <a:lstStyle/>
-          <a:p>
-            <a:pPr lvl="0" indent="0" marL="0" algn="ctr">
-              <a:buNone/>
-            </a:pPr>
-            <a:r>
-              <a:rPr/>
-              <a:t>Figure 1. Ronald A. Fisher</a:t>
-            </a:r>
-          </a:p>
-        </p:txBody>
-      </p:sp>
-    </p:spTree>
-  </p:cSld>
-</p:sld>
-</file>
-
-<file path=ppt/slides/slide50.xml><?xml version="1.0" encoding="utf-8"?>
-<p:sld xmlns:a="http://schemas.openxmlformats.org/drawingml/2006/main" xmlns:r="http://schemas.openxmlformats.org/officeDocument/2006/relationships" xmlns:p="http://schemas.openxmlformats.org/presentationml/2006/main">
-  <p:cSld>
-    <p:spTree>
-      <p:nvGrpSpPr>
-        <p:cNvPr id="1" name=""/>
-        <p:cNvGrpSpPr/>
-        <p:nvPr/>
-      </p:nvGrpSpPr>
-      <p:grpSpPr>
-        <a:xfrm>
-          <a:off x="0" y="0"/>
-          <a:ext cx="0" cy="0"/>
-          <a:chOff x="0" y="0"/>
-          <a:chExt cx="0" cy="0"/>
-        </a:xfrm>
-      </p:grpSpPr>
-      <p:sp>
-        <p:nvSpPr>
-          <p:cNvPr id="2" name="Title 1"/>
-          <p:cNvSpPr>
-            <a:spLocks noGrp="1"/>
-          </p:cNvSpPr>
-          <p:nvPr>
-            <p:ph type="title"/>
-          </p:nvPr>
-        </p:nvSpPr>
-        <p:spPr/>
-        <p:txBody>
-          <a:bodyPr/>
-          <a:lstStyle/>
-          <a:p>
-            <a:pPr lvl="0" indent="0" marL="0">
-              <a:buNone/>
-            </a:pPr>
-            <a:r>
-              <a:rPr/>
-              <a:t>Fisher’s Exact Test in R (2/2)</a:t>
-            </a:r>
-          </a:p>
-        </p:txBody>
-      </p:sp>
-      <p:sp>
-        <p:nvSpPr>
-          <p:cNvPr id="3" name="Content Placeholder 2"/>
-          <p:cNvSpPr>
-            <a:spLocks noGrp="1"/>
-          </p:cNvSpPr>
-          <p:nvPr>
-            <p:ph idx="1"/>
-          </p:nvPr>
-        </p:nvSpPr>
-        <p:spPr/>
-        <p:txBody>
-          <a:bodyPr/>
-          <a:lstStyle/>
-          <a:p>
-            <a:pPr lvl="0" indent="0">
-              <a:buNone/>
-            </a:pPr>
-            <a:r>
-              <a:rPr>
-                <a:latin typeface="Courier"/>
-              </a:rPr>
-              <a:t>p-value = 0.4857
-alternative hypothesis: true odds ratio is not equal to 1
-95 percent confidence interval:
-   0.2117329 621.9337505
-sample estimates:
-odds ratio 
-  6.408309 </a:t>
+              <a:t>Conclusion</a:t>
             </a:r>
           </a:p>
         </p:txBody>
@@ -8525,7 +10563,7 @@
             </a:pPr>
             <a:r>
               <a:rPr/>
-              <a:t>The lady tasting tea</a:t>
+              <a:t>The lady tasting tea, tea plus milk</a:t>
             </a:r>
           </a:p>
         </p:txBody>
@@ -8539,7 +10577,7 @@
           <p:nvPr/>
         </p:nvPicPr>
         <p:blipFill>
-          <a:blip r:embed="rId2"/>
+          <a:blip r:embed="rId3"/>
           <a:stretch>
             <a:fillRect/>
           </a:stretch>
@@ -8632,7 +10670,7 @@
             </a:pPr>
             <a:r>
               <a:rPr/>
-              <a:t>If you change the order?</a:t>
+              <a:t>Milk plus tea, can you tell the difference?</a:t>
             </a:r>
           </a:p>
         </p:txBody>
@@ -8646,7 +10684,7 @@
           <p:nvPr/>
         </p:nvPicPr>
         <p:blipFill>
-          <a:blip r:embed="rId2"/>
+          <a:blip r:embed="rId3"/>
           <a:stretch>
             <a:fillRect/>
           </a:stretch>
@@ -8739,7 +10777,7 @@
             </a:pPr>
             <a:r>
               <a:rPr/>
-              <a:t>The experiment</a:t>
+              <a:t>The experiment to test the claim</a:t>
             </a:r>
           </a:p>
         </p:txBody>
@@ -8753,7 +10791,7 @@
           <p:nvPr/>
         </p:nvPicPr>
         <p:blipFill>
-          <a:blip r:embed="rId2"/>
+          <a:blip r:embed="rId3"/>
           <a:stretch>
             <a:fillRect/>
           </a:stretch>
@@ -8846,7 +10884,7 @@
             </a:pPr>
             <a:r>
               <a:rPr/>
-              <a:t>The result</a:t>
+              <a:t>The result of the experiment</a:t>
             </a:r>
           </a:p>
         </p:txBody>
@@ -8860,7 +10898,7 @@
           <p:nvPr/>
         </p:nvPicPr>
         <p:blipFill>
-          <a:blip r:embed="rId2"/>
+          <a:blip r:embed="rId3"/>
           <a:stretch>
             <a:fillRect/>
           </a:stretch>

</xml_diff>